<commit_message>
- rename work_clean.R to 1_create_datasets.R - structure in logical steps - rename data frames - remove libraries not used
</commit_message>
<xml_diff>
--- a/Project management shiny app presentation.pptx
+++ b/Project management shiny app presentation.pptx
@@ -6,13 +6,16 @@
   </p:sldMasterIdLst>
   <p:sldIdLst>
     <p:sldId id="256" r:id="rId5"/>
-    <p:sldId id="257" r:id="rId6"/>
-    <p:sldId id="258" r:id="rId7"/>
-    <p:sldId id="260" r:id="rId8"/>
-    <p:sldId id="259" r:id="rId9"/>
-    <p:sldId id="262" r:id="rId10"/>
-    <p:sldId id="263" r:id="rId11"/>
-    <p:sldId id="261" r:id="rId12"/>
+    <p:sldId id="265" r:id="rId6"/>
+    <p:sldId id="257" r:id="rId7"/>
+    <p:sldId id="258" r:id="rId8"/>
+    <p:sldId id="260" r:id="rId9"/>
+    <p:sldId id="266" r:id="rId10"/>
+    <p:sldId id="259" r:id="rId11"/>
+    <p:sldId id="262" r:id="rId12"/>
+    <p:sldId id="264" r:id="rId13"/>
+    <p:sldId id="263" r:id="rId14"/>
+    <p:sldId id="261" r:id="rId15"/>
   </p:sldIdLst>
   <p:sldSz cx="9144000" cy="6858000" type="screen4x3"/>
   <p:notesSz cx="6858000" cy="9144000"/>
@@ -2212,17 +2215,17 @@
           </a:ln>
           <a:extLst>
             <a:ext uri="{FAA26D3D-D897-4be2-8F04-BA451C77F1D7}">
-              <ma14:placeholderFlag xmlns:ma14="http://schemas.microsoft.com/office/mac/drawingml/2011/main" xmlns="" val="1"/>
+              <ma14:placeholderFlag xmlns="" xmlns:ma14="http://schemas.microsoft.com/office/mac/drawingml/2011/main" val="1"/>
             </a:ext>
             <a:ext uri="{909E8E84-426E-40dd-AFC4-6F175D3DCCD1}">
-              <a14:hiddenFill xmlns:a14="http://schemas.microsoft.com/office/drawing/2010/main" xmlns="">
+              <a14:hiddenFill xmlns="" xmlns:a14="http://schemas.microsoft.com/office/drawing/2010/main">
                 <a:solidFill>
                   <a:srgbClr val="FFFFFF"/>
                 </a:solidFill>
               </a14:hiddenFill>
             </a:ext>
             <a:ext uri="{91240B29-F687-4f45-9708-019B960494DF}">
-              <a14:hiddenLine xmlns:a14="http://schemas.microsoft.com/office/drawing/2010/main" xmlns="" w="9525">
+              <a14:hiddenLine xmlns="" xmlns:a14="http://schemas.microsoft.com/office/drawing/2010/main" w="9525">
                 <a:solidFill>
                   <a:srgbClr val="000000"/>
                 </a:solidFill>
@@ -2274,17 +2277,17 @@
           </a:ln>
           <a:extLst>
             <a:ext uri="{FAA26D3D-D897-4be2-8F04-BA451C77F1D7}">
-              <ma14:placeholderFlag xmlns:ma14="http://schemas.microsoft.com/office/mac/drawingml/2011/main" xmlns="" val="1"/>
+              <ma14:placeholderFlag xmlns="" xmlns:ma14="http://schemas.microsoft.com/office/mac/drawingml/2011/main" val="1"/>
             </a:ext>
             <a:ext uri="{909E8E84-426E-40dd-AFC4-6F175D3DCCD1}">
-              <a14:hiddenFill xmlns:a14="http://schemas.microsoft.com/office/drawing/2010/main" xmlns="">
+              <a14:hiddenFill xmlns="" xmlns:a14="http://schemas.microsoft.com/office/drawing/2010/main">
                 <a:solidFill>
                   <a:srgbClr val="FFFFFF"/>
                 </a:solidFill>
               </a14:hiddenFill>
             </a:ext>
             <a:ext uri="{91240B29-F687-4f45-9708-019B960494DF}">
-              <a14:hiddenLine xmlns:a14="http://schemas.microsoft.com/office/drawing/2010/main" xmlns="" w="9525">
+              <a14:hiddenLine xmlns="" xmlns:a14="http://schemas.microsoft.com/office/drawing/2010/main" w="9525">
                 <a:solidFill>
                   <a:srgbClr val="000000"/>
                 </a:solidFill>
@@ -2983,7 +2986,7 @@
         </p:spPr>
         <p:txBody>
           <a:bodyPr rtlCol="0">
-            <a:normAutofit fontScale="90000"/>
+            <a:normAutofit/>
           </a:bodyPr>
           <a:lstStyle/>
           <a:p>
@@ -2999,22 +3002,23 @@
                 <a:ea typeface="Arial" charset="0"/>
                 <a:cs typeface="Arial" charset="0"/>
               </a:rPr>
-              <a:t>It’s time to </a:t>
-            </a:r>
-            <a:r>
-              <a:rPr lang="en-US" dirty="0"/>
-              <a:t>…?: </a:t>
-            </a:r>
-            <a:br>
-              <a:rPr lang="en-US" dirty="0"/>
-            </a:br>
+              <a:t>It’s Time to Shine with the </a:t>
+            </a:r>
+            <a:r>
+              <a:rPr lang="en-US" dirty="0" err="1">
+                <a:latin typeface="Arial" charset="0"/>
+                <a:ea typeface="Arial" charset="0"/>
+                <a:cs typeface="Arial" charset="0"/>
+              </a:rPr>
+              <a:t>timetrackR</a:t>
+            </a:r>
             <a:r>
               <a:rPr lang="en-US" dirty="0">
                 <a:latin typeface="Arial" charset="0"/>
                 <a:ea typeface="Arial" charset="0"/>
                 <a:cs typeface="Arial" charset="0"/>
               </a:rPr>
-              <a:t>Project Management Shiny App</a:t>
+              <a:t> App</a:t>
             </a:r>
           </a:p>
         </p:txBody>
@@ -3140,6 +3144,185 @@
 </p:sld>
 </file>
 
+<file path=ppt/slides/slide10.xml><?xml version="1.0" encoding="utf-8"?>
+<p:sld xmlns:a="http://schemas.openxmlformats.org/drawingml/2006/main" xmlns:r="http://schemas.openxmlformats.org/officeDocument/2006/relationships" xmlns:p="http://schemas.openxmlformats.org/presentationml/2006/main">
+  <p:cSld>
+    <p:spTree>
+      <p:nvGrpSpPr>
+        <p:cNvPr id="1" name=""/>
+        <p:cNvGrpSpPr/>
+        <p:nvPr/>
+      </p:nvGrpSpPr>
+      <p:grpSpPr>
+        <a:xfrm>
+          <a:off x="0" y="0"/>
+          <a:ext cx="0" cy="0"/>
+          <a:chOff x="0" y="0"/>
+          <a:chExt cx="0" cy="0"/>
+        </a:xfrm>
+      </p:grpSpPr>
+      <p:sp>
+        <p:nvSpPr>
+          <p:cNvPr id="2" name="Title 1">
+            <a:extLst>
+              <a:ext uri="{FF2B5EF4-FFF2-40B4-BE49-F238E27FC236}">
+                <a16:creationId xmlns:a16="http://schemas.microsoft.com/office/drawing/2014/main" id="{8B4B5790-0EA7-4012-93A7-22425D41E1E3}"/>
+              </a:ext>
+            </a:extLst>
+          </p:cNvPr>
+          <p:cNvSpPr>
+            <a:spLocks noGrp="1"/>
+          </p:cNvSpPr>
+          <p:nvPr>
+            <p:ph type="title"/>
+          </p:nvPr>
+        </p:nvSpPr>
+        <p:spPr/>
+        <p:txBody>
+          <a:bodyPr/>
+          <a:lstStyle/>
+          <a:p>
+            <a:r>
+              <a:rPr lang="en-US" dirty="0"/>
+              <a:t>Future plans</a:t>
+            </a:r>
+          </a:p>
+        </p:txBody>
+      </p:sp>
+      <p:sp>
+        <p:nvSpPr>
+          <p:cNvPr id="3" name="Content Placeholder 2">
+            <a:extLst>
+              <a:ext uri="{FF2B5EF4-FFF2-40B4-BE49-F238E27FC236}">
+                <a16:creationId xmlns:a16="http://schemas.microsoft.com/office/drawing/2014/main" id="{4851F475-9DB2-4FC0-B370-DDE4324E134A}"/>
+              </a:ext>
+            </a:extLst>
+          </p:cNvPr>
+          <p:cNvSpPr>
+            <a:spLocks noGrp="1"/>
+          </p:cNvSpPr>
+          <p:nvPr>
+            <p:ph idx="1"/>
+          </p:nvPr>
+        </p:nvSpPr>
+        <p:spPr/>
+        <p:txBody>
+          <a:bodyPr/>
+          <a:lstStyle/>
+          <a:p>
+            <a:r>
+              <a:rPr lang="en-US" dirty="0"/>
+              <a:t>Incorporate with toggle app to automate a portion of the tracking</a:t>
+            </a:r>
+          </a:p>
+        </p:txBody>
+      </p:sp>
+    </p:spTree>
+    <p:extLst>
+      <p:ext uri="{BB962C8B-B14F-4D97-AF65-F5344CB8AC3E}">
+        <p14:creationId xmlns:p14="http://schemas.microsoft.com/office/powerpoint/2010/main" val="1128304148"/>
+      </p:ext>
+    </p:extLst>
+  </p:cSld>
+  <p:clrMapOvr>
+    <a:masterClrMapping/>
+  </p:clrMapOvr>
+</p:sld>
+</file>
+
+<file path=ppt/slides/slide11.xml><?xml version="1.0" encoding="utf-8"?>
+<p:sld xmlns:a="http://schemas.openxmlformats.org/drawingml/2006/main" xmlns:r="http://schemas.openxmlformats.org/officeDocument/2006/relationships" xmlns:p="http://schemas.openxmlformats.org/presentationml/2006/main">
+  <p:cSld>
+    <p:spTree>
+      <p:nvGrpSpPr>
+        <p:cNvPr id="1" name=""/>
+        <p:cNvGrpSpPr/>
+        <p:nvPr/>
+      </p:nvGrpSpPr>
+      <p:grpSpPr>
+        <a:xfrm>
+          <a:off x="0" y="0"/>
+          <a:ext cx="0" cy="0"/>
+          <a:chOff x="0" y="0"/>
+          <a:chExt cx="0" cy="0"/>
+        </a:xfrm>
+      </p:grpSpPr>
+      <p:sp>
+        <p:nvSpPr>
+          <p:cNvPr id="2" name="Title 1">
+            <a:extLst>
+              <a:ext uri="{FF2B5EF4-FFF2-40B4-BE49-F238E27FC236}">
+                <a16:creationId xmlns:a16="http://schemas.microsoft.com/office/drawing/2014/main" id="{CFD1A390-01F3-41EC-A21A-C0F8AE22ED16}"/>
+              </a:ext>
+            </a:extLst>
+          </p:cNvPr>
+          <p:cNvSpPr>
+            <a:spLocks noGrp="1"/>
+          </p:cNvSpPr>
+          <p:nvPr>
+            <p:ph type="title"/>
+          </p:nvPr>
+        </p:nvSpPr>
+        <p:spPr/>
+        <p:txBody>
+          <a:bodyPr/>
+          <a:lstStyle/>
+          <a:p>
+            <a:r>
+              <a:rPr lang="en-US" dirty="0"/>
+              <a:t>References</a:t>
+            </a:r>
+          </a:p>
+        </p:txBody>
+      </p:sp>
+      <p:sp>
+        <p:nvSpPr>
+          <p:cNvPr id="3" name="Content Placeholder 2">
+            <a:extLst>
+              <a:ext uri="{FF2B5EF4-FFF2-40B4-BE49-F238E27FC236}">
+                <a16:creationId xmlns:a16="http://schemas.microsoft.com/office/drawing/2014/main" id="{525BAE00-D3F8-479E-BD2A-2045BF753653}"/>
+              </a:ext>
+            </a:extLst>
+          </p:cNvPr>
+          <p:cNvSpPr>
+            <a:spLocks noGrp="1"/>
+          </p:cNvSpPr>
+          <p:nvPr>
+            <p:ph idx="1"/>
+          </p:nvPr>
+        </p:nvSpPr>
+        <p:spPr/>
+        <p:txBody>
+          <a:bodyPr/>
+          <a:lstStyle/>
+          <a:p>
+            <a:r>
+              <a:rPr lang="en-US" sz="2800" dirty="0"/>
+              <a:t>GitHub: </a:t>
+            </a:r>
+            <a:r>
+              <a:rPr lang="en-US" sz="2800" dirty="0">
+                <a:hlinkClick r:id="rId2"/>
+              </a:rPr>
+              <a:t>https://github.com/jalavery/proj_mgmnt</a:t>
+            </a:r>
+            <a:endParaRPr lang="en-US" sz="2800" dirty="0"/>
+          </a:p>
+        </p:txBody>
+      </p:sp>
+    </p:spTree>
+    <p:extLst>
+      <p:ext uri="{BB962C8B-B14F-4D97-AF65-F5344CB8AC3E}">
+        <p14:creationId xmlns:p14="http://schemas.microsoft.com/office/powerpoint/2010/main" val="1075239667"/>
+      </p:ext>
+    </p:extLst>
+  </p:cSld>
+  <p:clrMapOvr>
+    <a:masterClrMapping/>
+  </p:clrMapOvr>
+</p:sld>
+</file>
+
 <file path=ppt/slides/slide2.xml><?xml version="1.0" encoding="utf-8"?>
 <p:sld xmlns:a="http://schemas.openxmlformats.org/drawingml/2006/main" xmlns:r="http://schemas.openxmlformats.org/officeDocument/2006/relationships" xmlns:p="http://schemas.openxmlformats.org/presentationml/2006/main">
   <p:cSld>
@@ -3162,7 +3345,7 @@
           <p:cNvPr id="2" name="Title 1">
             <a:extLst>
               <a:ext uri="{FF2B5EF4-FFF2-40B4-BE49-F238E27FC236}">
-                <a16:creationId xmlns:a16="http://schemas.microsoft.com/office/drawing/2014/main" id="{FD6491AE-52FD-4B48-884B-0D335ACDEACF}"/>
+                <a16:creationId xmlns:a16="http://schemas.microsoft.com/office/drawing/2014/main" id="{8E20A4B1-CEFE-42F6-BE30-1CF39169F3F8}"/>
               </a:ext>
             </a:extLst>
           </p:cNvPr>
@@ -3180,17 +3363,17 @@
           <a:p>
             <a:r>
               <a:rPr lang="en-US" dirty="0"/>
-              <a:t>Tracking time</a:t>
-            </a:r>
-          </a:p>
-        </p:txBody>
-      </p:sp>
-      <p:sp>
-        <p:nvSpPr>
-          <p:cNvPr id="3" name="Content Placeholder 2">
+              <a:t>Time &amp; the busy statistician</a:t>
+            </a:r>
+          </a:p>
+        </p:txBody>
+      </p:sp>
+      <p:sp>
+        <p:nvSpPr>
+          <p:cNvPr id="5" name="Content Placeholder 4">
             <a:extLst>
               <a:ext uri="{FF2B5EF4-FFF2-40B4-BE49-F238E27FC236}">
-                <a16:creationId xmlns:a16="http://schemas.microsoft.com/office/drawing/2014/main" id="{1F882B4D-9B18-448E-A594-C83072C8D8AB}"/>
+                <a16:creationId xmlns:a16="http://schemas.microsoft.com/office/drawing/2014/main" id="{9C48C686-4E67-459C-8A8F-9A73F64F4E68}"/>
               </a:ext>
             </a:extLst>
           </p:cNvPr>
@@ -3207,30 +3390,75 @@
           <a:lstStyle/>
           <a:p>
             <a:r>
-              <a:rPr lang="en-US" sz="2800" dirty="0"/>
-              <a:t>Doesn’t have to be down to the minute</a:t>
-            </a:r>
-          </a:p>
-          <a:p>
-            <a:pPr lvl="1"/>
-            <a:r>
-              <a:rPr lang="en-US" sz="2400" dirty="0"/>
-              <a:t>At most granular, 15 minute increments</a:t>
-            </a:r>
-          </a:p>
-          <a:p>
-            <a:pPr lvl="1"/>
-            <a:r>
-              <a:rPr lang="en-US" sz="2400" dirty="0"/>
-              <a:t>At least granular, entire day</a:t>
-            </a:r>
-          </a:p>
-        </p:txBody>
-      </p:sp>
+              <a:rPr lang="en-US" dirty="0"/>
+              <a:t>Often feels like there aren’t enough hours in the day</a:t>
+            </a:r>
+          </a:p>
+          <a:p>
+            <a:r>
+              <a:rPr lang="en-US" dirty="0"/>
+              <a:t>Start working on one project and loose track of time</a:t>
+            </a:r>
+          </a:p>
+          <a:p>
+            <a:r>
+              <a:rPr lang="en-US" dirty="0"/>
+              <a:t>Re-analyses take up time! There is no such thing as a “quick re-analysis”!</a:t>
+            </a:r>
+          </a:p>
+        </p:txBody>
+      </p:sp>
+      <p:pic>
+        <p:nvPicPr>
+          <p:cNvPr id="4" name="Picture 2" descr="Image result for alice in wonderland rabbit time">
+            <a:extLst>
+              <a:ext uri="{FF2B5EF4-FFF2-40B4-BE49-F238E27FC236}">
+                <a16:creationId xmlns:a16="http://schemas.microsoft.com/office/drawing/2014/main" id="{6C594743-08C0-4041-A651-BC303D46531F}"/>
+              </a:ext>
+            </a:extLst>
+          </p:cNvPr>
+          <p:cNvPicPr>
+            <a:picLocks noChangeAspect="1" noChangeArrowheads="1"/>
+          </p:cNvPicPr>
+          <p:nvPr/>
+        </p:nvPicPr>
+        <p:blipFill>
+          <a:blip r:embed="rId2">
+            <a:extLst>
+              <a:ext uri="{28A0092B-C50C-407E-A947-70E740481C1C}">
+                <a14:useLocalDpi xmlns:a14="http://schemas.microsoft.com/office/drawing/2010/main" val="0"/>
+              </a:ext>
+            </a:extLst>
+          </a:blip>
+          <a:srcRect/>
+          <a:stretch>
+            <a:fillRect/>
+          </a:stretch>
+        </p:blipFill>
+        <p:spPr bwMode="auto">
+          <a:xfrm>
+            <a:off x="3302599" y="4587545"/>
+            <a:ext cx="2390775" cy="1914525"/>
+          </a:xfrm>
+          <a:prstGeom prst="rect">
+            <a:avLst/>
+          </a:prstGeom>
+          <a:noFill/>
+          <a:extLst>
+            <a:ext uri="{909E8E84-426E-40DD-AFC4-6F175D3DCCD1}">
+              <a14:hiddenFill xmlns:a14="http://schemas.microsoft.com/office/drawing/2010/main">
+                <a:solidFill>
+                  <a:srgbClr val="FFFFFF"/>
+                </a:solidFill>
+              </a14:hiddenFill>
+            </a:ext>
+          </a:extLst>
+        </p:spPr>
+      </p:pic>
     </p:spTree>
     <p:extLst>
       <p:ext uri="{BB962C8B-B14F-4D97-AF65-F5344CB8AC3E}">
-        <p14:creationId xmlns:p14="http://schemas.microsoft.com/office/powerpoint/2010/main" val="2590693224"/>
+        <p14:creationId xmlns:p14="http://schemas.microsoft.com/office/powerpoint/2010/main" val="2336468093"/>
       </p:ext>
     </p:extLst>
   </p:cSld>
@@ -3262,7 +3490,7 @@
           <p:cNvPr id="2" name="Title 1">
             <a:extLst>
               <a:ext uri="{FF2B5EF4-FFF2-40B4-BE49-F238E27FC236}">
-                <a16:creationId xmlns:a16="http://schemas.microsoft.com/office/drawing/2014/main" id="{7CCFB932-F1A0-458A-830D-3BBD6D4ACBAC}"/>
+                <a16:creationId xmlns:a16="http://schemas.microsoft.com/office/drawing/2014/main" id="{FD6491AE-52FD-4B48-884B-0D335ACDEACF}"/>
               </a:ext>
             </a:extLst>
           </p:cNvPr>
@@ -3280,7 +3508,7 @@
           <a:p>
             <a:r>
               <a:rPr lang="en-US" dirty="0"/>
-              <a:t>Why use a project management app?</a:t>
+              <a:t>Tracking time</a:t>
             </a:r>
           </a:p>
         </p:txBody>
@@ -3290,7 +3518,7 @@
           <p:cNvPr id="3" name="Content Placeholder 2">
             <a:extLst>
               <a:ext uri="{FF2B5EF4-FFF2-40B4-BE49-F238E27FC236}">
-                <a16:creationId xmlns:a16="http://schemas.microsoft.com/office/drawing/2014/main" id="{5640F286-9FC2-4C24-9810-0AD9959C4F7C}"/>
+                <a16:creationId xmlns:a16="http://schemas.microsoft.com/office/drawing/2014/main" id="{1F882B4D-9B18-448E-A594-C83072C8D8AB}"/>
               </a:ext>
             </a:extLst>
           </p:cNvPr>
@@ -3308,23 +3536,21 @@
           <a:p>
             <a:r>
               <a:rPr lang="en-US" sz="2800" dirty="0"/>
-              <a:t>Tracking your time is only useful if you then go back and revisit it </a:t>
-            </a:r>
-            <a:r>
-              <a:rPr lang="en-US" sz="2800" dirty="0">
-                <a:solidFill>
-                  <a:schemeClr val="bg1">
-                    <a:lumMod val="50000"/>
-                  </a:schemeClr>
-                </a:solidFill>
-              </a:rPr>
-              <a:t>(except for the case of time tracking for billing purposes)</a:t>
-            </a:r>
-          </a:p>
-          <a:p>
-            <a:r>
-              <a:rPr lang="en-US" sz="2800" dirty="0"/>
-              <a:t>Useful for one on ones and project status updates</a:t>
+              <a:t>Doesn’t have to be down to the minute</a:t>
+            </a:r>
+          </a:p>
+          <a:p>
+            <a:pPr lvl="1"/>
+            <a:r>
+              <a:rPr lang="en-US" sz="2400" dirty="0"/>
+              <a:t>At most granular, 15 minute increments</a:t>
+            </a:r>
+          </a:p>
+          <a:p>
+            <a:pPr lvl="1"/>
+            <a:r>
+              <a:rPr lang="en-US" sz="2400" dirty="0"/>
+              <a:t>At least granular, entire day</a:t>
             </a:r>
           </a:p>
         </p:txBody>
@@ -3332,7 +3558,7 @@
     </p:spTree>
     <p:extLst>
       <p:ext uri="{BB962C8B-B14F-4D97-AF65-F5344CB8AC3E}">
-        <p14:creationId xmlns:p14="http://schemas.microsoft.com/office/powerpoint/2010/main" val="1628145875"/>
+        <p14:creationId xmlns:p14="http://schemas.microsoft.com/office/powerpoint/2010/main" val="2590693224"/>
       </p:ext>
     </p:extLst>
   </p:cSld>
@@ -3364,7 +3590,7 @@
           <p:cNvPr id="2" name="Title 1">
             <a:extLst>
               <a:ext uri="{FF2B5EF4-FFF2-40B4-BE49-F238E27FC236}">
-                <a16:creationId xmlns:a16="http://schemas.microsoft.com/office/drawing/2014/main" id="{C41C5319-249F-4F8B-AD76-A1ED4DBBA85D}"/>
+                <a16:creationId xmlns:a16="http://schemas.microsoft.com/office/drawing/2014/main" id="{7CCFB932-F1A0-458A-830D-3BBD6D4ACBAC}"/>
               </a:ext>
             </a:extLst>
           </p:cNvPr>
@@ -3382,7 +3608,7 @@
           <a:p>
             <a:r>
               <a:rPr lang="en-US" dirty="0"/>
-              <a:t>Time management metrics</a:t>
+              <a:t>Why use a time tracker summary/project management app?</a:t>
             </a:r>
           </a:p>
         </p:txBody>
@@ -3392,7 +3618,7 @@
           <p:cNvPr id="3" name="Content Placeholder 2">
             <a:extLst>
               <a:ext uri="{FF2B5EF4-FFF2-40B4-BE49-F238E27FC236}">
-                <a16:creationId xmlns:a16="http://schemas.microsoft.com/office/drawing/2014/main" id="{5FD2F8A0-9F57-454B-8B7D-6DA13D8466A6}"/>
+                <a16:creationId xmlns:a16="http://schemas.microsoft.com/office/drawing/2014/main" id="{5640F286-9FC2-4C24-9810-0AD9959C4F7C}"/>
               </a:ext>
             </a:extLst>
           </p:cNvPr>
@@ -3409,8 +3635,30 @@
           <a:lstStyle/>
           <a:p>
             <a:r>
-              <a:rPr lang="en-US" dirty="0"/>
-              <a:t>Doesn’t indicate how focused you were throughout the day/how often you checked Twitter</a:t>
+              <a:rPr lang="en-US" sz="2800" dirty="0"/>
+              <a:t>Tracking your time is only useful if you then go back and revisit it </a:t>
+            </a:r>
+            <a:r>
+              <a:rPr lang="en-US" sz="2800" dirty="0">
+                <a:solidFill>
+                  <a:schemeClr val="bg1">
+                    <a:lumMod val="50000"/>
+                  </a:schemeClr>
+                </a:solidFill>
+              </a:rPr>
+              <a:t>(except for the case of time tracking for billing purposes)</a:t>
+            </a:r>
+          </a:p>
+          <a:p>
+            <a:r>
+              <a:rPr lang="en-US" sz="2800" dirty="0"/>
+              <a:t>Useful for one on ones and project status updates</a:t>
+            </a:r>
+          </a:p>
+          <a:p>
+            <a:r>
+              <a:rPr lang="en-US" sz="2800" dirty="0"/>
+              <a:t>Sometimes useful for effort certification reports if your organization requires them</a:t>
             </a:r>
           </a:p>
         </p:txBody>
@@ -3418,7 +3666,7 @@
     </p:spTree>
     <p:extLst>
       <p:ext uri="{BB962C8B-B14F-4D97-AF65-F5344CB8AC3E}">
-        <p14:creationId xmlns:p14="http://schemas.microsoft.com/office/powerpoint/2010/main" val="3110883680"/>
+        <p14:creationId xmlns:p14="http://schemas.microsoft.com/office/powerpoint/2010/main" val="1628145875"/>
       </p:ext>
     </p:extLst>
   </p:cSld>
@@ -3450,7 +3698,7 @@
           <p:cNvPr id="2" name="Title 1">
             <a:extLst>
               <a:ext uri="{FF2B5EF4-FFF2-40B4-BE49-F238E27FC236}">
-                <a16:creationId xmlns:a16="http://schemas.microsoft.com/office/drawing/2014/main" id="{5E7732EB-DDF0-44B4-A87C-F05369D67F44}"/>
+                <a16:creationId xmlns:a16="http://schemas.microsoft.com/office/drawing/2014/main" id="{C41C5319-249F-4F8B-AD76-A1ED4DBBA85D}"/>
               </a:ext>
             </a:extLst>
           </p:cNvPr>
@@ -3468,7 +3716,47 @@
           <a:p>
             <a:r>
               <a:rPr lang="en-US" dirty="0"/>
-              <a:t>The app</a:t>
+              <a:t>Time management metrics</a:t>
+            </a:r>
+          </a:p>
+        </p:txBody>
+      </p:sp>
+      <p:sp>
+        <p:nvSpPr>
+          <p:cNvPr id="3" name="Content Placeholder 2">
+            <a:extLst>
+              <a:ext uri="{FF2B5EF4-FFF2-40B4-BE49-F238E27FC236}">
+                <a16:creationId xmlns:a16="http://schemas.microsoft.com/office/drawing/2014/main" id="{5FD2F8A0-9F57-454B-8B7D-6DA13D8466A6}"/>
+              </a:ext>
+            </a:extLst>
+          </p:cNvPr>
+          <p:cNvSpPr>
+            <a:spLocks noGrp="1"/>
+          </p:cNvSpPr>
+          <p:nvPr>
+            <p:ph idx="1"/>
+          </p:nvPr>
+        </p:nvSpPr>
+        <p:spPr/>
+        <p:txBody>
+          <a:bodyPr/>
+          <a:lstStyle/>
+          <a:p>
+            <a:r>
+              <a:rPr lang="en-US" dirty="0"/>
+              <a:t>Gives a breakdown of time spent per area of project by project and investigator</a:t>
+            </a:r>
+          </a:p>
+          <a:p>
+            <a:r>
+              <a:rPr lang="en-US" dirty="0"/>
+              <a:t>If investigator A is taking up 90% of your time, you want to know that</a:t>
+            </a:r>
+          </a:p>
+          <a:p>
+            <a:r>
+              <a:rPr lang="en-US" dirty="0"/>
+              <a:t>If an abstract took as long as a full analysis for a manuscript, you want to know that too</a:t>
             </a:r>
           </a:p>
         </p:txBody>
@@ -3476,7 +3764,7 @@
     </p:spTree>
     <p:extLst>
       <p:ext uri="{BB962C8B-B14F-4D97-AF65-F5344CB8AC3E}">
-        <p14:creationId xmlns:p14="http://schemas.microsoft.com/office/powerpoint/2010/main" val="1192983765"/>
+        <p14:creationId xmlns:p14="http://schemas.microsoft.com/office/powerpoint/2010/main" val="3110883680"/>
       </p:ext>
     </p:extLst>
   </p:cSld>
@@ -3508,7 +3796,7 @@
           <p:cNvPr id="2" name="Title 1">
             <a:extLst>
               <a:ext uri="{FF2B5EF4-FFF2-40B4-BE49-F238E27FC236}">
-                <a16:creationId xmlns:a16="http://schemas.microsoft.com/office/drawing/2014/main" id="{633F03C8-ABD3-4A00-AD80-087F21332873}"/>
+                <a16:creationId xmlns:a16="http://schemas.microsoft.com/office/drawing/2014/main" id="{7C0AAF0C-A9BA-41A6-A856-1A1CB3117341}"/>
               </a:ext>
             </a:extLst>
           </p:cNvPr>
@@ -3524,7 +3812,15 @@
           <a:bodyPr/>
           <a:lstStyle/>
           <a:p>
-            <a:endParaRPr lang="en-US" dirty="0"/>
+            <a:r>
+              <a:rPr lang="en-US" dirty="0"/>
+              <a:t>Information gleaned from </a:t>
+            </a:r>
+            <a:r>
+              <a:rPr lang="en-US" i="1" dirty="0" err="1"/>
+              <a:t>timetrackR</a:t>
+            </a:r>
+            <a:endParaRPr lang="en-US" i="1" dirty="0"/>
           </a:p>
         </p:txBody>
       </p:sp>
@@ -3533,7 +3829,7 @@
           <p:cNvPr id="3" name="Content Placeholder 2">
             <a:extLst>
               <a:ext uri="{FF2B5EF4-FFF2-40B4-BE49-F238E27FC236}">
-                <a16:creationId xmlns:a16="http://schemas.microsoft.com/office/drawing/2014/main" id="{D263E9DF-7C0F-4369-8FD3-EEA6C90D66F0}"/>
+                <a16:creationId xmlns:a16="http://schemas.microsoft.com/office/drawing/2014/main" id="{9DC865FE-2769-467A-9247-2E19D7FFD882}"/>
               </a:ext>
             </a:extLst>
           </p:cNvPr>
@@ -3549,17 +3845,14 @@
           <a:bodyPr/>
           <a:lstStyle/>
           <a:p>
-            <a:r>
-              <a:rPr lang="en-US" dirty="0"/>
-              <a:t>This is only useful if you track your time</a:t>
-            </a:r>
+            <a:endParaRPr lang="en-US" dirty="0"/>
           </a:p>
         </p:txBody>
       </p:sp>
     </p:spTree>
     <p:extLst>
       <p:ext uri="{BB962C8B-B14F-4D97-AF65-F5344CB8AC3E}">
-        <p14:creationId xmlns:p14="http://schemas.microsoft.com/office/powerpoint/2010/main" val="2875116697"/>
+        <p14:creationId xmlns:p14="http://schemas.microsoft.com/office/powerpoint/2010/main" val="2022793432"/>
       </p:ext>
     </p:extLst>
   </p:cSld>
@@ -3591,7 +3884,7 @@
           <p:cNvPr id="2" name="Title 1">
             <a:extLst>
               <a:ext uri="{FF2B5EF4-FFF2-40B4-BE49-F238E27FC236}">
-                <a16:creationId xmlns:a16="http://schemas.microsoft.com/office/drawing/2014/main" id="{8B4B5790-0EA7-4012-93A7-22425D41E1E3}"/>
+                <a16:creationId xmlns:a16="http://schemas.microsoft.com/office/drawing/2014/main" id="{5E7732EB-DDF0-44B4-A87C-F05369D67F44}"/>
               </a:ext>
             </a:extLst>
           </p:cNvPr>
@@ -3609,35 +3902,7 @@
           <a:p>
             <a:r>
               <a:rPr lang="en-US" dirty="0"/>
-              <a:t>Future plans</a:t>
-            </a:r>
-          </a:p>
-        </p:txBody>
-      </p:sp>
-      <p:sp>
-        <p:nvSpPr>
-          <p:cNvPr id="3" name="Content Placeholder 2">
-            <a:extLst>
-              <a:ext uri="{FF2B5EF4-FFF2-40B4-BE49-F238E27FC236}">
-                <a16:creationId xmlns:a16="http://schemas.microsoft.com/office/drawing/2014/main" id="{4851F475-9DB2-4FC0-B370-DDE4324E134A}"/>
-              </a:ext>
-            </a:extLst>
-          </p:cNvPr>
-          <p:cNvSpPr>
-            <a:spLocks noGrp="1"/>
-          </p:cNvSpPr>
-          <p:nvPr>
-            <p:ph idx="1"/>
-          </p:nvPr>
-        </p:nvSpPr>
-        <p:spPr/>
-        <p:txBody>
-          <a:bodyPr/>
-          <a:lstStyle/>
-          <a:p>
-            <a:r>
-              <a:rPr lang="en-US" dirty="0"/>
-              <a:t>Update to automate report for monthly one on ones</a:t>
+              <a:t>The app</a:t>
             </a:r>
           </a:p>
         </p:txBody>
@@ -3645,7 +3910,7 @@
     </p:spTree>
     <p:extLst>
       <p:ext uri="{BB962C8B-B14F-4D97-AF65-F5344CB8AC3E}">
-        <p14:creationId xmlns:p14="http://schemas.microsoft.com/office/powerpoint/2010/main" val="1128304148"/>
+        <p14:creationId xmlns:p14="http://schemas.microsoft.com/office/powerpoint/2010/main" val="1192983765"/>
       </p:ext>
     </p:extLst>
   </p:cSld>
@@ -3677,7 +3942,7 @@
           <p:cNvPr id="2" name="Title 1">
             <a:extLst>
               <a:ext uri="{FF2B5EF4-FFF2-40B4-BE49-F238E27FC236}">
-                <a16:creationId xmlns:a16="http://schemas.microsoft.com/office/drawing/2014/main" id="{CFD1A390-01F3-41EC-A21A-C0F8AE22ED16}"/>
+                <a16:creationId xmlns:a16="http://schemas.microsoft.com/office/drawing/2014/main" id="{633F03C8-ABD3-4A00-AD80-087F21332873}"/>
               </a:ext>
             </a:extLst>
           </p:cNvPr>
@@ -3695,7 +3960,7 @@
           <a:p>
             <a:r>
               <a:rPr lang="en-US" dirty="0"/>
-              <a:t>References</a:t>
+              <a:t>Caveats</a:t>
             </a:r>
           </a:p>
         </p:txBody>
@@ -3705,7 +3970,7 @@
           <p:cNvPr id="3" name="Content Placeholder 2">
             <a:extLst>
               <a:ext uri="{FF2B5EF4-FFF2-40B4-BE49-F238E27FC236}">
-                <a16:creationId xmlns:a16="http://schemas.microsoft.com/office/drawing/2014/main" id="{525BAE00-D3F8-479E-BD2A-2045BF753653}"/>
+                <a16:creationId xmlns:a16="http://schemas.microsoft.com/office/drawing/2014/main" id="{D263E9DF-7C0F-4369-8FD3-EEA6C90D66F0}"/>
               </a:ext>
             </a:extLst>
           </p:cNvPr>
@@ -3722,23 +3987,125 @@
           <a:lstStyle/>
           <a:p>
             <a:r>
-              <a:rPr lang="en-US" sz="2800" dirty="0"/>
-              <a:t>GitHub: </a:t>
-            </a:r>
-            <a:r>
-              <a:rPr lang="en-US" sz="2800" dirty="0">
-                <a:hlinkClick r:id="rId2"/>
-              </a:rPr>
-              <a:t>https://github.com/jalavery/proj_mgmnt</a:t>
-            </a:r>
-            <a:endParaRPr lang="en-US" sz="2800" dirty="0"/>
+              <a:rPr lang="en-US" dirty="0"/>
+              <a:t>The obvious: this is only useful if you track your time</a:t>
+            </a:r>
+          </a:p>
+          <a:p>
+            <a:r>
+              <a:rPr lang="en-US" dirty="0"/>
+              <a:t>Entirely retrospective, it’s a summary of what you’ve done, doesn’t include projected time allocations</a:t>
+            </a:r>
           </a:p>
         </p:txBody>
       </p:sp>
     </p:spTree>
     <p:extLst>
       <p:ext uri="{BB962C8B-B14F-4D97-AF65-F5344CB8AC3E}">
-        <p14:creationId xmlns:p14="http://schemas.microsoft.com/office/powerpoint/2010/main" val="1075239667"/>
+        <p14:creationId xmlns:p14="http://schemas.microsoft.com/office/powerpoint/2010/main" val="2875116697"/>
+      </p:ext>
+    </p:extLst>
+  </p:cSld>
+  <p:clrMapOvr>
+    <a:masterClrMapping/>
+  </p:clrMapOvr>
+</p:sld>
+</file>
+
+<file path=ppt/slides/slide9.xml><?xml version="1.0" encoding="utf-8"?>
+<p:sld xmlns:a="http://schemas.openxmlformats.org/drawingml/2006/main" xmlns:r="http://schemas.openxmlformats.org/officeDocument/2006/relationships" xmlns:p="http://schemas.openxmlformats.org/presentationml/2006/main">
+  <p:cSld>
+    <p:spTree>
+      <p:nvGrpSpPr>
+        <p:cNvPr id="1" name=""/>
+        <p:cNvGrpSpPr/>
+        <p:nvPr/>
+      </p:nvGrpSpPr>
+      <p:grpSpPr>
+        <a:xfrm>
+          <a:off x="0" y="0"/>
+          <a:ext cx="0" cy="0"/>
+          <a:chOff x="0" y="0"/>
+          <a:chExt cx="0" cy="0"/>
+        </a:xfrm>
+      </p:grpSpPr>
+      <p:sp>
+        <p:nvSpPr>
+          <p:cNvPr id="2" name="Title 1">
+            <a:extLst>
+              <a:ext uri="{FF2B5EF4-FFF2-40B4-BE49-F238E27FC236}">
+                <a16:creationId xmlns:a16="http://schemas.microsoft.com/office/drawing/2014/main" id="{61CD5D77-E3C4-4FBF-8330-3DEFB2FC3626}"/>
+              </a:ext>
+            </a:extLst>
+          </p:cNvPr>
+          <p:cNvSpPr>
+            <a:spLocks noGrp="1"/>
+          </p:cNvSpPr>
+          <p:nvPr>
+            <p:ph type="title"/>
+          </p:nvPr>
+        </p:nvSpPr>
+        <p:spPr/>
+        <p:txBody>
+          <a:bodyPr/>
+          <a:lstStyle/>
+          <a:p>
+            <a:r>
+              <a:rPr lang="en-US" dirty="0"/>
+              <a:t>Adapting the app for your own use</a:t>
+            </a:r>
+          </a:p>
+        </p:txBody>
+      </p:sp>
+      <p:sp>
+        <p:nvSpPr>
+          <p:cNvPr id="3" name="Content Placeholder 2">
+            <a:extLst>
+              <a:ext uri="{FF2B5EF4-FFF2-40B4-BE49-F238E27FC236}">
+                <a16:creationId xmlns:a16="http://schemas.microsoft.com/office/drawing/2014/main" id="{BF5C20CB-2264-42BE-90A9-6CD9BBDD303F}"/>
+              </a:ext>
+            </a:extLst>
+          </p:cNvPr>
+          <p:cNvSpPr>
+            <a:spLocks noGrp="1"/>
+          </p:cNvSpPr>
+          <p:nvPr>
+            <p:ph idx="1"/>
+          </p:nvPr>
+        </p:nvSpPr>
+        <p:spPr/>
+        <p:txBody>
+          <a:bodyPr/>
+          <a:lstStyle/>
+          <a:p>
+            <a:r>
+              <a:rPr lang="en-US" dirty="0"/>
+              <a:t>Can track whichever components of your time you’re interested in</a:t>
+            </a:r>
+          </a:p>
+          <a:p>
+            <a:r>
+              <a:rPr lang="en-US" dirty="0"/>
+              <a:t>Can be used to summarize “current” time (active projects) or view long-term project trajectories</a:t>
+            </a:r>
+          </a:p>
+          <a:p>
+            <a:r>
+              <a:rPr lang="en-US" dirty="0"/>
+              <a:t>Change </a:t>
+            </a:r>
+            <a:r>
+              <a:rPr lang="en-US"/>
+              <a:t>the deliverable ??</a:t>
+            </a:r>
+            <a:endParaRPr lang="en-US" dirty="0"/>
+          </a:p>
+        </p:txBody>
+      </p:sp>
+    </p:spTree>
+    <p:extLst>
+      <p:ext uri="{BB962C8B-B14F-4D97-AF65-F5344CB8AC3E}">
+        <p14:creationId xmlns:p14="http://schemas.microsoft.com/office/powerpoint/2010/main" val="2232906021"/>
       </p:ext>
     </p:extLst>
   </p:cSld>
@@ -4074,6 +4441,26 @@
 </file>
 
 <file path=customXml/item1.xml><?xml version="1.0" encoding="utf-8"?>
+<?mso-contentType ?>
+<FormTemplates xmlns="http://schemas.microsoft.com/sharepoint/v3/contenttype/forms">
+  <Display>DocumentLibraryForm</Display>
+  <Edit>DocumentLibraryForm</Edit>
+  <New>DocumentLibraryForm</New>
+</FormTemplates>
+</file>
+
+<file path=customXml/item2.xml><?xml version="1.0" encoding="utf-8"?>
+<p:properties xmlns:p="http://schemas.microsoft.com/office/2006/metadata/properties" xmlns:xsi="http://www.w3.org/2001/XMLSchema-instance" xmlns:pc="http://schemas.microsoft.com/office/infopath/2007/PartnerControls">
+  <documentManagement>
+    <ImageCreateDate xmlns="E64CF27C-2ECC-48E8-947E-CA63274FB2E8" xsi:nil="true"/>
+    <PublishingExpirationDate xmlns="http://schemas.microsoft.com/sharepoint/v3" xsi:nil="true"/>
+    <PublishingStartDate xmlns="http://schemas.microsoft.com/sharepoint/v3" xsi:nil="true"/>
+    <wic_System_Copyright xmlns="http://schemas.microsoft.com/sharepoint/v3/fields" xsi:nil="true"/>
+  </documentManagement>
+</p:properties>
+</file>
+
+<file path=customXml/item3.xml><?xml version="1.0" encoding="utf-8"?>
 <ct:contentTypeSchema xmlns:ct="http://schemas.microsoft.com/office/2006/metadata/contentType" xmlns:ma="http://schemas.microsoft.com/office/2006/metadata/properties/metaAttributes" ct:_="" ma:_="" ma:contentTypeName="Image" ma:contentTypeID="0x0101009148F5A04DDD49CBA7127AADA5FB792B00AADE34325A8B49CDA8BB4DB53328F214008DA1A4150FB2B848A3EB7B452BFA7AC5" ma:contentTypeVersion="1" ma:contentTypeDescription="Upload an image." ma:contentTypeScope="" ma:versionID="c5dd4a19140d82efd42bf2e2156fee3e">
   <xsd:schema xmlns:xsd="http://www.w3.org/2001/XMLSchema" xmlns:xs="http://www.w3.org/2001/XMLSchema" xmlns:p="http://schemas.microsoft.com/office/2006/metadata/properties" xmlns:ns1="http://schemas.microsoft.com/sharepoint/v3" xmlns:ns2="E64CF27C-2ECC-48E8-947E-CA63274FB2E8" xmlns:ns3="http://schemas.microsoft.com/sharepoint/v3/fields" targetNamespace="http://schemas.microsoft.com/office/2006/metadata/properties" ma:root="true" ma:fieldsID="8669bc30feb5185623fa09da941496e2" ns1:_="" ns2:_="" ns3:_="">
     <xsd:import namespace="http://schemas.microsoft.com/sharepoint/v3"/>
@@ -4275,42 +4662,10 @@
 </ct:contentTypeSchema>
 </file>
 
-<file path=customXml/item2.xml><?xml version="1.0" encoding="utf-8"?>
-<p:properties xmlns:p="http://schemas.microsoft.com/office/2006/metadata/properties" xmlns:xsi="http://www.w3.org/2001/XMLSchema-instance" xmlns:pc="http://schemas.microsoft.com/office/infopath/2007/PartnerControls">
-  <documentManagement>
-    <ImageCreateDate xmlns="E64CF27C-2ECC-48E8-947E-CA63274FB2E8" xsi:nil="true"/>
-    <PublishingExpirationDate xmlns="http://schemas.microsoft.com/sharepoint/v3" xsi:nil="true"/>
-    <PublishingStartDate xmlns="http://schemas.microsoft.com/sharepoint/v3" xsi:nil="true"/>
-    <wic_System_Copyright xmlns="http://schemas.microsoft.com/sharepoint/v3/fields" xsi:nil="true"/>
-  </documentManagement>
-</p:properties>
-</file>
-
-<file path=customXml/item3.xml><?xml version="1.0" encoding="utf-8"?>
-<?mso-contentType ?>
-<FormTemplates xmlns="http://schemas.microsoft.com/sharepoint/v3/contenttype/forms">
-  <Display>DocumentLibraryForm</Display>
-  <Edit>DocumentLibraryForm</Edit>
-  <New>DocumentLibraryForm</New>
-</FormTemplates>
-</file>
-
 <file path=customXml/itemProps1.xml><?xml version="1.0" encoding="utf-8"?>
-<ds:datastoreItem xmlns:ds="http://schemas.openxmlformats.org/officeDocument/2006/customXml" ds:itemID="{E57EBD8B-EA50-4231-9F03-F9188E4066E3}">
+<ds:datastoreItem xmlns:ds="http://schemas.openxmlformats.org/officeDocument/2006/customXml" ds:itemID="{B01F69EB-AD96-4AD6-8A18-0C8728F5F031}">
   <ds:schemaRefs>
-    <ds:schemaRef ds:uri="http://schemas.microsoft.com/office/2006/metadata/contentType"/>
-    <ds:schemaRef ds:uri="http://schemas.microsoft.com/office/2006/metadata/properties/metaAttributes"/>
-    <ds:schemaRef ds:uri="http://www.w3.org/2001/XMLSchema"/>
-    <ds:schemaRef ds:uri="http://schemas.microsoft.com/office/2006/metadata/properties"/>
-    <ds:schemaRef ds:uri="http://schemas.microsoft.com/sharepoint/v3"/>
-    <ds:schemaRef ds:uri="E64CF27C-2ECC-48E8-947E-CA63274FB2E8"/>
-    <ds:schemaRef ds:uri="http://schemas.microsoft.com/sharepoint/v3/fields"/>
-    <ds:schemaRef ds:uri="http://schemas.microsoft.com/office/2006/documentManagement/types"/>
-    <ds:schemaRef ds:uri="http://schemas.microsoft.com/office/infopath/2007/PartnerControls"/>
-    <ds:schemaRef ds:uri="http://schemas.openxmlformats.org/package/2006/metadata/core-properties"/>
-    <ds:schemaRef ds:uri="http://purl.org/dc/elements/1.1/"/>
-    <ds:schemaRef ds:uri="http://purl.org/dc/terms/"/>
-    <ds:schemaRef ds:uri="http://schemas.microsoft.com/internal/obd"/>
+    <ds:schemaRef ds:uri="http://schemas.microsoft.com/sharepoint/v3/contenttype/forms"/>
   </ds:schemaRefs>
 </ds:datastoreItem>
 </file>
@@ -4334,9 +4689,21 @@
 </file>
 
 <file path=customXml/itemProps3.xml><?xml version="1.0" encoding="utf-8"?>
-<ds:datastoreItem xmlns:ds="http://schemas.openxmlformats.org/officeDocument/2006/customXml" ds:itemID="{B01F69EB-AD96-4AD6-8A18-0C8728F5F031}">
+<ds:datastoreItem xmlns:ds="http://schemas.openxmlformats.org/officeDocument/2006/customXml" ds:itemID="{E57EBD8B-EA50-4231-9F03-F9188E4066E3}">
   <ds:schemaRefs>
-    <ds:schemaRef ds:uri="http://schemas.microsoft.com/sharepoint/v3/contenttype/forms"/>
+    <ds:schemaRef ds:uri="http://schemas.microsoft.com/office/2006/metadata/contentType"/>
+    <ds:schemaRef ds:uri="http://schemas.microsoft.com/office/2006/metadata/properties/metaAttributes"/>
+    <ds:schemaRef ds:uri="http://www.w3.org/2001/XMLSchema"/>
+    <ds:schemaRef ds:uri="http://schemas.microsoft.com/office/2006/metadata/properties"/>
+    <ds:schemaRef ds:uri="http://schemas.microsoft.com/sharepoint/v3"/>
+    <ds:schemaRef ds:uri="E64CF27C-2ECC-48E8-947E-CA63274FB2E8"/>
+    <ds:schemaRef ds:uri="http://schemas.microsoft.com/sharepoint/v3/fields"/>
+    <ds:schemaRef ds:uri="http://schemas.microsoft.com/office/2006/documentManagement/types"/>
+    <ds:schemaRef ds:uri="http://schemas.microsoft.com/office/infopath/2007/PartnerControls"/>
+    <ds:schemaRef ds:uri="http://schemas.openxmlformats.org/package/2006/metadata/core-properties"/>
+    <ds:schemaRef ds:uri="http://purl.org/dc/elements/1.1/"/>
+    <ds:schemaRef ds:uri="http://purl.org/dc/terms/"/>
+    <ds:schemaRef ds:uri="http://schemas.microsoft.com/internal/obd"/>
   </ds:schemaRefs>
 </ds:datastoreItem>
 </file>
</xml_diff>

<commit_message>
Work through updates in server.R to reflect new variable names/reduced # variables, clean up code
</commit_message>
<xml_diff>
--- a/Project management shiny app presentation.pptx
+++ b/Project management shiny app presentation.pptx
@@ -7,15 +7,19 @@
   <p:sldIdLst>
     <p:sldId id="256" r:id="rId5"/>
     <p:sldId id="265" r:id="rId6"/>
-    <p:sldId id="257" r:id="rId7"/>
-    <p:sldId id="258" r:id="rId8"/>
-    <p:sldId id="260" r:id="rId9"/>
-    <p:sldId id="266" r:id="rId10"/>
-    <p:sldId id="259" r:id="rId11"/>
+    <p:sldId id="258" r:id="rId7"/>
+    <p:sldId id="257" r:id="rId8"/>
+    <p:sldId id="259" r:id="rId9"/>
+    <p:sldId id="260" r:id="rId10"/>
+    <p:sldId id="266" r:id="rId11"/>
     <p:sldId id="262" r:id="rId12"/>
     <p:sldId id="264" r:id="rId13"/>
-    <p:sldId id="263" r:id="rId14"/>
-    <p:sldId id="261" r:id="rId15"/>
+    <p:sldId id="274" r:id="rId14"/>
+    <p:sldId id="275" r:id="rId15"/>
+    <p:sldId id="267" r:id="rId16"/>
+    <p:sldId id="263" r:id="rId17"/>
+    <p:sldId id="261" r:id="rId18"/>
+    <p:sldId id="273" r:id="rId19"/>
   </p:sldIdLst>
   <p:sldSz cx="9144000" cy="6858000" type="screen4x3"/>
   <p:notesSz cx="6858000" cy="9144000"/>
@@ -2215,17 +2219,17 @@
           </a:ln>
           <a:extLst>
             <a:ext uri="{FAA26D3D-D897-4be2-8F04-BA451C77F1D7}">
-              <ma14:placeholderFlag xmlns="" xmlns:ma14="http://schemas.microsoft.com/office/mac/drawingml/2011/main" val="1"/>
+              <ma14:placeholderFlag xmlns:ma14="http://schemas.microsoft.com/office/mac/drawingml/2011/main" xmlns="" val="1"/>
             </a:ext>
             <a:ext uri="{909E8E84-426E-40dd-AFC4-6F175D3DCCD1}">
-              <a14:hiddenFill xmlns="" xmlns:a14="http://schemas.microsoft.com/office/drawing/2010/main">
+              <a14:hiddenFill xmlns:a14="http://schemas.microsoft.com/office/drawing/2010/main" xmlns="">
                 <a:solidFill>
                   <a:srgbClr val="FFFFFF"/>
                 </a:solidFill>
               </a14:hiddenFill>
             </a:ext>
             <a:ext uri="{91240B29-F687-4f45-9708-019B960494DF}">
-              <a14:hiddenLine xmlns="" xmlns:a14="http://schemas.microsoft.com/office/drawing/2010/main" w="9525">
+              <a14:hiddenLine xmlns:a14="http://schemas.microsoft.com/office/drawing/2010/main" xmlns="" w="9525">
                 <a:solidFill>
                   <a:srgbClr val="000000"/>
                 </a:solidFill>
@@ -2277,17 +2281,17 @@
           </a:ln>
           <a:extLst>
             <a:ext uri="{FAA26D3D-D897-4be2-8F04-BA451C77F1D7}">
-              <ma14:placeholderFlag xmlns="" xmlns:ma14="http://schemas.microsoft.com/office/mac/drawingml/2011/main" val="1"/>
+              <ma14:placeholderFlag xmlns:ma14="http://schemas.microsoft.com/office/mac/drawingml/2011/main" xmlns="" val="1"/>
             </a:ext>
             <a:ext uri="{909E8E84-426E-40dd-AFC4-6F175D3DCCD1}">
-              <a14:hiddenFill xmlns="" xmlns:a14="http://schemas.microsoft.com/office/drawing/2010/main">
+              <a14:hiddenFill xmlns:a14="http://schemas.microsoft.com/office/drawing/2010/main" xmlns="">
                 <a:solidFill>
                   <a:srgbClr val="FFFFFF"/>
                 </a:solidFill>
               </a14:hiddenFill>
             </a:ext>
             <a:ext uri="{91240B29-F687-4f45-9708-019B960494DF}">
-              <a14:hiddenLine xmlns="" xmlns:a14="http://schemas.microsoft.com/office/drawing/2010/main" w="9525">
+              <a14:hiddenLine xmlns:a14="http://schemas.microsoft.com/office/drawing/2010/main" xmlns="" w="9525">
                 <a:solidFill>
                   <a:srgbClr val="000000"/>
                 </a:solidFill>
@@ -3005,7 +3009,7 @@
               <a:t>It’s Time to Shine with the </a:t>
             </a:r>
             <a:r>
-              <a:rPr lang="en-US" dirty="0" err="1">
+              <a:rPr lang="en-US" i="1" dirty="0" err="1">
                 <a:latin typeface="Arial" charset="0"/>
                 <a:ea typeface="Arial" charset="0"/>
                 <a:cs typeface="Arial" charset="0"/>
@@ -3040,20 +3044,17 @@
           </a:xfrm>
         </p:spPr>
         <p:txBody>
-          <a:bodyPr/>
+          <a:bodyPr anchor="b">
+            <a:normAutofit/>
+          </a:bodyPr>
           <a:lstStyle/>
           <a:p>
+            <a:endParaRPr lang="en-US" dirty="0"/>
+          </a:p>
+          <a:p>
             <a:r>
               <a:rPr lang="en-US" dirty="0"/>
-              <a:t>Date (Arial 18 </a:t>
-            </a:r>
-            <a:r>
-              <a:rPr lang="en-US" dirty="0" err="1"/>
-              <a:t>pt</a:t>
-            </a:r>
-            <a:r>
-              <a:rPr lang="en-US" dirty="0"/>
-              <a:t>)</a:t>
+              <a:t>February 26, 2020</a:t>
             </a:r>
           </a:p>
           <a:p>
@@ -3065,28 +3066,7 @@
           <a:p>
             <a:r>
               <a:rPr lang="en-US" dirty="0"/>
-              <a:t>Research Biostatistician</a:t>
-            </a:r>
-          </a:p>
-          <a:p>
-            <a:r>
-              <a:rPr lang="en-US" dirty="0">
-                <a:hlinkClick r:id="rId2"/>
-              </a:rPr>
-              <a:t>www.mskcc.org</a:t>
-            </a:r>
-            <a:endParaRPr lang="en-US" dirty="0"/>
-          </a:p>
-          <a:p>
-            <a:r>
-              <a:rPr lang="en-US" dirty="0">
-                <a:hlinkClick r:id="rId3"/>
-              </a:rPr>
-              <a:t>www.jessicalavery.com</a:t>
-            </a:r>
-            <a:r>
-              <a:rPr lang="en-US" dirty="0"/>
-              <a:t> </a:t>
+              <a:t>Biostatistician</a:t>
             </a:r>
           </a:p>
         </p:txBody>
@@ -3136,6 +3116,53 @@
           </a:p>
         </p:txBody>
       </p:sp>
+      <p:pic>
+        <p:nvPicPr>
+          <p:cNvPr id="2050" name="Picture 2" descr="Image result for rladies nyc logo">
+            <a:extLst>
+              <a:ext uri="{FF2B5EF4-FFF2-40B4-BE49-F238E27FC236}">
+                <a16:creationId xmlns:a16="http://schemas.microsoft.com/office/drawing/2014/main" id="{1E5D7981-F7D3-4214-9E7F-88B679A8FC43}"/>
+              </a:ext>
+            </a:extLst>
+          </p:cNvPr>
+          <p:cNvPicPr>
+            <a:picLocks noChangeAspect="1" noChangeArrowheads="1"/>
+          </p:cNvPicPr>
+          <p:nvPr/>
+        </p:nvPicPr>
+        <p:blipFill>
+          <a:blip r:embed="rId2">
+            <a:extLst>
+              <a:ext uri="{28A0092B-C50C-407E-A947-70E740481C1C}">
+                <a14:useLocalDpi xmlns:a14="http://schemas.microsoft.com/office/drawing/2010/main" val="0"/>
+              </a:ext>
+            </a:extLst>
+          </a:blip>
+          <a:srcRect/>
+          <a:stretch>
+            <a:fillRect/>
+          </a:stretch>
+        </p:blipFill>
+        <p:spPr bwMode="auto">
+          <a:xfrm>
+            <a:off x="6484938" y="4173818"/>
+            <a:ext cx="1719742" cy="1990165"/>
+          </a:xfrm>
+          <a:prstGeom prst="rect">
+            <a:avLst/>
+          </a:prstGeom>
+          <a:noFill/>
+          <a:extLst>
+            <a:ext uri="{909E8E84-426E-40DD-AFC4-6F175D3DCCD1}">
+              <a14:hiddenFill xmlns:a14="http://schemas.microsoft.com/office/drawing/2010/main">
+                <a:solidFill>
+                  <a:srgbClr val="FFFFFF"/>
+                </a:solidFill>
+              </a14:hiddenFill>
+            </a:ext>
+          </a:extLst>
+        </p:spPr>
+      </p:pic>
     </p:spTree>
   </p:cSld>
   <p:clrMapOvr>
@@ -3166,7 +3193,7 @@
           <p:cNvPr id="2" name="Title 1">
             <a:extLst>
               <a:ext uri="{FF2B5EF4-FFF2-40B4-BE49-F238E27FC236}">
-                <a16:creationId xmlns:a16="http://schemas.microsoft.com/office/drawing/2014/main" id="{8B4B5790-0EA7-4012-93A7-22425D41E1E3}"/>
+                <a16:creationId xmlns:a16="http://schemas.microsoft.com/office/drawing/2014/main" id="{66C5FB7E-AA55-4632-9059-CCAD4F92CBDB}"/>
               </a:ext>
             </a:extLst>
           </p:cNvPr>
@@ -3184,7 +3211,7 @@
           <a:p>
             <a:r>
               <a:rPr lang="en-US" dirty="0"/>
-              <a:t>Future plans</a:t>
+              <a:t>CODE</a:t>
             </a:r>
           </a:p>
         </p:txBody>
@@ -3194,7 +3221,7 @@
           <p:cNvPr id="3" name="Content Placeholder 2">
             <a:extLst>
               <a:ext uri="{FF2B5EF4-FFF2-40B4-BE49-F238E27FC236}">
-                <a16:creationId xmlns:a16="http://schemas.microsoft.com/office/drawing/2014/main" id="{4851F475-9DB2-4FC0-B370-DDE4324E134A}"/>
+                <a16:creationId xmlns:a16="http://schemas.microsoft.com/office/drawing/2014/main" id="{4BB3C2CE-16FB-48DF-A561-01920B9984E5}"/>
               </a:ext>
             </a:extLst>
           </p:cNvPr>
@@ -3212,15 +3239,92 @@
           <a:p>
             <a:r>
               <a:rPr lang="en-US" dirty="0"/>
-              <a:t>Incorporate with toggle app to automate a portion of the tracking</a:t>
-            </a:r>
-          </a:p>
-        </p:txBody>
-      </p:sp>
+              <a:t>Excel spreadsheet setup</a:t>
+            </a:r>
+          </a:p>
+        </p:txBody>
+      </p:sp>
+      <p:pic>
+        <p:nvPicPr>
+          <p:cNvPr id="3074" name="Picture 2" descr="Image result for ms excel">
+            <a:extLst>
+              <a:ext uri="{FF2B5EF4-FFF2-40B4-BE49-F238E27FC236}">
+                <a16:creationId xmlns:a16="http://schemas.microsoft.com/office/drawing/2014/main" id="{4D13D626-68E4-45B8-9FC4-A81965D936BB}"/>
+              </a:ext>
+            </a:extLst>
+          </p:cNvPr>
+          <p:cNvPicPr>
+            <a:picLocks noChangeAspect="1" noChangeArrowheads="1"/>
+          </p:cNvPicPr>
+          <p:nvPr/>
+        </p:nvPicPr>
+        <p:blipFill>
+          <a:blip r:embed="rId2">
+            <a:extLst>
+              <a:ext uri="{28A0092B-C50C-407E-A947-70E740481C1C}">
+                <a14:useLocalDpi xmlns:a14="http://schemas.microsoft.com/office/drawing/2010/main" val="0"/>
+              </a:ext>
+            </a:extLst>
+          </a:blip>
+          <a:srcRect/>
+          <a:stretch>
+            <a:fillRect/>
+          </a:stretch>
+        </p:blipFill>
+        <p:spPr bwMode="auto">
+          <a:xfrm>
+            <a:off x="1104340" y="2345952"/>
+            <a:ext cx="1771650" cy="1771650"/>
+          </a:xfrm>
+          <a:prstGeom prst="rect">
+            <a:avLst/>
+          </a:prstGeom>
+          <a:noFill/>
+          <a:extLst>
+            <a:ext uri="{909E8E84-426E-40DD-AFC4-6F175D3DCCD1}">
+              <a14:hiddenFill xmlns:a14="http://schemas.microsoft.com/office/drawing/2010/main">
+                <a:solidFill>
+                  <a:srgbClr val="FFFFFF"/>
+                </a:solidFill>
+              </a14:hiddenFill>
+            </a:ext>
+          </a:extLst>
+        </p:spPr>
+      </p:pic>
+      <p:pic>
+        <p:nvPicPr>
+          <p:cNvPr id="5" name="Picture 4">
+            <a:extLst>
+              <a:ext uri="{FF2B5EF4-FFF2-40B4-BE49-F238E27FC236}">
+                <a16:creationId xmlns:a16="http://schemas.microsoft.com/office/drawing/2014/main" id="{2885F98E-6D86-4EAC-B4D4-D11E3A1090A6}"/>
+              </a:ext>
+            </a:extLst>
+          </p:cNvPr>
+          <p:cNvPicPr>
+            <a:picLocks noChangeAspect="1"/>
+          </p:cNvPicPr>
+          <p:nvPr/>
+        </p:nvPicPr>
+        <p:blipFill>
+          <a:blip r:embed="rId3"/>
+          <a:stretch>
+            <a:fillRect/>
+          </a:stretch>
+        </p:blipFill>
+        <p:spPr>
+          <a:xfrm>
+            <a:off x="4716137" y="2528045"/>
+            <a:ext cx="3359382" cy="1179681"/>
+          </a:xfrm>
+          <a:prstGeom prst="rect">
+            <a:avLst/>
+          </a:prstGeom>
+        </p:spPr>
+      </p:pic>
     </p:spTree>
     <p:extLst>
       <p:ext uri="{BB962C8B-B14F-4D97-AF65-F5344CB8AC3E}">
-        <p14:creationId xmlns:p14="http://schemas.microsoft.com/office/powerpoint/2010/main" val="1128304148"/>
+        <p14:creationId xmlns:p14="http://schemas.microsoft.com/office/powerpoint/2010/main" val="2504891058"/>
       </p:ext>
     </p:extLst>
   </p:cSld>
@@ -3252,6 +3356,424 @@
           <p:cNvPr id="2" name="Title 1">
             <a:extLst>
               <a:ext uri="{FF2B5EF4-FFF2-40B4-BE49-F238E27FC236}">
+                <a16:creationId xmlns:a16="http://schemas.microsoft.com/office/drawing/2014/main" id="{66C5FB7E-AA55-4632-9059-CCAD4F92CBDB}"/>
+              </a:ext>
+            </a:extLst>
+          </p:cNvPr>
+          <p:cNvSpPr>
+            <a:spLocks noGrp="1"/>
+          </p:cNvSpPr>
+          <p:nvPr>
+            <p:ph type="title"/>
+          </p:nvPr>
+        </p:nvSpPr>
+        <p:spPr/>
+        <p:txBody>
+          <a:bodyPr/>
+          <a:lstStyle/>
+          <a:p>
+            <a:r>
+              <a:rPr lang="en-US" dirty="0"/>
+              <a:t>CODE</a:t>
+            </a:r>
+          </a:p>
+        </p:txBody>
+      </p:sp>
+      <p:sp>
+        <p:nvSpPr>
+          <p:cNvPr id="3" name="Content Placeholder 2">
+            <a:extLst>
+              <a:ext uri="{FF2B5EF4-FFF2-40B4-BE49-F238E27FC236}">
+                <a16:creationId xmlns:a16="http://schemas.microsoft.com/office/drawing/2014/main" id="{4BB3C2CE-16FB-48DF-A561-01920B9984E5}"/>
+              </a:ext>
+            </a:extLst>
+          </p:cNvPr>
+          <p:cNvSpPr>
+            <a:spLocks noGrp="1"/>
+          </p:cNvSpPr>
+          <p:nvPr>
+            <p:ph idx="1"/>
+          </p:nvPr>
+        </p:nvSpPr>
+        <p:spPr/>
+        <p:txBody>
+          <a:bodyPr/>
+          <a:lstStyle/>
+          <a:p>
+            <a:endParaRPr lang="en-US"/>
+          </a:p>
+        </p:txBody>
+      </p:sp>
+    </p:spTree>
+    <p:extLst>
+      <p:ext uri="{BB962C8B-B14F-4D97-AF65-F5344CB8AC3E}">
+        <p14:creationId xmlns:p14="http://schemas.microsoft.com/office/powerpoint/2010/main" val="3113239172"/>
+      </p:ext>
+    </p:extLst>
+  </p:cSld>
+  <p:clrMapOvr>
+    <a:masterClrMapping/>
+  </p:clrMapOvr>
+</p:sld>
+</file>
+
+<file path=ppt/slides/slide12.xml><?xml version="1.0" encoding="utf-8"?>
+<p:sld xmlns:a="http://schemas.openxmlformats.org/drawingml/2006/main" xmlns:r="http://schemas.openxmlformats.org/officeDocument/2006/relationships" xmlns:p="http://schemas.openxmlformats.org/presentationml/2006/main">
+  <p:cSld>
+    <p:spTree>
+      <p:nvGrpSpPr>
+        <p:cNvPr id="1" name=""/>
+        <p:cNvGrpSpPr/>
+        <p:nvPr/>
+      </p:nvGrpSpPr>
+      <p:grpSpPr>
+        <a:xfrm>
+          <a:off x="0" y="0"/>
+          <a:ext cx="0" cy="0"/>
+          <a:chOff x="0" y="0"/>
+          <a:chExt cx="0" cy="0"/>
+        </a:xfrm>
+      </p:grpSpPr>
+      <p:sp>
+        <p:nvSpPr>
+          <p:cNvPr id="2" name="Title 1">
+            <a:extLst>
+              <a:ext uri="{FF2B5EF4-FFF2-40B4-BE49-F238E27FC236}">
+                <a16:creationId xmlns:a16="http://schemas.microsoft.com/office/drawing/2014/main" id="{3735F51F-7E07-4A40-BC26-034C4B71F632}"/>
+              </a:ext>
+            </a:extLst>
+          </p:cNvPr>
+          <p:cNvSpPr>
+            <a:spLocks noGrp="1"/>
+          </p:cNvSpPr>
+          <p:nvPr>
+            <p:ph type="title"/>
+          </p:nvPr>
+        </p:nvSpPr>
+        <p:spPr/>
+        <p:txBody>
+          <a:bodyPr/>
+          <a:lstStyle/>
+          <a:p>
+            <a:r>
+              <a:rPr lang="en-US" dirty="0"/>
+              <a:t>Alternative solutions: Pros &amp; cons</a:t>
+            </a:r>
+          </a:p>
+        </p:txBody>
+      </p:sp>
+      <p:sp>
+        <p:nvSpPr>
+          <p:cNvPr id="3" name="Content Placeholder 2">
+            <a:extLst>
+              <a:ext uri="{FF2B5EF4-FFF2-40B4-BE49-F238E27FC236}">
+                <a16:creationId xmlns:a16="http://schemas.microsoft.com/office/drawing/2014/main" id="{0FA13A17-1F28-419E-A2F0-EC80DFDFACF0}"/>
+              </a:ext>
+            </a:extLst>
+          </p:cNvPr>
+          <p:cNvSpPr>
+            <a:spLocks noGrp="1"/>
+          </p:cNvSpPr>
+          <p:nvPr>
+            <p:ph idx="1"/>
+          </p:nvPr>
+        </p:nvSpPr>
+        <p:spPr/>
+        <p:txBody>
+          <a:bodyPr/>
+          <a:lstStyle/>
+          <a:p>
+            <a:r>
+              <a:rPr lang="en-US" sz="2400" dirty="0"/>
+              <a:t>Other time tracking software &amp; reporting is available:</a:t>
+            </a:r>
+          </a:p>
+          <a:p>
+            <a:pPr lvl="1"/>
+            <a:r>
+              <a:rPr lang="en-US" sz="2000" dirty="0"/>
+              <a:t>Toggl (free and paid versions), </a:t>
+            </a:r>
+            <a:r>
+              <a:rPr lang="en-US" sz="2000" dirty="0" err="1"/>
+              <a:t>RescueTime</a:t>
+            </a:r>
+            <a:r>
+              <a:rPr lang="en-US" sz="2000" dirty="0"/>
+              <a:t>, </a:t>
+            </a:r>
+            <a:r>
+              <a:rPr lang="en-US" sz="2000" dirty="0" err="1"/>
+              <a:t>Everhour</a:t>
+            </a:r>
+            <a:endParaRPr lang="en-US" sz="2000" dirty="0"/>
+          </a:p>
+          <a:p>
+            <a:endParaRPr lang="en-US" sz="2400" dirty="0"/>
+          </a:p>
+        </p:txBody>
+      </p:sp>
+      <p:sp>
+        <p:nvSpPr>
+          <p:cNvPr id="4" name="TextBox 3">
+            <a:extLst>
+              <a:ext uri="{FF2B5EF4-FFF2-40B4-BE49-F238E27FC236}">
+                <a16:creationId xmlns:a16="http://schemas.microsoft.com/office/drawing/2014/main" id="{AECAE897-351D-421A-A038-3AC7EECFC29A}"/>
+              </a:ext>
+            </a:extLst>
+          </p:cNvPr>
+          <p:cNvSpPr txBox="1"/>
+          <p:nvPr/>
+        </p:nvSpPr>
+        <p:spPr>
+          <a:xfrm>
+            <a:off x="765629" y="2542617"/>
+            <a:ext cx="2466381" cy="923330"/>
+          </a:xfrm>
+          <a:prstGeom prst="rect">
+            <a:avLst/>
+          </a:prstGeom>
+          <a:noFill/>
+        </p:spPr>
+        <p:txBody>
+          <a:bodyPr wrap="none" rtlCol="0">
+            <a:spAutoFit/>
+          </a:bodyPr>
+          <a:lstStyle/>
+          <a:p>
+            <a:r>
+              <a:rPr lang="en-US" dirty="0"/>
+              <a:t>Pros to DIY Shiny App:</a:t>
+            </a:r>
+          </a:p>
+          <a:p>
+            <a:pPr marL="285750" indent="-285750">
+              <a:buFont typeface="Arial" panose="020B0604020202020204" pitchFamily="34" charset="0"/>
+              <a:buChar char="•"/>
+            </a:pPr>
+            <a:r>
+              <a:rPr lang="en-US" dirty="0"/>
+              <a:t>Entirely customizable</a:t>
+            </a:r>
+          </a:p>
+          <a:p>
+            <a:pPr marL="285750" indent="-285750">
+              <a:buFont typeface="Arial" panose="020B0604020202020204" pitchFamily="34" charset="0"/>
+              <a:buChar char="•"/>
+            </a:pPr>
+            <a:r>
+              <a:rPr lang="en-US" dirty="0"/>
+              <a:t>Free! </a:t>
+            </a:r>
+          </a:p>
+        </p:txBody>
+      </p:sp>
+      <p:sp>
+        <p:nvSpPr>
+          <p:cNvPr id="5" name="TextBox 4">
+            <a:extLst>
+              <a:ext uri="{FF2B5EF4-FFF2-40B4-BE49-F238E27FC236}">
+                <a16:creationId xmlns:a16="http://schemas.microsoft.com/office/drawing/2014/main" id="{89ABEAB4-D389-49FD-8DE1-C74061A5FF75}"/>
+              </a:ext>
+            </a:extLst>
+          </p:cNvPr>
+          <p:cNvSpPr txBox="1"/>
+          <p:nvPr/>
+        </p:nvSpPr>
+        <p:spPr>
+          <a:xfrm>
+            <a:off x="4455459" y="2542617"/>
+            <a:ext cx="4518212" cy="2031325"/>
+          </a:xfrm>
+          <a:prstGeom prst="rect">
+            <a:avLst/>
+          </a:prstGeom>
+          <a:noFill/>
+        </p:spPr>
+        <p:txBody>
+          <a:bodyPr wrap="square" rtlCol="0">
+            <a:spAutoFit/>
+          </a:bodyPr>
+          <a:lstStyle/>
+          <a:p>
+            <a:r>
+              <a:rPr lang="en-US" dirty="0"/>
+              <a:t>Pros to other software/trackers:</a:t>
+            </a:r>
+          </a:p>
+          <a:p>
+            <a:pPr marL="285750" indent="-285750">
+              <a:buFont typeface="Arial" panose="020B0604020202020204" pitchFamily="34" charset="0"/>
+              <a:buChar char="•"/>
+            </a:pPr>
+            <a:r>
+              <a:rPr lang="en-US" dirty="0"/>
+              <a:t>Less labor intensive/maintenance not required</a:t>
+            </a:r>
+          </a:p>
+          <a:p>
+            <a:pPr marL="285750" indent="-285750">
+              <a:buFont typeface="Arial" panose="020B0604020202020204" pitchFamily="34" charset="0"/>
+              <a:buChar char="•"/>
+            </a:pPr>
+            <a:r>
+              <a:rPr lang="en-US" dirty="0"/>
+              <a:t>Can monitor apps and URLs used and identify distracters (hello Slack!)</a:t>
+            </a:r>
+          </a:p>
+          <a:p>
+            <a:pPr marL="285750" indent="-285750">
+              <a:buFont typeface="Arial" panose="020B0604020202020204" pitchFamily="34" charset="0"/>
+              <a:buChar char="•"/>
+            </a:pPr>
+            <a:r>
+              <a:rPr lang="en-US" dirty="0"/>
+              <a:t>More precise: down to the minute (if this is desired)</a:t>
+            </a:r>
+          </a:p>
+        </p:txBody>
+      </p:sp>
+    </p:spTree>
+    <p:extLst>
+      <p:ext uri="{BB962C8B-B14F-4D97-AF65-F5344CB8AC3E}">
+        <p14:creationId xmlns:p14="http://schemas.microsoft.com/office/powerpoint/2010/main" val="3083300731"/>
+      </p:ext>
+    </p:extLst>
+  </p:cSld>
+  <p:clrMapOvr>
+    <a:masterClrMapping/>
+  </p:clrMapOvr>
+</p:sld>
+</file>
+
+<file path=ppt/slides/slide13.xml><?xml version="1.0" encoding="utf-8"?>
+<p:sld xmlns:a="http://schemas.openxmlformats.org/drawingml/2006/main" xmlns:r="http://schemas.openxmlformats.org/officeDocument/2006/relationships" xmlns:p="http://schemas.openxmlformats.org/presentationml/2006/main">
+  <p:cSld>
+    <p:spTree>
+      <p:nvGrpSpPr>
+        <p:cNvPr id="1" name=""/>
+        <p:cNvGrpSpPr/>
+        <p:nvPr/>
+      </p:nvGrpSpPr>
+      <p:grpSpPr>
+        <a:xfrm>
+          <a:off x="0" y="0"/>
+          <a:ext cx="0" cy="0"/>
+          <a:chOff x="0" y="0"/>
+          <a:chExt cx="0" cy="0"/>
+        </a:xfrm>
+      </p:grpSpPr>
+      <p:sp>
+        <p:nvSpPr>
+          <p:cNvPr id="2" name="Title 1">
+            <a:extLst>
+              <a:ext uri="{FF2B5EF4-FFF2-40B4-BE49-F238E27FC236}">
+                <a16:creationId xmlns:a16="http://schemas.microsoft.com/office/drawing/2014/main" id="{8B4B5790-0EA7-4012-93A7-22425D41E1E3}"/>
+              </a:ext>
+            </a:extLst>
+          </p:cNvPr>
+          <p:cNvSpPr>
+            <a:spLocks noGrp="1"/>
+          </p:cNvSpPr>
+          <p:nvPr>
+            <p:ph type="title"/>
+          </p:nvPr>
+        </p:nvSpPr>
+        <p:spPr/>
+        <p:txBody>
+          <a:bodyPr/>
+          <a:lstStyle/>
+          <a:p>
+            <a:r>
+              <a:rPr lang="en-US" dirty="0"/>
+              <a:t>Future plans</a:t>
+            </a:r>
+          </a:p>
+        </p:txBody>
+      </p:sp>
+      <p:sp>
+        <p:nvSpPr>
+          <p:cNvPr id="3" name="Content Placeholder 2">
+            <a:extLst>
+              <a:ext uri="{FF2B5EF4-FFF2-40B4-BE49-F238E27FC236}">
+                <a16:creationId xmlns:a16="http://schemas.microsoft.com/office/drawing/2014/main" id="{4851F475-9DB2-4FC0-B370-DDE4324E134A}"/>
+              </a:ext>
+            </a:extLst>
+          </p:cNvPr>
+          <p:cNvSpPr>
+            <a:spLocks noGrp="1"/>
+          </p:cNvSpPr>
+          <p:nvPr>
+            <p:ph idx="1"/>
+          </p:nvPr>
+        </p:nvSpPr>
+        <p:spPr/>
+        <p:txBody>
+          <a:bodyPr/>
+          <a:lstStyle/>
+          <a:p>
+            <a:r>
+              <a:rPr lang="en-US" dirty="0"/>
+              <a:t>Incorporate with Toggl app to automate a portion of the tracking</a:t>
+            </a:r>
+          </a:p>
+          <a:p>
+            <a:pPr lvl="1"/>
+            <a:r>
+              <a:rPr lang="en-US" dirty="0"/>
+              <a:t>Automated + customizable: best of both worlds?</a:t>
+            </a:r>
+          </a:p>
+          <a:p>
+            <a:r>
+              <a:rPr lang="en-US" dirty="0"/>
+              <a:t>Incorporate additional visualizations and/or summary measures</a:t>
+            </a:r>
+          </a:p>
+          <a:p>
+            <a:pPr lvl="1"/>
+            <a:r>
+              <a:rPr lang="en-US" dirty="0"/>
+              <a:t>Suggestions?</a:t>
+            </a:r>
+          </a:p>
+        </p:txBody>
+      </p:sp>
+    </p:spTree>
+    <p:extLst>
+      <p:ext uri="{BB962C8B-B14F-4D97-AF65-F5344CB8AC3E}">
+        <p14:creationId xmlns:p14="http://schemas.microsoft.com/office/powerpoint/2010/main" val="1128304148"/>
+      </p:ext>
+    </p:extLst>
+  </p:cSld>
+  <p:clrMapOvr>
+    <a:masterClrMapping/>
+  </p:clrMapOvr>
+</p:sld>
+</file>
+
+<file path=ppt/slides/slide14.xml><?xml version="1.0" encoding="utf-8"?>
+<p:sld xmlns:a="http://schemas.openxmlformats.org/drawingml/2006/main" xmlns:r="http://schemas.openxmlformats.org/officeDocument/2006/relationships" xmlns:p="http://schemas.openxmlformats.org/presentationml/2006/main">
+  <p:cSld>
+    <p:spTree>
+      <p:nvGrpSpPr>
+        <p:cNvPr id="1" name=""/>
+        <p:cNvGrpSpPr/>
+        <p:nvPr/>
+      </p:nvGrpSpPr>
+      <p:grpSpPr>
+        <a:xfrm>
+          <a:off x="0" y="0"/>
+          <a:ext cx="0" cy="0"/>
+          <a:chOff x="0" y="0"/>
+          <a:chExt cx="0" cy="0"/>
+        </a:xfrm>
+      </p:grpSpPr>
+      <p:sp>
+        <p:nvSpPr>
+          <p:cNvPr id="2" name="Title 1">
+            <a:extLst>
+              <a:ext uri="{FF2B5EF4-FFF2-40B4-BE49-F238E27FC236}">
                 <a16:creationId xmlns:a16="http://schemas.microsoft.com/office/drawing/2014/main" id="{CFD1A390-01F3-41EC-A21A-C0F8AE22ED16}"/>
               </a:ext>
             </a:extLst>
@@ -3298,7 +3820,7 @@
           <a:p>
             <a:r>
               <a:rPr lang="en-US" sz="2800" dirty="0"/>
-              <a:t>GitHub: </a:t>
+              <a:t>GitHub Repo: </a:t>
             </a:r>
             <a:r>
               <a:rPr lang="en-US" sz="2800" dirty="0">
@@ -3314,6 +3836,443 @@
     <p:extLst>
       <p:ext uri="{BB962C8B-B14F-4D97-AF65-F5344CB8AC3E}">
         <p14:creationId xmlns:p14="http://schemas.microsoft.com/office/powerpoint/2010/main" val="1075239667"/>
+      </p:ext>
+    </p:extLst>
+  </p:cSld>
+  <p:clrMapOvr>
+    <a:masterClrMapping/>
+  </p:clrMapOvr>
+</p:sld>
+</file>
+
+<file path=ppt/slides/slide15.xml><?xml version="1.0" encoding="utf-8"?>
+<p:sld xmlns:a="http://schemas.openxmlformats.org/drawingml/2006/main" xmlns:r="http://schemas.openxmlformats.org/officeDocument/2006/relationships" xmlns:p="http://schemas.openxmlformats.org/presentationml/2006/main">
+  <p:cSld>
+    <p:spTree>
+      <p:nvGrpSpPr>
+        <p:cNvPr id="1" name=""/>
+        <p:cNvGrpSpPr/>
+        <p:nvPr/>
+      </p:nvGrpSpPr>
+      <p:grpSpPr>
+        <a:xfrm>
+          <a:off x="0" y="0"/>
+          <a:ext cx="0" cy="0"/>
+          <a:chOff x="0" y="0"/>
+          <a:chExt cx="0" cy="0"/>
+        </a:xfrm>
+      </p:grpSpPr>
+      <p:sp>
+        <p:nvSpPr>
+          <p:cNvPr id="17409" name="Title 1"/>
+          <p:cNvSpPr txBox="1">
+            <a:spLocks/>
+          </p:cNvSpPr>
+          <p:nvPr/>
+        </p:nvSpPr>
+        <p:spPr bwMode="auto">
+          <a:xfrm>
+            <a:off x="765175" y="1182689"/>
+            <a:ext cx="7680325" cy="2890548"/>
+          </a:xfrm>
+          <a:prstGeom prst="rect">
+            <a:avLst/>
+          </a:prstGeom>
+          <a:noFill/>
+          <a:ln>
+            <a:noFill/>
+          </a:ln>
+          <a:extLst>
+            <a:ext uri="{909E8E84-426E-40dd-AFC4-6F175D3DCCD1}">
+              <a14:hiddenFill xmlns="" xmlns:a14="http://schemas.microsoft.com/office/drawing/2010/main">
+                <a:solidFill>
+                  <a:srgbClr val="FFFFFF"/>
+                </a:solidFill>
+              </a14:hiddenFill>
+            </a:ext>
+            <a:ext uri="{91240B29-F687-4f45-9708-019B960494DF}">
+              <a14:hiddenLine xmlns="" xmlns:a14="http://schemas.microsoft.com/office/drawing/2010/main" w="9525">
+                <a:solidFill>
+                  <a:srgbClr val="000000"/>
+                </a:solidFill>
+                <a:miter lim="800000"/>
+                <a:headEnd/>
+                <a:tailEnd/>
+              </a14:hiddenLine>
+            </a:ext>
+          </a:extLst>
+        </p:spPr>
+        <p:txBody>
+          <a:bodyPr/>
+          <a:lstStyle>
+            <a:lvl1pPr>
+              <a:defRPr>
+                <a:solidFill>
+                  <a:schemeClr val="tx1"/>
+                </a:solidFill>
+                <a:latin typeface="Calibri" charset="0"/>
+                <a:ea typeface="ＭＳ Ｐゴシック" charset="0"/>
+                <a:cs typeface="ＭＳ Ｐゴシック" charset="0"/>
+              </a:defRPr>
+            </a:lvl1pPr>
+            <a:lvl2pPr marL="742950" indent="-285750">
+              <a:defRPr>
+                <a:solidFill>
+                  <a:schemeClr val="tx1"/>
+                </a:solidFill>
+                <a:latin typeface="Calibri" charset="0"/>
+                <a:ea typeface="ＭＳ Ｐゴシック" charset="0"/>
+              </a:defRPr>
+            </a:lvl2pPr>
+            <a:lvl3pPr marL="1143000" indent="-228600">
+              <a:defRPr>
+                <a:solidFill>
+                  <a:schemeClr val="tx1"/>
+                </a:solidFill>
+                <a:latin typeface="Calibri" charset="0"/>
+                <a:ea typeface="ＭＳ Ｐゴシック" charset="0"/>
+              </a:defRPr>
+            </a:lvl3pPr>
+            <a:lvl4pPr marL="1600200" indent="-228600">
+              <a:defRPr>
+                <a:solidFill>
+                  <a:schemeClr val="tx1"/>
+                </a:solidFill>
+                <a:latin typeface="Calibri" charset="0"/>
+                <a:ea typeface="ＭＳ Ｐゴシック" charset="0"/>
+              </a:defRPr>
+            </a:lvl4pPr>
+            <a:lvl5pPr marL="2057400" indent="-228600">
+              <a:defRPr>
+                <a:solidFill>
+                  <a:schemeClr val="tx1"/>
+                </a:solidFill>
+                <a:latin typeface="Calibri" charset="0"/>
+                <a:ea typeface="ＭＳ Ｐゴシック" charset="0"/>
+              </a:defRPr>
+            </a:lvl5pPr>
+            <a:lvl6pPr marL="2514600" indent="-228600" fontAlgn="base">
+              <a:spcBef>
+                <a:spcPct val="0"/>
+              </a:spcBef>
+              <a:spcAft>
+                <a:spcPct val="0"/>
+              </a:spcAft>
+              <a:defRPr>
+                <a:solidFill>
+                  <a:schemeClr val="tx1"/>
+                </a:solidFill>
+                <a:latin typeface="Calibri" charset="0"/>
+                <a:ea typeface="ＭＳ Ｐゴシック" charset="0"/>
+              </a:defRPr>
+            </a:lvl6pPr>
+            <a:lvl7pPr marL="2971800" indent="-228600" fontAlgn="base">
+              <a:spcBef>
+                <a:spcPct val="0"/>
+              </a:spcBef>
+              <a:spcAft>
+                <a:spcPct val="0"/>
+              </a:spcAft>
+              <a:defRPr>
+                <a:solidFill>
+                  <a:schemeClr val="tx1"/>
+                </a:solidFill>
+                <a:latin typeface="Calibri" charset="0"/>
+                <a:ea typeface="ＭＳ Ｐゴシック" charset="0"/>
+              </a:defRPr>
+            </a:lvl7pPr>
+            <a:lvl8pPr marL="3429000" indent="-228600" fontAlgn="base">
+              <a:spcBef>
+                <a:spcPct val="0"/>
+              </a:spcBef>
+              <a:spcAft>
+                <a:spcPct val="0"/>
+              </a:spcAft>
+              <a:defRPr>
+                <a:solidFill>
+                  <a:schemeClr val="tx1"/>
+                </a:solidFill>
+                <a:latin typeface="Calibri" charset="0"/>
+                <a:ea typeface="ＭＳ Ｐゴシック" charset="0"/>
+              </a:defRPr>
+            </a:lvl8pPr>
+            <a:lvl9pPr marL="3886200" indent="-228600" fontAlgn="base">
+              <a:spcBef>
+                <a:spcPct val="0"/>
+              </a:spcBef>
+              <a:spcAft>
+                <a:spcPct val="0"/>
+              </a:spcAft>
+              <a:defRPr>
+                <a:solidFill>
+                  <a:schemeClr val="tx1"/>
+                </a:solidFill>
+                <a:latin typeface="Calibri" charset="0"/>
+                <a:ea typeface="ＭＳ Ｐゴシック" charset="0"/>
+              </a:defRPr>
+            </a:lvl9pPr>
+          </a:lstStyle>
+          <a:p>
+            <a:r>
+              <a:rPr lang="en-US" sz="4400" b="1" dirty="0">
+                <a:solidFill>
+                  <a:schemeClr val="accent2"/>
+                </a:solidFill>
+                <a:latin typeface="Arial" panose="020B0604020202020204" pitchFamily="34" charset="0"/>
+                <a:cs typeface="Arial" panose="020B0604020202020204" pitchFamily="34" charset="0"/>
+              </a:rPr>
+              <a:t>Thank you!</a:t>
+            </a:r>
+          </a:p>
+        </p:txBody>
+      </p:sp>
+      <p:pic>
+        <p:nvPicPr>
+          <p:cNvPr id="2050" name="Picture 2"/>
+          <p:cNvPicPr>
+            <a:picLocks noChangeAspect="1" noChangeArrowheads="1"/>
+          </p:cNvPicPr>
+          <p:nvPr/>
+        </p:nvPicPr>
+        <p:blipFill>
+          <a:blip r:embed="rId2"/>
+          <a:srcRect/>
+          <a:stretch>
+            <a:fillRect/>
+          </a:stretch>
+        </p:blipFill>
+        <p:spPr bwMode="auto">
+          <a:xfrm>
+            <a:off x="623818" y="4197708"/>
+            <a:ext cx="472440" cy="365760"/>
+          </a:xfrm>
+          <a:prstGeom prst="rect">
+            <a:avLst/>
+          </a:prstGeom>
+          <a:noFill/>
+          <a:ln w="9525">
+            <a:noFill/>
+            <a:miter lim="800000"/>
+            <a:headEnd/>
+            <a:tailEnd/>
+          </a:ln>
+        </p:spPr>
+      </p:pic>
+      <p:sp>
+        <p:nvSpPr>
+          <p:cNvPr id="4" name="Rectangle 3"/>
+          <p:cNvSpPr/>
+          <p:nvPr/>
+        </p:nvSpPr>
+        <p:spPr>
+          <a:xfrm>
+            <a:off x="1273176" y="4197708"/>
+            <a:ext cx="1942519" cy="369332"/>
+          </a:xfrm>
+          <a:prstGeom prst="rect">
+            <a:avLst/>
+          </a:prstGeom>
+        </p:spPr>
+        <p:txBody>
+          <a:bodyPr wrap="none">
+            <a:spAutoFit/>
+          </a:bodyPr>
+          <a:lstStyle/>
+          <a:p>
+            <a:r>
+              <a:rPr lang="en-US" dirty="0">
+                <a:solidFill>
+                  <a:schemeClr val="accent1"/>
+                </a:solidFill>
+                <a:latin typeface="+mj-lt"/>
+                <a:cs typeface="Arial" panose="020B0604020202020204" pitchFamily="34" charset="0"/>
+                <a:hlinkClick r:id="rId3">
+                  <a:extLst>
+                    <a:ext uri="{A12FA001-AC4F-418D-AE19-62706E023703}">
+                      <ahyp:hlinkClr xmlns:ahyp="http://schemas.microsoft.com/office/drawing/2018/hyperlinkcolor" val="tx"/>
+                    </a:ext>
+                  </a:extLst>
+                </a:hlinkClick>
+              </a:rPr>
+              <a:t>laveryj@mskcc.org</a:t>
+            </a:r>
+            <a:endParaRPr lang="en-US" dirty="0">
+              <a:solidFill>
+                <a:schemeClr val="accent1"/>
+              </a:solidFill>
+              <a:latin typeface="+mj-lt"/>
+              <a:cs typeface="Arial" panose="020B0604020202020204" pitchFamily="34" charset="0"/>
+            </a:endParaRPr>
+          </a:p>
+        </p:txBody>
+      </p:sp>
+      <p:pic>
+        <p:nvPicPr>
+          <p:cNvPr id="3" name="Graphic 2">
+            <a:extLst>
+              <a:ext uri="{FF2B5EF4-FFF2-40B4-BE49-F238E27FC236}">
+                <a16:creationId xmlns:a16="http://schemas.microsoft.com/office/drawing/2014/main" id="{D50B19F6-5340-4F9E-B7DD-D9ACA4E3F806}"/>
+              </a:ext>
+            </a:extLst>
+          </p:cNvPr>
+          <p:cNvPicPr>
+            <a:picLocks noChangeAspect="1"/>
+          </p:cNvPicPr>
+          <p:nvPr/>
+        </p:nvPicPr>
+        <p:blipFill>
+          <a:blip r:embed="rId4">
+            <a:extLst>
+              <a:ext uri="{96DAC541-7B7A-43D3-8B79-37D633B846F1}">
+                <asvg:svgBlip xmlns:asvg="http://schemas.microsoft.com/office/drawing/2016/SVG/main" r:embed="rId5"/>
+              </a:ext>
+            </a:extLst>
+          </a:blip>
+          <a:stretch>
+            <a:fillRect/>
+          </a:stretch>
+        </p:blipFill>
+        <p:spPr>
+          <a:xfrm>
+            <a:off x="585718" y="5781997"/>
+            <a:ext cx="548640" cy="548640"/>
+          </a:xfrm>
+          <a:prstGeom prst="rect">
+            <a:avLst/>
+          </a:prstGeom>
+        </p:spPr>
+      </p:pic>
+      <p:sp>
+        <p:nvSpPr>
+          <p:cNvPr id="5" name="Rectangle 4">
+            <a:extLst>
+              <a:ext uri="{FF2B5EF4-FFF2-40B4-BE49-F238E27FC236}">
+                <a16:creationId xmlns:a16="http://schemas.microsoft.com/office/drawing/2014/main" id="{82A04F32-BAE7-490D-A395-7C8095D36025}"/>
+              </a:ext>
+            </a:extLst>
+          </p:cNvPr>
+          <p:cNvSpPr/>
+          <p:nvPr/>
+        </p:nvSpPr>
+        <p:spPr>
+          <a:xfrm>
+            <a:off x="1273176" y="5871651"/>
+            <a:ext cx="2406877" cy="369332"/>
+          </a:xfrm>
+          <a:prstGeom prst="rect">
+            <a:avLst/>
+          </a:prstGeom>
+        </p:spPr>
+        <p:txBody>
+          <a:bodyPr wrap="none" anchor="ctr">
+            <a:spAutoFit/>
+          </a:bodyPr>
+          <a:lstStyle/>
+          <a:p>
+            <a:r>
+              <a:rPr lang="en-US" dirty="0">
+                <a:solidFill>
+                  <a:schemeClr val="accent1"/>
+                </a:solidFill>
+                <a:latin typeface="+mj-lt"/>
+                <a:cs typeface="Arial" panose="020B0604020202020204" pitchFamily="34" charset="0"/>
+              </a:rPr>
+              <a:t>www.JessicaLavery.com</a:t>
+            </a:r>
+          </a:p>
+        </p:txBody>
+      </p:sp>
+      <p:pic>
+        <p:nvPicPr>
+          <p:cNvPr id="1028" name="Picture 4" descr="Image result for twitter logo">
+            <a:extLst>
+              <a:ext uri="{FF2B5EF4-FFF2-40B4-BE49-F238E27FC236}">
+                <a16:creationId xmlns:a16="http://schemas.microsoft.com/office/drawing/2014/main" id="{70A8DCF7-EE66-43A7-A1BB-508A7D8B4273}"/>
+              </a:ext>
+            </a:extLst>
+          </p:cNvPr>
+          <p:cNvPicPr>
+            <a:picLocks noChangeAspect="1" noChangeArrowheads="1"/>
+          </p:cNvPicPr>
+          <p:nvPr/>
+        </p:nvPicPr>
+        <p:blipFill>
+          <a:blip r:embed="rId6">
+            <a:extLst>
+              <a:ext uri="{28A0092B-C50C-407E-A947-70E740481C1C}">
+                <a14:useLocalDpi xmlns:a14="http://schemas.microsoft.com/office/drawing/2010/main" val="0"/>
+              </a:ext>
+            </a:extLst>
+          </a:blip>
+          <a:srcRect/>
+          <a:stretch>
+            <a:fillRect/>
+          </a:stretch>
+        </p:blipFill>
+        <p:spPr bwMode="auto">
+          <a:xfrm>
+            <a:off x="555098" y="4867792"/>
+            <a:ext cx="609880" cy="609880"/>
+          </a:xfrm>
+          <a:prstGeom prst="rect">
+            <a:avLst/>
+          </a:prstGeom>
+          <a:noFill/>
+          <a:extLst>
+            <a:ext uri="{909E8E84-426E-40DD-AFC4-6F175D3DCCD1}">
+              <a14:hiddenFill xmlns:a14="http://schemas.microsoft.com/office/drawing/2010/main">
+                <a:solidFill>
+                  <a:srgbClr val="FFFFFF"/>
+                </a:solidFill>
+              </a14:hiddenFill>
+            </a:ext>
+          </a:extLst>
+        </p:spPr>
+      </p:pic>
+      <p:sp>
+        <p:nvSpPr>
+          <p:cNvPr id="6" name="TextBox 5">
+            <a:extLst>
+              <a:ext uri="{FF2B5EF4-FFF2-40B4-BE49-F238E27FC236}">
+                <a16:creationId xmlns:a16="http://schemas.microsoft.com/office/drawing/2014/main" id="{B63CCD6D-1E40-4F0F-BE95-202FF180AB2B}"/>
+              </a:ext>
+            </a:extLst>
+          </p:cNvPr>
+          <p:cNvSpPr txBox="1"/>
+          <p:nvPr/>
+        </p:nvSpPr>
+        <p:spPr>
+          <a:xfrm>
+            <a:off x="1273176" y="5008516"/>
+            <a:ext cx="1352871" cy="369332"/>
+          </a:xfrm>
+          <a:prstGeom prst="rect">
+            <a:avLst/>
+          </a:prstGeom>
+          <a:noFill/>
+        </p:spPr>
+        <p:txBody>
+          <a:bodyPr wrap="none" rtlCol="0">
+            <a:spAutoFit/>
+          </a:bodyPr>
+          <a:lstStyle/>
+          <a:p>
+            <a:r>
+              <a:rPr lang="en-US" dirty="0"/>
+              <a:t>@</a:t>
+            </a:r>
+            <a:r>
+              <a:rPr lang="en-US" dirty="0" err="1"/>
+              <a:t>jessicalavs</a:t>
+            </a:r>
+            <a:endParaRPr lang="en-US" dirty="0"/>
+          </a:p>
+        </p:txBody>
+      </p:sp>
+    </p:spTree>
+    <p:extLst>
+      <p:ext uri="{BB962C8B-B14F-4D97-AF65-F5344CB8AC3E}">
+        <p14:creationId xmlns:p14="http://schemas.microsoft.com/office/powerpoint/2010/main" val="3029446517"/>
       </p:ext>
     </p:extLst>
   </p:cSld>
@@ -3363,8 +4322,13 @@
           <a:p>
             <a:r>
               <a:rPr lang="en-US" dirty="0"/>
-              <a:t>Time &amp; the busy statistician</a:t>
-            </a:r>
+              <a:t>Time &amp; the busy </a:t>
+            </a:r>
+            <a:r>
+              <a:rPr lang="en-US" dirty="0" err="1"/>
+              <a:t>RLady</a:t>
+            </a:r>
+            <a:endParaRPr lang="en-US" dirty="0"/>
           </a:p>
         </p:txBody>
       </p:sp>
@@ -3390,19 +4354,19 @@
           <a:lstStyle/>
           <a:p>
             <a:r>
-              <a:rPr lang="en-US" dirty="0"/>
+              <a:rPr lang="en-US" sz="2800" dirty="0"/>
               <a:t>Often feels like there aren’t enough hours in the day</a:t>
             </a:r>
           </a:p>
           <a:p>
             <a:r>
-              <a:rPr lang="en-US" dirty="0"/>
+              <a:rPr lang="en-US" sz="2800" dirty="0"/>
               <a:t>Start working on one project and loose track of time</a:t>
             </a:r>
           </a:p>
           <a:p>
             <a:r>
-              <a:rPr lang="en-US" dirty="0"/>
+              <a:rPr lang="en-US" sz="2800" dirty="0"/>
               <a:t>Re-analyses take up time! There is no such thing as a “quick re-analysis”!</a:t>
             </a:r>
           </a:p>
@@ -3490,7 +4454,7 @@
           <p:cNvPr id="2" name="Title 1">
             <a:extLst>
               <a:ext uri="{FF2B5EF4-FFF2-40B4-BE49-F238E27FC236}">
-                <a16:creationId xmlns:a16="http://schemas.microsoft.com/office/drawing/2014/main" id="{FD6491AE-52FD-4B48-884B-0D335ACDEACF}"/>
+                <a16:creationId xmlns:a16="http://schemas.microsoft.com/office/drawing/2014/main" id="{7CCFB932-F1A0-458A-830D-3BBD6D4ACBAC}"/>
               </a:ext>
             </a:extLst>
           </p:cNvPr>
@@ -3508,7 +4472,7 @@
           <a:p>
             <a:r>
               <a:rPr lang="en-US" dirty="0"/>
-              <a:t>Tracking time</a:t>
+              <a:t>Why use a time tracker summary/project management app?</a:t>
             </a:r>
           </a:p>
         </p:txBody>
@@ -3518,7 +4482,7 @@
           <p:cNvPr id="3" name="Content Placeholder 2">
             <a:extLst>
               <a:ext uri="{FF2B5EF4-FFF2-40B4-BE49-F238E27FC236}">
-                <a16:creationId xmlns:a16="http://schemas.microsoft.com/office/drawing/2014/main" id="{1F882B4D-9B18-448E-A594-C83072C8D8AB}"/>
+                <a16:creationId xmlns:a16="http://schemas.microsoft.com/office/drawing/2014/main" id="{5640F286-9FC2-4C24-9810-0AD9959C4F7C}"/>
               </a:ext>
             </a:extLst>
           </p:cNvPr>
@@ -3536,21 +4500,29 @@
           <a:p>
             <a:r>
               <a:rPr lang="en-US" sz="2800" dirty="0"/>
-              <a:t>Doesn’t have to be down to the minute</a:t>
-            </a:r>
-          </a:p>
-          <a:p>
-            <a:pPr lvl="1"/>
-            <a:r>
-              <a:rPr lang="en-US" sz="2400" dirty="0"/>
-              <a:t>At most granular, 15 minute increments</a:t>
-            </a:r>
-          </a:p>
-          <a:p>
-            <a:pPr lvl="1"/>
-            <a:r>
-              <a:rPr lang="en-US" sz="2400" dirty="0"/>
-              <a:t>At least granular, entire day</a:t>
+              <a:t>Tracking your time is only useful if you then go back and revisit it </a:t>
+            </a:r>
+            <a:r>
+              <a:rPr lang="en-US" sz="2800" dirty="0">
+                <a:solidFill>
+                  <a:schemeClr val="bg1">
+                    <a:lumMod val="50000"/>
+                  </a:schemeClr>
+                </a:solidFill>
+              </a:rPr>
+              <a:t>(except for the case of time tracking for billing purposes)</a:t>
+            </a:r>
+          </a:p>
+          <a:p>
+            <a:r>
+              <a:rPr lang="en-US" sz="2800" dirty="0"/>
+              <a:t>Useful for one on ones and project status updates</a:t>
+            </a:r>
+          </a:p>
+          <a:p>
+            <a:r>
+              <a:rPr lang="en-US" sz="2800" dirty="0"/>
+              <a:t>Sometimes useful for effort certification reports if your organization requires them</a:t>
             </a:r>
           </a:p>
         </p:txBody>
@@ -3558,7 +4530,7 @@
     </p:spTree>
     <p:extLst>
       <p:ext uri="{BB962C8B-B14F-4D97-AF65-F5344CB8AC3E}">
-        <p14:creationId xmlns:p14="http://schemas.microsoft.com/office/powerpoint/2010/main" val="2590693224"/>
+        <p14:creationId xmlns:p14="http://schemas.microsoft.com/office/powerpoint/2010/main" val="1628145875"/>
       </p:ext>
     </p:extLst>
   </p:cSld>
@@ -3590,7 +4562,7 @@
           <p:cNvPr id="2" name="Title 1">
             <a:extLst>
               <a:ext uri="{FF2B5EF4-FFF2-40B4-BE49-F238E27FC236}">
-                <a16:creationId xmlns:a16="http://schemas.microsoft.com/office/drawing/2014/main" id="{7CCFB932-F1A0-458A-830D-3BBD6D4ACBAC}"/>
+                <a16:creationId xmlns:a16="http://schemas.microsoft.com/office/drawing/2014/main" id="{FD6491AE-52FD-4B48-884B-0D335ACDEACF}"/>
               </a:ext>
             </a:extLst>
           </p:cNvPr>
@@ -3608,7 +4580,7 @@
           <a:p>
             <a:r>
               <a:rPr lang="en-US" dirty="0"/>
-              <a:t>Why use a time tracker summary/project management app?</a:t>
+              <a:t>Tracking time</a:t>
             </a:r>
           </a:p>
         </p:txBody>
@@ -3618,7 +4590,7 @@
           <p:cNvPr id="3" name="Content Placeholder 2">
             <a:extLst>
               <a:ext uri="{FF2B5EF4-FFF2-40B4-BE49-F238E27FC236}">
-                <a16:creationId xmlns:a16="http://schemas.microsoft.com/office/drawing/2014/main" id="{5640F286-9FC2-4C24-9810-0AD9959C4F7C}"/>
+                <a16:creationId xmlns:a16="http://schemas.microsoft.com/office/drawing/2014/main" id="{1F882B4D-9B18-448E-A594-C83072C8D8AB}"/>
               </a:ext>
             </a:extLst>
           </p:cNvPr>
@@ -3636,29 +4608,21 @@
           <a:p>
             <a:r>
               <a:rPr lang="en-US" sz="2800" dirty="0"/>
-              <a:t>Tracking your time is only useful if you then go back and revisit it </a:t>
-            </a:r>
-            <a:r>
-              <a:rPr lang="en-US" sz="2800" dirty="0">
-                <a:solidFill>
-                  <a:schemeClr val="bg1">
-                    <a:lumMod val="50000"/>
-                  </a:schemeClr>
-                </a:solidFill>
-              </a:rPr>
-              <a:t>(except for the case of time tracking for billing purposes)</a:t>
-            </a:r>
-          </a:p>
-          <a:p>
-            <a:r>
-              <a:rPr lang="en-US" sz="2800" dirty="0"/>
-              <a:t>Useful for one on ones and project status updates</a:t>
-            </a:r>
-          </a:p>
-          <a:p>
-            <a:r>
-              <a:rPr lang="en-US" sz="2800" dirty="0"/>
-              <a:t>Sometimes useful for effort certification reports if your organization requires them</a:t>
+              <a:t>Doesn’t have to be down to the minute</a:t>
+            </a:r>
+          </a:p>
+          <a:p>
+            <a:pPr lvl="1"/>
+            <a:r>
+              <a:rPr lang="en-US" sz="2400" dirty="0"/>
+              <a:t>At most granular, 15 minute increments</a:t>
+            </a:r>
+          </a:p>
+          <a:p>
+            <a:pPr lvl="1"/>
+            <a:r>
+              <a:rPr lang="en-US" sz="2400" dirty="0"/>
+              <a:t>At least granular, entire day</a:t>
             </a:r>
           </a:p>
         </p:txBody>
@@ -3666,7 +4630,7 @@
     </p:spTree>
     <p:extLst>
       <p:ext uri="{BB962C8B-B14F-4D97-AF65-F5344CB8AC3E}">
-        <p14:creationId xmlns:p14="http://schemas.microsoft.com/office/powerpoint/2010/main" val="1628145875"/>
+        <p14:creationId xmlns:p14="http://schemas.microsoft.com/office/powerpoint/2010/main" val="2590693224"/>
       </p:ext>
     </p:extLst>
   </p:cSld>
@@ -3698,7 +4662,7 @@
           <p:cNvPr id="2" name="Title 1">
             <a:extLst>
               <a:ext uri="{FF2B5EF4-FFF2-40B4-BE49-F238E27FC236}">
-                <a16:creationId xmlns:a16="http://schemas.microsoft.com/office/drawing/2014/main" id="{C41C5319-249F-4F8B-AD76-A1ED4DBBA85D}"/>
+                <a16:creationId xmlns:a16="http://schemas.microsoft.com/office/drawing/2014/main" id="{5E7732EB-DDF0-44B4-A87C-F05369D67F44}"/>
               </a:ext>
             </a:extLst>
           </p:cNvPr>
@@ -3716,47 +4680,7 @@
           <a:p>
             <a:r>
               <a:rPr lang="en-US" dirty="0"/>
-              <a:t>Time management metrics</a:t>
-            </a:r>
-          </a:p>
-        </p:txBody>
-      </p:sp>
-      <p:sp>
-        <p:nvSpPr>
-          <p:cNvPr id="3" name="Content Placeholder 2">
-            <a:extLst>
-              <a:ext uri="{FF2B5EF4-FFF2-40B4-BE49-F238E27FC236}">
-                <a16:creationId xmlns:a16="http://schemas.microsoft.com/office/drawing/2014/main" id="{5FD2F8A0-9F57-454B-8B7D-6DA13D8466A6}"/>
-              </a:ext>
-            </a:extLst>
-          </p:cNvPr>
-          <p:cNvSpPr>
-            <a:spLocks noGrp="1"/>
-          </p:cNvSpPr>
-          <p:nvPr>
-            <p:ph idx="1"/>
-          </p:nvPr>
-        </p:nvSpPr>
-        <p:spPr/>
-        <p:txBody>
-          <a:bodyPr/>
-          <a:lstStyle/>
-          <a:p>
-            <a:r>
-              <a:rPr lang="en-US" dirty="0"/>
-              <a:t>Gives a breakdown of time spent per area of project by project and investigator</a:t>
-            </a:r>
-          </a:p>
-          <a:p>
-            <a:r>
-              <a:rPr lang="en-US" dirty="0"/>
-              <a:t>If investigator A is taking up 90% of your time, you want to know that</a:t>
-            </a:r>
-          </a:p>
-          <a:p>
-            <a:r>
-              <a:rPr lang="en-US" dirty="0"/>
-              <a:t>If an abstract took as long as a full analysis for a manuscript, you want to know that too</a:t>
+              <a:t>The app</a:t>
             </a:r>
           </a:p>
         </p:txBody>
@@ -3764,7 +4688,7 @@
     </p:spTree>
     <p:extLst>
       <p:ext uri="{BB962C8B-B14F-4D97-AF65-F5344CB8AC3E}">
-        <p14:creationId xmlns:p14="http://schemas.microsoft.com/office/powerpoint/2010/main" val="3110883680"/>
+        <p14:creationId xmlns:p14="http://schemas.microsoft.com/office/powerpoint/2010/main" val="1192983765"/>
       </p:ext>
     </p:extLst>
   </p:cSld>
@@ -3796,7 +4720,7 @@
           <p:cNvPr id="2" name="Title 1">
             <a:extLst>
               <a:ext uri="{FF2B5EF4-FFF2-40B4-BE49-F238E27FC236}">
-                <a16:creationId xmlns:a16="http://schemas.microsoft.com/office/drawing/2014/main" id="{7C0AAF0C-A9BA-41A6-A856-1A1CB3117341}"/>
+                <a16:creationId xmlns:a16="http://schemas.microsoft.com/office/drawing/2014/main" id="{C41C5319-249F-4F8B-AD76-A1ED4DBBA85D}"/>
               </a:ext>
             </a:extLst>
           </p:cNvPr>
@@ -3814,13 +4738,8 @@
           <a:p>
             <a:r>
               <a:rPr lang="en-US" dirty="0"/>
-              <a:t>Information gleaned from </a:t>
-            </a:r>
-            <a:r>
-              <a:rPr lang="en-US" i="1" dirty="0" err="1"/>
-              <a:t>timetrackR</a:t>
-            </a:r>
-            <a:endParaRPr lang="en-US" i="1" dirty="0"/>
+              <a:t>Time management metrics</a:t>
+            </a:r>
           </a:p>
         </p:txBody>
       </p:sp>
@@ -3829,7 +4748,7 @@
           <p:cNvPr id="3" name="Content Placeholder 2">
             <a:extLst>
               <a:ext uri="{FF2B5EF4-FFF2-40B4-BE49-F238E27FC236}">
-                <a16:creationId xmlns:a16="http://schemas.microsoft.com/office/drawing/2014/main" id="{9DC865FE-2769-467A-9247-2E19D7FFD882}"/>
+                <a16:creationId xmlns:a16="http://schemas.microsoft.com/office/drawing/2014/main" id="{5FD2F8A0-9F57-454B-8B7D-6DA13D8466A6}"/>
               </a:ext>
             </a:extLst>
           </p:cNvPr>
@@ -3845,14 +4764,29 @@
           <a:bodyPr/>
           <a:lstStyle/>
           <a:p>
-            <a:endParaRPr lang="en-US" dirty="0"/>
+            <a:r>
+              <a:rPr lang="en-US" dirty="0"/>
+              <a:t>Gives a breakdown of time spent per area of project by project and investigator</a:t>
+            </a:r>
+          </a:p>
+          <a:p>
+            <a:r>
+              <a:rPr lang="en-US" dirty="0"/>
+              <a:t>If an investigator or project is taking up &gt;50% of your time, you want to know that</a:t>
+            </a:r>
+          </a:p>
+          <a:p>
+            <a:r>
+              <a:rPr lang="en-US" dirty="0"/>
+              <a:t>If an abstract took as long as a full analysis for a manuscript, you want to know that too</a:t>
+            </a:r>
           </a:p>
         </p:txBody>
       </p:sp>
     </p:spTree>
     <p:extLst>
       <p:ext uri="{BB962C8B-B14F-4D97-AF65-F5344CB8AC3E}">
-        <p14:creationId xmlns:p14="http://schemas.microsoft.com/office/powerpoint/2010/main" val="2022793432"/>
+        <p14:creationId xmlns:p14="http://schemas.microsoft.com/office/powerpoint/2010/main" val="3110883680"/>
       </p:ext>
     </p:extLst>
   </p:cSld>
@@ -3884,7 +4818,7 @@
           <p:cNvPr id="2" name="Title 1">
             <a:extLst>
               <a:ext uri="{FF2B5EF4-FFF2-40B4-BE49-F238E27FC236}">
-                <a16:creationId xmlns:a16="http://schemas.microsoft.com/office/drawing/2014/main" id="{5E7732EB-DDF0-44B4-A87C-F05369D67F44}"/>
+                <a16:creationId xmlns:a16="http://schemas.microsoft.com/office/drawing/2014/main" id="{7C0AAF0C-A9BA-41A6-A856-1A1CB3117341}"/>
               </a:ext>
             </a:extLst>
           </p:cNvPr>
@@ -3902,15 +4836,45 @@
           <a:p>
             <a:r>
               <a:rPr lang="en-US" dirty="0"/>
-              <a:t>The app</a:t>
-            </a:r>
+              <a:t>Information gleaned from </a:t>
+            </a:r>
+            <a:r>
+              <a:rPr lang="en-US" i="1" dirty="0" err="1"/>
+              <a:t>timetrackR</a:t>
+            </a:r>
+            <a:endParaRPr lang="en-US" i="1" dirty="0"/>
+          </a:p>
+        </p:txBody>
+      </p:sp>
+      <p:sp>
+        <p:nvSpPr>
+          <p:cNvPr id="3" name="Content Placeholder 2">
+            <a:extLst>
+              <a:ext uri="{FF2B5EF4-FFF2-40B4-BE49-F238E27FC236}">
+                <a16:creationId xmlns:a16="http://schemas.microsoft.com/office/drawing/2014/main" id="{9DC865FE-2769-467A-9247-2E19D7FFD882}"/>
+              </a:ext>
+            </a:extLst>
+          </p:cNvPr>
+          <p:cNvSpPr>
+            <a:spLocks noGrp="1"/>
+          </p:cNvSpPr>
+          <p:nvPr>
+            <p:ph idx="1"/>
+          </p:nvPr>
+        </p:nvSpPr>
+        <p:spPr/>
+        <p:txBody>
+          <a:bodyPr/>
+          <a:lstStyle/>
+          <a:p>
+            <a:endParaRPr lang="en-US" dirty="0"/>
           </a:p>
         </p:txBody>
       </p:sp>
     </p:spTree>
     <p:extLst>
       <p:ext uri="{BB962C8B-B14F-4D97-AF65-F5344CB8AC3E}">
-        <p14:creationId xmlns:p14="http://schemas.microsoft.com/office/powerpoint/2010/main" val="1192983765"/>
+        <p14:creationId xmlns:p14="http://schemas.microsoft.com/office/powerpoint/2010/main" val="2022793432"/>
       </p:ext>
     </p:extLst>
   </p:cSld>
@@ -3995,6 +4959,12 @@
             <a:r>
               <a:rPr lang="en-US" dirty="0"/>
               <a:t>Entirely retrospective, it’s a summary of what you’ve done, doesn’t include projected time allocations</a:t>
+            </a:r>
+          </a:p>
+          <a:p>
+            <a:r>
+              <a:rPr lang="en-US" dirty="0"/>
+              <a:t>Most useful for projects with a start and end, but can be useful for ongoing work as well</a:t>
             </a:r>
           </a:p>
         </p:txBody>
@@ -4079,26 +5049,15 @@
           <a:lstStyle/>
           <a:p>
             <a:r>
-              <a:rPr lang="en-US" dirty="0"/>
+              <a:rPr lang="en-US" sz="2800" dirty="0"/>
               <a:t>Can track whichever components of your time you’re interested in</a:t>
             </a:r>
           </a:p>
           <a:p>
             <a:r>
-              <a:rPr lang="en-US" dirty="0"/>
+              <a:rPr lang="en-US" sz="2800" dirty="0"/>
               <a:t>Can be used to summarize “current” time (active projects) or view long-term project trajectories</a:t>
             </a:r>
-          </a:p>
-          <a:p>
-            <a:r>
-              <a:rPr lang="en-US" dirty="0"/>
-              <a:t>Change </a:t>
-            </a:r>
-            <a:r>
-              <a:rPr lang="en-US"/>
-              <a:t>the deliverable ??</a:t>
-            </a:r>
-            <a:endParaRPr lang="en-US" dirty="0"/>
           </a:p>
         </p:txBody>
       </p:sp>
@@ -4441,26 +5400,6 @@
 </file>
 
 <file path=customXml/item1.xml><?xml version="1.0" encoding="utf-8"?>
-<?mso-contentType ?>
-<FormTemplates xmlns="http://schemas.microsoft.com/sharepoint/v3/contenttype/forms">
-  <Display>DocumentLibraryForm</Display>
-  <Edit>DocumentLibraryForm</Edit>
-  <New>DocumentLibraryForm</New>
-</FormTemplates>
-</file>
-
-<file path=customXml/item2.xml><?xml version="1.0" encoding="utf-8"?>
-<p:properties xmlns:p="http://schemas.microsoft.com/office/2006/metadata/properties" xmlns:xsi="http://www.w3.org/2001/XMLSchema-instance" xmlns:pc="http://schemas.microsoft.com/office/infopath/2007/PartnerControls">
-  <documentManagement>
-    <ImageCreateDate xmlns="E64CF27C-2ECC-48E8-947E-CA63274FB2E8" xsi:nil="true"/>
-    <PublishingExpirationDate xmlns="http://schemas.microsoft.com/sharepoint/v3" xsi:nil="true"/>
-    <PublishingStartDate xmlns="http://schemas.microsoft.com/sharepoint/v3" xsi:nil="true"/>
-    <wic_System_Copyright xmlns="http://schemas.microsoft.com/sharepoint/v3/fields" xsi:nil="true"/>
-  </documentManagement>
-</p:properties>
-</file>
-
-<file path=customXml/item3.xml><?xml version="1.0" encoding="utf-8"?>
 <ct:contentTypeSchema xmlns:ct="http://schemas.microsoft.com/office/2006/metadata/contentType" xmlns:ma="http://schemas.microsoft.com/office/2006/metadata/properties/metaAttributes" ct:_="" ma:_="" ma:contentTypeName="Image" ma:contentTypeID="0x0101009148F5A04DDD49CBA7127AADA5FB792B00AADE34325A8B49CDA8BB4DB53328F214008DA1A4150FB2B848A3EB7B452BFA7AC5" ma:contentTypeVersion="1" ma:contentTypeDescription="Upload an image." ma:contentTypeScope="" ma:versionID="c5dd4a19140d82efd42bf2e2156fee3e">
   <xsd:schema xmlns:xsd="http://www.w3.org/2001/XMLSchema" xmlns:xs="http://www.w3.org/2001/XMLSchema" xmlns:p="http://schemas.microsoft.com/office/2006/metadata/properties" xmlns:ns1="http://schemas.microsoft.com/sharepoint/v3" xmlns:ns2="E64CF27C-2ECC-48E8-947E-CA63274FB2E8" xmlns:ns3="http://schemas.microsoft.com/sharepoint/v3/fields" targetNamespace="http://schemas.microsoft.com/office/2006/metadata/properties" ma:root="true" ma:fieldsID="8669bc30feb5185623fa09da941496e2" ns1:_="" ns2:_="" ns3:_="">
     <xsd:import namespace="http://schemas.microsoft.com/sharepoint/v3"/>
@@ -4662,10 +5601,42 @@
 </ct:contentTypeSchema>
 </file>
 
+<file path=customXml/item2.xml><?xml version="1.0" encoding="utf-8"?>
+<p:properties xmlns:p="http://schemas.microsoft.com/office/2006/metadata/properties" xmlns:xsi="http://www.w3.org/2001/XMLSchema-instance" xmlns:pc="http://schemas.microsoft.com/office/infopath/2007/PartnerControls">
+  <documentManagement>
+    <ImageCreateDate xmlns="E64CF27C-2ECC-48E8-947E-CA63274FB2E8" xsi:nil="true"/>
+    <PublishingExpirationDate xmlns="http://schemas.microsoft.com/sharepoint/v3" xsi:nil="true"/>
+    <PublishingStartDate xmlns="http://schemas.microsoft.com/sharepoint/v3" xsi:nil="true"/>
+    <wic_System_Copyright xmlns="http://schemas.microsoft.com/sharepoint/v3/fields" xsi:nil="true"/>
+  </documentManagement>
+</p:properties>
+</file>
+
+<file path=customXml/item3.xml><?xml version="1.0" encoding="utf-8"?>
+<?mso-contentType ?>
+<FormTemplates xmlns="http://schemas.microsoft.com/sharepoint/v3/contenttype/forms">
+  <Display>DocumentLibraryForm</Display>
+  <Edit>DocumentLibraryForm</Edit>
+  <New>DocumentLibraryForm</New>
+</FormTemplates>
+</file>
+
 <file path=customXml/itemProps1.xml><?xml version="1.0" encoding="utf-8"?>
-<ds:datastoreItem xmlns:ds="http://schemas.openxmlformats.org/officeDocument/2006/customXml" ds:itemID="{B01F69EB-AD96-4AD6-8A18-0C8728F5F031}">
+<ds:datastoreItem xmlns:ds="http://schemas.openxmlformats.org/officeDocument/2006/customXml" ds:itemID="{E57EBD8B-EA50-4231-9F03-F9188E4066E3}">
   <ds:schemaRefs>
-    <ds:schemaRef ds:uri="http://schemas.microsoft.com/sharepoint/v3/contenttype/forms"/>
+    <ds:schemaRef ds:uri="http://schemas.microsoft.com/office/2006/metadata/contentType"/>
+    <ds:schemaRef ds:uri="http://schemas.microsoft.com/office/2006/metadata/properties/metaAttributes"/>
+    <ds:schemaRef ds:uri="http://www.w3.org/2001/XMLSchema"/>
+    <ds:schemaRef ds:uri="http://schemas.microsoft.com/office/2006/metadata/properties"/>
+    <ds:schemaRef ds:uri="http://schemas.microsoft.com/sharepoint/v3"/>
+    <ds:schemaRef ds:uri="E64CF27C-2ECC-48E8-947E-CA63274FB2E8"/>
+    <ds:schemaRef ds:uri="http://schemas.microsoft.com/sharepoint/v3/fields"/>
+    <ds:schemaRef ds:uri="http://schemas.microsoft.com/office/2006/documentManagement/types"/>
+    <ds:schemaRef ds:uri="http://schemas.microsoft.com/office/infopath/2007/PartnerControls"/>
+    <ds:schemaRef ds:uri="http://schemas.openxmlformats.org/package/2006/metadata/core-properties"/>
+    <ds:schemaRef ds:uri="http://purl.org/dc/elements/1.1/"/>
+    <ds:schemaRef ds:uri="http://purl.org/dc/terms/"/>
+    <ds:schemaRef ds:uri="http://schemas.microsoft.com/internal/obd"/>
   </ds:schemaRefs>
 </ds:datastoreItem>
 </file>
@@ -4689,21 +5660,9 @@
 </file>
 
 <file path=customXml/itemProps3.xml><?xml version="1.0" encoding="utf-8"?>
-<ds:datastoreItem xmlns:ds="http://schemas.openxmlformats.org/officeDocument/2006/customXml" ds:itemID="{E57EBD8B-EA50-4231-9F03-F9188E4066E3}">
+<ds:datastoreItem xmlns:ds="http://schemas.openxmlformats.org/officeDocument/2006/customXml" ds:itemID="{B01F69EB-AD96-4AD6-8A18-0C8728F5F031}">
   <ds:schemaRefs>
-    <ds:schemaRef ds:uri="http://schemas.microsoft.com/office/2006/metadata/contentType"/>
-    <ds:schemaRef ds:uri="http://schemas.microsoft.com/office/2006/metadata/properties/metaAttributes"/>
-    <ds:schemaRef ds:uri="http://www.w3.org/2001/XMLSchema"/>
-    <ds:schemaRef ds:uri="http://schemas.microsoft.com/office/2006/metadata/properties"/>
-    <ds:schemaRef ds:uri="http://schemas.microsoft.com/sharepoint/v3"/>
-    <ds:schemaRef ds:uri="E64CF27C-2ECC-48E8-947E-CA63274FB2E8"/>
-    <ds:schemaRef ds:uri="http://schemas.microsoft.com/sharepoint/v3/fields"/>
-    <ds:schemaRef ds:uri="http://schemas.microsoft.com/office/2006/documentManagement/types"/>
-    <ds:schemaRef ds:uri="http://schemas.microsoft.com/office/infopath/2007/PartnerControls"/>
-    <ds:schemaRef ds:uri="http://schemas.openxmlformats.org/package/2006/metadata/core-properties"/>
-    <ds:schemaRef ds:uri="http://purl.org/dc/elements/1.1/"/>
-    <ds:schemaRef ds:uri="http://purl.org/dc/terms/"/>
-    <ds:schemaRef ds:uri="http://schemas.microsoft.com/internal/obd"/>
+    <ds:schemaRef ds:uri="http://schemas.microsoft.com/sharepoint/v3/contenttype/forms"/>
   </ds:schemaRefs>
 </ds:datastoreItem>
 </file>
</xml_diff>

<commit_message>
Remove filtering by PI, fix NA's on pie chart, fix 0 hours (fixed in Excel), change timeline to not be stratified by PI or project status
</commit_message>
<xml_diff>
--- a/Project management shiny app presentation.pptx
+++ b/Project management shiny app presentation.pptx
@@ -4,22 +4,26 @@
   <p:sldMasterIdLst>
     <p:sldMasterId id="2147483648" r:id="rId4"/>
   </p:sldMasterIdLst>
+  <p:notesMasterIdLst>
+    <p:notesMasterId r:id="rId21"/>
+  </p:notesMasterIdLst>
   <p:sldIdLst>
     <p:sldId id="256" r:id="rId5"/>
-    <p:sldId id="265" r:id="rId6"/>
-    <p:sldId id="258" r:id="rId7"/>
-    <p:sldId id="257" r:id="rId8"/>
-    <p:sldId id="259" r:id="rId9"/>
-    <p:sldId id="260" r:id="rId10"/>
-    <p:sldId id="266" r:id="rId11"/>
-    <p:sldId id="262" r:id="rId12"/>
-    <p:sldId id="264" r:id="rId13"/>
-    <p:sldId id="274" r:id="rId14"/>
+    <p:sldId id="277" r:id="rId6"/>
+    <p:sldId id="265" r:id="rId7"/>
+    <p:sldId id="258" r:id="rId8"/>
+    <p:sldId id="260" r:id="rId9"/>
+    <p:sldId id="259" r:id="rId10"/>
+    <p:sldId id="276" r:id="rId11"/>
+    <p:sldId id="266" r:id="rId12"/>
+    <p:sldId id="274" r:id="rId13"/>
+    <p:sldId id="257" r:id="rId14"/>
     <p:sldId id="275" r:id="rId15"/>
-    <p:sldId id="267" r:id="rId16"/>
-    <p:sldId id="263" r:id="rId17"/>
-    <p:sldId id="261" r:id="rId18"/>
-    <p:sldId id="273" r:id="rId19"/>
+    <p:sldId id="262" r:id="rId16"/>
+    <p:sldId id="264" r:id="rId17"/>
+    <p:sldId id="267" r:id="rId18"/>
+    <p:sldId id="263" r:id="rId19"/>
+    <p:sldId id="273" r:id="rId20"/>
   </p:sldIdLst>
   <p:sldSz cx="9144000" cy="6858000" type="screen4x3"/>
   <p:notesSz cx="6858000" cy="9144000"/>
@@ -165,6 +169,462 @@
     </p:ext>
   </p:extLst>
 </p:presentation>
+</file>
+
+<file path=ppt/notesMasters/notesMaster1.xml><?xml version="1.0" encoding="utf-8"?>
+<p:notesMaster xmlns:a="http://schemas.openxmlformats.org/drawingml/2006/main" xmlns:r="http://schemas.openxmlformats.org/officeDocument/2006/relationships" xmlns:p="http://schemas.openxmlformats.org/presentationml/2006/main">
+  <p:cSld>
+    <p:bg>
+      <p:bgRef idx="1001">
+        <a:schemeClr val="bg1"/>
+      </p:bgRef>
+    </p:bg>
+    <p:spTree>
+      <p:nvGrpSpPr>
+        <p:cNvPr id="1" name=""/>
+        <p:cNvGrpSpPr/>
+        <p:nvPr/>
+      </p:nvGrpSpPr>
+      <p:grpSpPr>
+        <a:xfrm>
+          <a:off x="0" y="0"/>
+          <a:ext cx="0" cy="0"/>
+          <a:chOff x="0" y="0"/>
+          <a:chExt cx="0" cy="0"/>
+        </a:xfrm>
+      </p:grpSpPr>
+      <p:sp>
+        <p:nvSpPr>
+          <p:cNvPr id="2" name="Header Placeholder 1"/>
+          <p:cNvSpPr>
+            <a:spLocks noGrp="1"/>
+          </p:cNvSpPr>
+          <p:nvPr>
+            <p:ph type="hdr" sz="quarter"/>
+          </p:nvPr>
+        </p:nvSpPr>
+        <p:spPr>
+          <a:xfrm>
+            <a:off x="0" y="0"/>
+            <a:ext cx="2971800" cy="458788"/>
+          </a:xfrm>
+          <a:prstGeom prst="rect">
+            <a:avLst/>
+          </a:prstGeom>
+        </p:spPr>
+        <p:txBody>
+          <a:bodyPr vert="horz" lIns="91440" tIns="45720" rIns="91440" bIns="45720" rtlCol="0"/>
+          <a:lstStyle>
+            <a:lvl1pPr algn="l">
+              <a:defRPr sz="1200"/>
+            </a:lvl1pPr>
+          </a:lstStyle>
+          <a:p>
+            <a:endParaRPr lang="en-US"/>
+          </a:p>
+        </p:txBody>
+      </p:sp>
+      <p:sp>
+        <p:nvSpPr>
+          <p:cNvPr id="3" name="Date Placeholder 2"/>
+          <p:cNvSpPr>
+            <a:spLocks noGrp="1"/>
+          </p:cNvSpPr>
+          <p:nvPr>
+            <p:ph type="dt" idx="1"/>
+          </p:nvPr>
+        </p:nvSpPr>
+        <p:spPr>
+          <a:xfrm>
+            <a:off x="3884613" y="0"/>
+            <a:ext cx="2971800" cy="458788"/>
+          </a:xfrm>
+          <a:prstGeom prst="rect">
+            <a:avLst/>
+          </a:prstGeom>
+        </p:spPr>
+        <p:txBody>
+          <a:bodyPr vert="horz" lIns="91440" tIns="45720" rIns="91440" bIns="45720" rtlCol="0"/>
+          <a:lstStyle>
+            <a:lvl1pPr algn="r">
+              <a:defRPr sz="1200"/>
+            </a:lvl1pPr>
+          </a:lstStyle>
+          <a:p>
+            <a:fld id="{7F6DE0E8-87C7-4A14-9F3C-CD4E49706B18}" type="datetimeFigureOut">
+              <a:rPr lang="en-US" smtClean="0"/>
+              <a:t>2/8/2020</a:t>
+            </a:fld>
+            <a:endParaRPr lang="en-US"/>
+          </a:p>
+        </p:txBody>
+      </p:sp>
+      <p:sp>
+        <p:nvSpPr>
+          <p:cNvPr id="4" name="Slide Image Placeholder 3"/>
+          <p:cNvSpPr>
+            <a:spLocks noGrp="1" noRot="1" noChangeAspect="1"/>
+          </p:cNvSpPr>
+          <p:nvPr>
+            <p:ph type="sldImg" idx="2"/>
+          </p:nvPr>
+        </p:nvSpPr>
+        <p:spPr>
+          <a:xfrm>
+            <a:off x="1371600" y="1143000"/>
+            <a:ext cx="4114800" cy="3086100"/>
+          </a:xfrm>
+          <a:prstGeom prst="rect">
+            <a:avLst/>
+          </a:prstGeom>
+          <a:noFill/>
+          <a:ln w="12700">
+            <a:solidFill>
+              <a:prstClr val="black"/>
+            </a:solidFill>
+          </a:ln>
+        </p:spPr>
+        <p:txBody>
+          <a:bodyPr vert="horz" lIns="91440" tIns="45720" rIns="91440" bIns="45720" rtlCol="0" anchor="ctr"/>
+          <a:lstStyle/>
+          <a:p>
+            <a:endParaRPr lang="en-US"/>
+          </a:p>
+        </p:txBody>
+      </p:sp>
+      <p:sp>
+        <p:nvSpPr>
+          <p:cNvPr id="5" name="Notes Placeholder 4"/>
+          <p:cNvSpPr>
+            <a:spLocks noGrp="1"/>
+          </p:cNvSpPr>
+          <p:nvPr>
+            <p:ph type="body" sz="quarter" idx="3"/>
+          </p:nvPr>
+        </p:nvSpPr>
+        <p:spPr>
+          <a:xfrm>
+            <a:off x="685800" y="4400550"/>
+            <a:ext cx="5486400" cy="3600450"/>
+          </a:xfrm>
+          <a:prstGeom prst="rect">
+            <a:avLst/>
+          </a:prstGeom>
+        </p:spPr>
+        <p:txBody>
+          <a:bodyPr vert="horz" lIns="91440" tIns="45720" rIns="91440" bIns="45720" rtlCol="0"/>
+          <a:lstStyle/>
+          <a:p>
+            <a:pPr lvl="0"/>
+            <a:r>
+              <a:rPr lang="en-US"/>
+              <a:t>Edit Master text styles</a:t>
+            </a:r>
+          </a:p>
+          <a:p>
+            <a:pPr lvl="1"/>
+            <a:r>
+              <a:rPr lang="en-US"/>
+              <a:t>Second level</a:t>
+            </a:r>
+          </a:p>
+          <a:p>
+            <a:pPr lvl="2"/>
+            <a:r>
+              <a:rPr lang="en-US"/>
+              <a:t>Third level</a:t>
+            </a:r>
+          </a:p>
+          <a:p>
+            <a:pPr lvl="3"/>
+            <a:r>
+              <a:rPr lang="en-US"/>
+              <a:t>Fourth level</a:t>
+            </a:r>
+          </a:p>
+          <a:p>
+            <a:pPr lvl="4"/>
+            <a:r>
+              <a:rPr lang="en-US"/>
+              <a:t>Fifth level</a:t>
+            </a:r>
+          </a:p>
+        </p:txBody>
+      </p:sp>
+      <p:sp>
+        <p:nvSpPr>
+          <p:cNvPr id="6" name="Footer Placeholder 5"/>
+          <p:cNvSpPr>
+            <a:spLocks noGrp="1"/>
+          </p:cNvSpPr>
+          <p:nvPr>
+            <p:ph type="ftr" sz="quarter" idx="4"/>
+          </p:nvPr>
+        </p:nvSpPr>
+        <p:spPr>
+          <a:xfrm>
+            <a:off x="0" y="8685213"/>
+            <a:ext cx="2971800" cy="458787"/>
+          </a:xfrm>
+          <a:prstGeom prst="rect">
+            <a:avLst/>
+          </a:prstGeom>
+        </p:spPr>
+        <p:txBody>
+          <a:bodyPr vert="horz" lIns="91440" tIns="45720" rIns="91440" bIns="45720" rtlCol="0" anchor="b"/>
+          <a:lstStyle>
+            <a:lvl1pPr algn="l">
+              <a:defRPr sz="1200"/>
+            </a:lvl1pPr>
+          </a:lstStyle>
+          <a:p>
+            <a:endParaRPr lang="en-US"/>
+          </a:p>
+        </p:txBody>
+      </p:sp>
+      <p:sp>
+        <p:nvSpPr>
+          <p:cNvPr id="7" name="Slide Number Placeholder 6"/>
+          <p:cNvSpPr>
+            <a:spLocks noGrp="1"/>
+          </p:cNvSpPr>
+          <p:nvPr>
+            <p:ph type="sldNum" sz="quarter" idx="5"/>
+          </p:nvPr>
+        </p:nvSpPr>
+        <p:spPr>
+          <a:xfrm>
+            <a:off x="3884613" y="8685213"/>
+            <a:ext cx="2971800" cy="458787"/>
+          </a:xfrm>
+          <a:prstGeom prst="rect">
+            <a:avLst/>
+          </a:prstGeom>
+        </p:spPr>
+        <p:txBody>
+          <a:bodyPr vert="horz" lIns="91440" tIns="45720" rIns="91440" bIns="45720" rtlCol="0" anchor="b"/>
+          <a:lstStyle>
+            <a:lvl1pPr algn="r">
+              <a:defRPr sz="1200"/>
+            </a:lvl1pPr>
+          </a:lstStyle>
+          <a:p>
+            <a:fld id="{9C5C8B17-D1C9-48DD-A1B1-EDA1E362804A}" type="slidenum">
+              <a:rPr lang="en-US" smtClean="0"/>
+              <a:t>‹#›</a:t>
+            </a:fld>
+            <a:endParaRPr lang="en-US"/>
+          </a:p>
+        </p:txBody>
+      </p:sp>
+    </p:spTree>
+    <p:extLst>
+      <p:ext uri="{BB962C8B-B14F-4D97-AF65-F5344CB8AC3E}">
+        <p14:creationId xmlns:p14="http://schemas.microsoft.com/office/powerpoint/2010/main" val="988251832"/>
+      </p:ext>
+    </p:extLst>
+  </p:cSld>
+  <p:clrMap bg1="lt1" tx1="dk1" bg2="lt2" tx2="dk2" accent1="accent1" accent2="accent2" accent3="accent3" accent4="accent4" accent5="accent5" accent6="accent6" hlink="hlink" folHlink="folHlink"/>
+  <p:notesStyle>
+    <a:lvl1pPr marL="0" algn="l" defTabSz="914400" rtl="0" eaLnBrk="1" latinLnBrk="0" hangingPunct="1">
+      <a:defRPr sz="1200" kern="1200">
+        <a:solidFill>
+          <a:schemeClr val="tx1"/>
+        </a:solidFill>
+        <a:latin typeface="+mn-lt"/>
+        <a:ea typeface="+mn-ea"/>
+        <a:cs typeface="+mn-cs"/>
+      </a:defRPr>
+    </a:lvl1pPr>
+    <a:lvl2pPr marL="457200" algn="l" defTabSz="914400" rtl="0" eaLnBrk="1" latinLnBrk="0" hangingPunct="1">
+      <a:defRPr sz="1200" kern="1200">
+        <a:solidFill>
+          <a:schemeClr val="tx1"/>
+        </a:solidFill>
+        <a:latin typeface="+mn-lt"/>
+        <a:ea typeface="+mn-ea"/>
+        <a:cs typeface="+mn-cs"/>
+      </a:defRPr>
+    </a:lvl2pPr>
+    <a:lvl3pPr marL="914400" algn="l" defTabSz="914400" rtl="0" eaLnBrk="1" latinLnBrk="0" hangingPunct="1">
+      <a:defRPr sz="1200" kern="1200">
+        <a:solidFill>
+          <a:schemeClr val="tx1"/>
+        </a:solidFill>
+        <a:latin typeface="+mn-lt"/>
+        <a:ea typeface="+mn-ea"/>
+        <a:cs typeface="+mn-cs"/>
+      </a:defRPr>
+    </a:lvl3pPr>
+    <a:lvl4pPr marL="1371600" algn="l" defTabSz="914400" rtl="0" eaLnBrk="1" latinLnBrk="0" hangingPunct="1">
+      <a:defRPr sz="1200" kern="1200">
+        <a:solidFill>
+          <a:schemeClr val="tx1"/>
+        </a:solidFill>
+        <a:latin typeface="+mn-lt"/>
+        <a:ea typeface="+mn-ea"/>
+        <a:cs typeface="+mn-cs"/>
+      </a:defRPr>
+    </a:lvl4pPr>
+    <a:lvl5pPr marL="1828800" algn="l" defTabSz="914400" rtl="0" eaLnBrk="1" latinLnBrk="0" hangingPunct="1">
+      <a:defRPr sz="1200" kern="1200">
+        <a:solidFill>
+          <a:schemeClr val="tx1"/>
+        </a:solidFill>
+        <a:latin typeface="+mn-lt"/>
+        <a:ea typeface="+mn-ea"/>
+        <a:cs typeface="+mn-cs"/>
+      </a:defRPr>
+    </a:lvl5pPr>
+    <a:lvl6pPr marL="2286000" algn="l" defTabSz="914400" rtl="0" eaLnBrk="1" latinLnBrk="0" hangingPunct="1">
+      <a:defRPr sz="1200" kern="1200">
+        <a:solidFill>
+          <a:schemeClr val="tx1"/>
+        </a:solidFill>
+        <a:latin typeface="+mn-lt"/>
+        <a:ea typeface="+mn-ea"/>
+        <a:cs typeface="+mn-cs"/>
+      </a:defRPr>
+    </a:lvl6pPr>
+    <a:lvl7pPr marL="2743200" algn="l" defTabSz="914400" rtl="0" eaLnBrk="1" latinLnBrk="0" hangingPunct="1">
+      <a:defRPr sz="1200" kern="1200">
+        <a:solidFill>
+          <a:schemeClr val="tx1"/>
+        </a:solidFill>
+        <a:latin typeface="+mn-lt"/>
+        <a:ea typeface="+mn-ea"/>
+        <a:cs typeface="+mn-cs"/>
+      </a:defRPr>
+    </a:lvl7pPr>
+    <a:lvl8pPr marL="3200400" algn="l" defTabSz="914400" rtl="0" eaLnBrk="1" latinLnBrk="0" hangingPunct="1">
+      <a:defRPr sz="1200" kern="1200">
+        <a:solidFill>
+          <a:schemeClr val="tx1"/>
+        </a:solidFill>
+        <a:latin typeface="+mn-lt"/>
+        <a:ea typeface="+mn-ea"/>
+        <a:cs typeface="+mn-cs"/>
+      </a:defRPr>
+    </a:lvl8pPr>
+    <a:lvl9pPr marL="3657600" algn="l" defTabSz="914400" rtl="0" eaLnBrk="1" latinLnBrk="0" hangingPunct="1">
+      <a:defRPr sz="1200" kern="1200">
+        <a:solidFill>
+          <a:schemeClr val="tx1"/>
+        </a:solidFill>
+        <a:latin typeface="+mn-lt"/>
+        <a:ea typeface="+mn-ea"/>
+        <a:cs typeface="+mn-cs"/>
+      </a:defRPr>
+    </a:lvl9pPr>
+  </p:notesStyle>
+</p:notesMaster>
+</file>
+
+<file path=ppt/notesSlides/notesSlide1.xml><?xml version="1.0" encoding="utf-8"?>
+<p:notes xmlns:a="http://schemas.openxmlformats.org/drawingml/2006/main" xmlns:r="http://schemas.openxmlformats.org/officeDocument/2006/relationships" xmlns:p="http://schemas.openxmlformats.org/presentationml/2006/main">
+  <p:cSld>
+    <p:spTree>
+      <p:nvGrpSpPr>
+        <p:cNvPr id="1" name=""/>
+        <p:cNvGrpSpPr/>
+        <p:nvPr/>
+      </p:nvGrpSpPr>
+      <p:grpSpPr>
+        <a:xfrm>
+          <a:off x="0" y="0"/>
+          <a:ext cx="0" cy="0"/>
+          <a:chOff x="0" y="0"/>
+          <a:chExt cx="0" cy="0"/>
+        </a:xfrm>
+      </p:grpSpPr>
+      <p:sp>
+        <p:nvSpPr>
+          <p:cNvPr id="2" name="Slide Image Placeholder 1"/>
+          <p:cNvSpPr>
+            <a:spLocks noGrp="1" noRot="1" noChangeAspect="1"/>
+          </p:cNvSpPr>
+          <p:nvPr>
+            <p:ph type="sldImg"/>
+          </p:nvPr>
+        </p:nvSpPr>
+        <p:spPr/>
+      </p:sp>
+      <p:sp>
+        <p:nvSpPr>
+          <p:cNvPr id="3" name="Notes Placeholder 2"/>
+          <p:cNvSpPr>
+            <a:spLocks noGrp="1"/>
+          </p:cNvSpPr>
+          <p:nvPr>
+            <p:ph type="body" idx="1"/>
+          </p:nvPr>
+        </p:nvSpPr>
+        <p:spPr/>
+        <p:txBody>
+          <a:bodyPr/>
+          <a:lstStyle/>
+          <a:p>
+            <a:pPr marL="171450" marR="0" lvl="0" indent="-171450" algn="l" defTabSz="914400" rtl="0" eaLnBrk="1" fontAlgn="auto" latinLnBrk="0" hangingPunct="1">
+              <a:lnSpc>
+                <a:spcPct val="100000"/>
+              </a:lnSpc>
+              <a:spcBef>
+                <a:spcPts val="0"/>
+              </a:spcBef>
+              <a:spcAft>
+                <a:spcPts val="0"/>
+              </a:spcAft>
+              <a:buClrTx/>
+              <a:buSzTx/>
+              <a:buFont typeface="Arial" panose="020B0604020202020204" pitchFamily="34" charset="0"/>
+              <a:buChar char="•"/>
+              <a:tabLst/>
+              <a:defRPr/>
+            </a:pPr>
+            <a:r>
+              <a:rPr lang="en-US" sz="1200" dirty="0"/>
+              <a:t>Sometimes useful for effort certification reports if your organization requires them</a:t>
+            </a:r>
+          </a:p>
+          <a:p>
+            <a:endParaRPr lang="en-US" dirty="0"/>
+          </a:p>
+        </p:txBody>
+      </p:sp>
+      <p:sp>
+        <p:nvSpPr>
+          <p:cNvPr id="4" name="Slide Number Placeholder 3"/>
+          <p:cNvSpPr>
+            <a:spLocks noGrp="1"/>
+          </p:cNvSpPr>
+          <p:nvPr>
+            <p:ph type="sldNum" sz="quarter" idx="5"/>
+          </p:nvPr>
+        </p:nvSpPr>
+        <p:spPr/>
+        <p:txBody>
+          <a:bodyPr/>
+          <a:lstStyle/>
+          <a:p>
+            <a:fld id="{9C5C8B17-D1C9-48DD-A1B1-EDA1E362804A}" type="slidenum">
+              <a:rPr lang="en-US" smtClean="0"/>
+              <a:t>4</a:t>
+            </a:fld>
+            <a:endParaRPr lang="en-US"/>
+          </a:p>
+        </p:txBody>
+      </p:sp>
+    </p:spTree>
+    <p:extLst>
+      <p:ext uri="{BB962C8B-B14F-4D97-AF65-F5344CB8AC3E}">
+        <p14:creationId xmlns:p14="http://schemas.microsoft.com/office/powerpoint/2010/main" val="3803714214"/>
+      </p:ext>
+    </p:extLst>
+  </p:cSld>
+  <p:clrMapOvr>
+    <a:masterClrMapping/>
+  </p:clrMapOvr>
+</p:notes>
 </file>
 
 <file path=ppt/slideLayouts/slideLayout1.xml><?xml version="1.0" encoding="utf-8"?>
@@ -3193,7 +3653,7 @@
           <p:cNvPr id="2" name="Title 1">
             <a:extLst>
               <a:ext uri="{FF2B5EF4-FFF2-40B4-BE49-F238E27FC236}">
-                <a16:creationId xmlns:a16="http://schemas.microsoft.com/office/drawing/2014/main" id="{66C5FB7E-AA55-4632-9059-CCAD4F92CBDB}"/>
+                <a16:creationId xmlns:a16="http://schemas.microsoft.com/office/drawing/2014/main" id="{FD6491AE-52FD-4B48-884B-0D335ACDEACF}"/>
               </a:ext>
             </a:extLst>
           </p:cNvPr>
@@ -3211,7 +3671,7 @@
           <a:p>
             <a:r>
               <a:rPr lang="en-US" dirty="0"/>
-              <a:t>CODE</a:t>
+              <a:t>Tracking time</a:t>
             </a:r>
           </a:p>
         </p:txBody>
@@ -3221,7 +3681,7 @@
           <p:cNvPr id="3" name="Content Placeholder 2">
             <a:extLst>
               <a:ext uri="{FF2B5EF4-FFF2-40B4-BE49-F238E27FC236}">
-                <a16:creationId xmlns:a16="http://schemas.microsoft.com/office/drawing/2014/main" id="{4BB3C2CE-16FB-48DF-A561-01920B9984E5}"/>
+                <a16:creationId xmlns:a16="http://schemas.microsoft.com/office/drawing/2014/main" id="{1F882B4D-9B18-448E-A594-C83072C8D8AB}"/>
               </a:ext>
             </a:extLst>
           </p:cNvPr>
@@ -3238,93 +3698,30 @@
           <a:lstStyle/>
           <a:p>
             <a:r>
-              <a:rPr lang="en-US" dirty="0"/>
-              <a:t>Excel spreadsheet setup</a:t>
-            </a:r>
-          </a:p>
-        </p:txBody>
-      </p:sp>
-      <p:pic>
-        <p:nvPicPr>
-          <p:cNvPr id="3074" name="Picture 2" descr="Image result for ms excel">
-            <a:extLst>
-              <a:ext uri="{FF2B5EF4-FFF2-40B4-BE49-F238E27FC236}">
-                <a16:creationId xmlns:a16="http://schemas.microsoft.com/office/drawing/2014/main" id="{4D13D626-68E4-45B8-9FC4-A81965D936BB}"/>
-              </a:ext>
-            </a:extLst>
-          </p:cNvPr>
-          <p:cNvPicPr>
-            <a:picLocks noChangeAspect="1" noChangeArrowheads="1"/>
-          </p:cNvPicPr>
-          <p:nvPr/>
-        </p:nvPicPr>
-        <p:blipFill>
-          <a:blip r:embed="rId2">
-            <a:extLst>
-              <a:ext uri="{28A0092B-C50C-407E-A947-70E740481C1C}">
-                <a14:useLocalDpi xmlns:a14="http://schemas.microsoft.com/office/drawing/2010/main" val="0"/>
-              </a:ext>
-            </a:extLst>
-          </a:blip>
-          <a:srcRect/>
-          <a:stretch>
-            <a:fillRect/>
-          </a:stretch>
-        </p:blipFill>
-        <p:spPr bwMode="auto">
-          <a:xfrm>
-            <a:off x="1104340" y="2345952"/>
-            <a:ext cx="1771650" cy="1771650"/>
-          </a:xfrm>
-          <a:prstGeom prst="rect">
-            <a:avLst/>
-          </a:prstGeom>
-          <a:noFill/>
-          <a:extLst>
-            <a:ext uri="{909E8E84-426E-40DD-AFC4-6F175D3DCCD1}">
-              <a14:hiddenFill xmlns:a14="http://schemas.microsoft.com/office/drawing/2010/main">
-                <a:solidFill>
-                  <a:srgbClr val="FFFFFF"/>
-                </a:solidFill>
-              </a14:hiddenFill>
-            </a:ext>
-          </a:extLst>
-        </p:spPr>
-      </p:pic>
-      <p:pic>
-        <p:nvPicPr>
-          <p:cNvPr id="5" name="Picture 4">
-            <a:extLst>
-              <a:ext uri="{FF2B5EF4-FFF2-40B4-BE49-F238E27FC236}">
-                <a16:creationId xmlns:a16="http://schemas.microsoft.com/office/drawing/2014/main" id="{2885F98E-6D86-4EAC-B4D4-D11E3A1090A6}"/>
-              </a:ext>
-            </a:extLst>
-          </p:cNvPr>
-          <p:cNvPicPr>
-            <a:picLocks noChangeAspect="1"/>
-          </p:cNvPicPr>
-          <p:nvPr/>
-        </p:nvPicPr>
-        <p:blipFill>
-          <a:blip r:embed="rId3"/>
-          <a:stretch>
-            <a:fillRect/>
-          </a:stretch>
-        </p:blipFill>
-        <p:spPr>
-          <a:xfrm>
-            <a:off x="4716137" y="2528045"/>
-            <a:ext cx="3359382" cy="1179681"/>
-          </a:xfrm>
-          <a:prstGeom prst="rect">
-            <a:avLst/>
-          </a:prstGeom>
-        </p:spPr>
-      </p:pic>
+              <a:rPr lang="en-US" sz="2800" dirty="0"/>
+              <a:t>Doesn’t have to be down to the minute</a:t>
+            </a:r>
+          </a:p>
+          <a:p>
+            <a:pPr lvl="1"/>
+            <a:r>
+              <a:rPr lang="en-US" sz="2400" dirty="0"/>
+              <a:t>At most granular, 15 minute increments</a:t>
+            </a:r>
+          </a:p>
+          <a:p>
+            <a:pPr lvl="1"/>
+            <a:r>
+              <a:rPr lang="en-US" sz="2400" dirty="0"/>
+              <a:t>At least granular, entire day</a:t>
+            </a:r>
+          </a:p>
+        </p:txBody>
+      </p:sp>
     </p:spTree>
     <p:extLst>
       <p:ext uri="{BB962C8B-B14F-4D97-AF65-F5344CB8AC3E}">
-        <p14:creationId xmlns:p14="http://schemas.microsoft.com/office/powerpoint/2010/main" val="2504891058"/>
+        <p14:creationId xmlns:p14="http://schemas.microsoft.com/office/powerpoint/2010/main" val="2590693224"/>
       </p:ext>
     </p:extLst>
   </p:cSld>
@@ -3439,7 +3836,7 @@
           <p:cNvPr id="2" name="Title 1">
             <a:extLst>
               <a:ext uri="{FF2B5EF4-FFF2-40B4-BE49-F238E27FC236}">
-                <a16:creationId xmlns:a16="http://schemas.microsoft.com/office/drawing/2014/main" id="{3735F51F-7E07-4A40-BC26-034C4B71F632}"/>
+                <a16:creationId xmlns:a16="http://schemas.microsoft.com/office/drawing/2014/main" id="{633F03C8-ABD3-4A00-AD80-087F21332873}"/>
               </a:ext>
             </a:extLst>
           </p:cNvPr>
@@ -3457,7 +3854,7 @@
           <a:p>
             <a:r>
               <a:rPr lang="en-US" dirty="0"/>
-              <a:t>Alternative solutions: Pros &amp; cons</a:t>
+              <a:t>Caveats</a:t>
             </a:r>
           </a:p>
         </p:txBody>
@@ -3467,7 +3864,7 @@
           <p:cNvPr id="3" name="Content Placeholder 2">
             <a:extLst>
               <a:ext uri="{FF2B5EF4-FFF2-40B4-BE49-F238E27FC236}">
-                <a16:creationId xmlns:a16="http://schemas.microsoft.com/office/drawing/2014/main" id="{0FA13A17-1F28-419E-A2F0-EC80DFDFACF0}"/>
+                <a16:creationId xmlns:a16="http://schemas.microsoft.com/office/drawing/2014/main" id="{D263E9DF-7C0F-4369-8FD3-EEA6C90D66F0}"/>
               </a:ext>
             </a:extLst>
           </p:cNvPr>
@@ -3484,151 +3881,24 @@
           <a:lstStyle/>
           <a:p>
             <a:r>
-              <a:rPr lang="en-US" sz="2400" dirty="0"/>
-              <a:t>Other time tracking software &amp; reporting is available:</a:t>
-            </a:r>
-          </a:p>
-          <a:p>
-            <a:pPr lvl="1"/>
-            <a:r>
-              <a:rPr lang="en-US" sz="2000" dirty="0"/>
-              <a:t>Toggl (free and paid versions), </a:t>
-            </a:r>
-            <a:r>
-              <a:rPr lang="en-US" sz="2000" dirty="0" err="1"/>
-              <a:t>RescueTime</a:t>
-            </a:r>
-            <a:r>
-              <a:rPr lang="en-US" sz="2000" dirty="0"/>
-              <a:t>, </a:t>
-            </a:r>
-            <a:r>
-              <a:rPr lang="en-US" sz="2000" dirty="0" err="1"/>
-              <a:t>Everhour</a:t>
-            </a:r>
-            <a:endParaRPr lang="en-US" sz="2000" dirty="0"/>
-          </a:p>
-          <a:p>
-            <a:endParaRPr lang="en-US" sz="2400" dirty="0"/>
-          </a:p>
-        </p:txBody>
-      </p:sp>
-      <p:sp>
-        <p:nvSpPr>
-          <p:cNvPr id="4" name="TextBox 3">
-            <a:extLst>
-              <a:ext uri="{FF2B5EF4-FFF2-40B4-BE49-F238E27FC236}">
-                <a16:creationId xmlns:a16="http://schemas.microsoft.com/office/drawing/2014/main" id="{AECAE897-351D-421A-A038-3AC7EECFC29A}"/>
-              </a:ext>
-            </a:extLst>
-          </p:cNvPr>
-          <p:cNvSpPr txBox="1"/>
-          <p:nvPr/>
-        </p:nvSpPr>
-        <p:spPr>
-          <a:xfrm>
-            <a:off x="765629" y="2542617"/>
-            <a:ext cx="2466381" cy="923330"/>
-          </a:xfrm>
-          <a:prstGeom prst="rect">
-            <a:avLst/>
-          </a:prstGeom>
-          <a:noFill/>
-        </p:spPr>
-        <p:txBody>
-          <a:bodyPr wrap="none" rtlCol="0">
-            <a:spAutoFit/>
-          </a:bodyPr>
-          <a:lstStyle/>
-          <a:p>
-            <a:r>
-              <a:rPr lang="en-US" dirty="0"/>
-              <a:t>Pros to DIY Shiny App:</a:t>
-            </a:r>
-          </a:p>
-          <a:p>
-            <a:pPr marL="285750" indent="-285750">
-              <a:buFont typeface="Arial" panose="020B0604020202020204" pitchFamily="34" charset="0"/>
-              <a:buChar char="•"/>
-            </a:pPr>
-            <a:r>
-              <a:rPr lang="en-US" dirty="0"/>
-              <a:t>Entirely customizable</a:t>
-            </a:r>
-          </a:p>
-          <a:p>
-            <a:pPr marL="285750" indent="-285750">
-              <a:buFont typeface="Arial" panose="020B0604020202020204" pitchFamily="34" charset="0"/>
-              <a:buChar char="•"/>
-            </a:pPr>
-            <a:r>
-              <a:rPr lang="en-US" dirty="0"/>
-              <a:t>Free! </a:t>
-            </a:r>
-          </a:p>
-        </p:txBody>
-      </p:sp>
-      <p:sp>
-        <p:nvSpPr>
-          <p:cNvPr id="5" name="TextBox 4">
-            <a:extLst>
-              <a:ext uri="{FF2B5EF4-FFF2-40B4-BE49-F238E27FC236}">
-                <a16:creationId xmlns:a16="http://schemas.microsoft.com/office/drawing/2014/main" id="{89ABEAB4-D389-49FD-8DE1-C74061A5FF75}"/>
-              </a:ext>
-            </a:extLst>
-          </p:cNvPr>
-          <p:cNvSpPr txBox="1"/>
-          <p:nvPr/>
-        </p:nvSpPr>
-        <p:spPr>
-          <a:xfrm>
-            <a:off x="4455459" y="2542617"/>
-            <a:ext cx="4518212" cy="2031325"/>
-          </a:xfrm>
-          <a:prstGeom prst="rect">
-            <a:avLst/>
-          </a:prstGeom>
-          <a:noFill/>
-        </p:spPr>
-        <p:txBody>
-          <a:bodyPr wrap="square" rtlCol="0">
-            <a:spAutoFit/>
-          </a:bodyPr>
-          <a:lstStyle/>
-          <a:p>
-            <a:r>
-              <a:rPr lang="en-US" dirty="0"/>
-              <a:t>Pros to other software/trackers:</a:t>
-            </a:r>
-          </a:p>
-          <a:p>
-            <a:pPr marL="285750" indent="-285750">
-              <a:buFont typeface="Arial" panose="020B0604020202020204" pitchFamily="34" charset="0"/>
-              <a:buChar char="•"/>
-            </a:pPr>
-            <a:r>
-              <a:rPr lang="en-US" dirty="0"/>
-              <a:t>Less labor intensive/maintenance not required</a:t>
-            </a:r>
-          </a:p>
-          <a:p>
-            <a:pPr marL="285750" indent="-285750">
-              <a:buFont typeface="Arial" panose="020B0604020202020204" pitchFamily="34" charset="0"/>
-              <a:buChar char="•"/>
-            </a:pPr>
-            <a:r>
-              <a:rPr lang="en-US" dirty="0"/>
-              <a:t>Can monitor apps and URLs used and identify distracters (hello Slack!)</a:t>
-            </a:r>
-          </a:p>
-          <a:p>
-            <a:pPr marL="285750" indent="-285750">
-              <a:buFont typeface="Arial" panose="020B0604020202020204" pitchFamily="34" charset="0"/>
-              <a:buChar char="•"/>
-            </a:pPr>
-            <a:r>
-              <a:rPr lang="en-US" dirty="0"/>
-              <a:t>More precise: down to the minute (if this is desired)</a:t>
+              <a:rPr lang="en-US" sz="2800" dirty="0"/>
+              <a:t>The obvious: this is only useful if you track your time</a:t>
+            </a:r>
+          </a:p>
+          <a:p>
+            <a:r>
+              <a:rPr lang="en-US" sz="2800" dirty="0"/>
+              <a:t>Be careful about your denominators! This is a count of </a:t>
+            </a:r>
+            <a:r>
+              <a:rPr lang="en-US" sz="2800" i="1" dirty="0"/>
+              <a:t>what you recorded</a:t>
+            </a:r>
+          </a:p>
+          <a:p>
+            <a:r>
+              <a:rPr lang="en-US" sz="2800" dirty="0"/>
+              <a:t>Entirely retrospective: it’s a summary of what you’ve done, doesn’t include projected time allocations</a:t>
             </a:r>
           </a:p>
         </p:txBody>
@@ -3636,7 +3906,7 @@
     </p:spTree>
     <p:extLst>
       <p:ext uri="{BB962C8B-B14F-4D97-AF65-F5344CB8AC3E}">
-        <p14:creationId xmlns:p14="http://schemas.microsoft.com/office/powerpoint/2010/main" val="3083300731"/>
+        <p14:creationId xmlns:p14="http://schemas.microsoft.com/office/powerpoint/2010/main" val="2875116697"/>
       </p:ext>
     </p:extLst>
   </p:cSld>
@@ -3668,7 +3938,7 @@
           <p:cNvPr id="2" name="Title 1">
             <a:extLst>
               <a:ext uri="{FF2B5EF4-FFF2-40B4-BE49-F238E27FC236}">
-                <a16:creationId xmlns:a16="http://schemas.microsoft.com/office/drawing/2014/main" id="{8B4B5790-0EA7-4012-93A7-22425D41E1E3}"/>
+                <a16:creationId xmlns:a16="http://schemas.microsoft.com/office/drawing/2014/main" id="{61CD5D77-E3C4-4FBF-8330-3DEFB2FC3626}"/>
               </a:ext>
             </a:extLst>
           </p:cNvPr>
@@ -3686,7 +3956,7 @@
           <a:p>
             <a:r>
               <a:rPr lang="en-US" dirty="0"/>
-              <a:t>Future plans</a:t>
+              <a:t>Adapting the app for your own use</a:t>
             </a:r>
           </a:p>
         </p:txBody>
@@ -3696,7 +3966,7 @@
           <p:cNvPr id="3" name="Content Placeholder 2">
             <a:extLst>
               <a:ext uri="{FF2B5EF4-FFF2-40B4-BE49-F238E27FC236}">
-                <a16:creationId xmlns:a16="http://schemas.microsoft.com/office/drawing/2014/main" id="{4851F475-9DB2-4FC0-B370-DDE4324E134A}"/>
+                <a16:creationId xmlns:a16="http://schemas.microsoft.com/office/drawing/2014/main" id="{BF5C20CB-2264-42BE-90A9-6CD9BBDD303F}"/>
               </a:ext>
             </a:extLst>
           </p:cNvPr>
@@ -3713,28 +3983,14 @@
           <a:lstStyle/>
           <a:p>
             <a:r>
-              <a:rPr lang="en-US" dirty="0"/>
-              <a:t>Incorporate with Toggl app to automate a portion of the tracking</a:t>
-            </a:r>
-          </a:p>
-          <a:p>
-            <a:pPr lvl="1"/>
-            <a:r>
-              <a:rPr lang="en-US" dirty="0"/>
-              <a:t>Automated + customizable: best of both worlds?</a:t>
-            </a:r>
-          </a:p>
-          <a:p>
-            <a:r>
-              <a:rPr lang="en-US" dirty="0"/>
-              <a:t>Incorporate additional visualizations and/or summary measures</a:t>
-            </a:r>
-          </a:p>
-          <a:p>
-            <a:pPr lvl="1"/>
-            <a:r>
-              <a:rPr lang="en-US" dirty="0"/>
-              <a:t>Suggestions?</a:t>
+              <a:rPr lang="en-US" sz="2800" dirty="0"/>
+              <a:t>Can track whichever components of your time you’re interested in</a:t>
+            </a:r>
+          </a:p>
+          <a:p>
+            <a:r>
+              <a:rPr lang="en-US" sz="2800" dirty="0"/>
+              <a:t>Can be used to summarize “current” time (active projects) or view long-term project trajectories</a:t>
             </a:r>
           </a:p>
         </p:txBody>
@@ -3742,7 +3998,7 @@
     </p:spTree>
     <p:extLst>
       <p:ext uri="{BB962C8B-B14F-4D97-AF65-F5344CB8AC3E}">
-        <p14:creationId xmlns:p14="http://schemas.microsoft.com/office/powerpoint/2010/main" val="1128304148"/>
+        <p14:creationId xmlns:p14="http://schemas.microsoft.com/office/powerpoint/2010/main" val="2232906021"/>
       </p:ext>
     </p:extLst>
   </p:cSld>
@@ -3774,7 +4030,7 @@
           <p:cNvPr id="2" name="Title 1">
             <a:extLst>
               <a:ext uri="{FF2B5EF4-FFF2-40B4-BE49-F238E27FC236}">
-                <a16:creationId xmlns:a16="http://schemas.microsoft.com/office/drawing/2014/main" id="{CFD1A390-01F3-41EC-A21A-C0F8AE22ED16}"/>
+                <a16:creationId xmlns:a16="http://schemas.microsoft.com/office/drawing/2014/main" id="{3735F51F-7E07-4A40-BC26-034C4B71F632}"/>
               </a:ext>
             </a:extLst>
           </p:cNvPr>
@@ -3792,7 +4048,7 @@
           <a:p>
             <a:r>
               <a:rPr lang="en-US" dirty="0"/>
-              <a:t>References</a:t>
+              <a:t>Alternative solutions: Pros &amp; cons</a:t>
             </a:r>
           </a:p>
         </p:txBody>
@@ -3802,7 +4058,7 @@
           <p:cNvPr id="3" name="Content Placeholder 2">
             <a:extLst>
               <a:ext uri="{FF2B5EF4-FFF2-40B4-BE49-F238E27FC236}">
-                <a16:creationId xmlns:a16="http://schemas.microsoft.com/office/drawing/2014/main" id="{525BAE00-D3F8-479E-BD2A-2045BF753653}"/>
+                <a16:creationId xmlns:a16="http://schemas.microsoft.com/office/drawing/2014/main" id="{0FA13A17-1F28-419E-A2F0-EC80DFDFACF0}"/>
               </a:ext>
             </a:extLst>
           </p:cNvPr>
@@ -3819,23 +4075,159 @@
           <a:lstStyle/>
           <a:p>
             <a:r>
-              <a:rPr lang="en-US" sz="2800" dirty="0"/>
-              <a:t>GitHub Repo: </a:t>
-            </a:r>
-            <a:r>
-              <a:rPr lang="en-US" sz="2800" dirty="0">
-                <a:hlinkClick r:id="rId2"/>
-              </a:rPr>
-              <a:t>https://github.com/jalavery/proj_mgmnt</a:t>
-            </a:r>
-            <a:endParaRPr lang="en-US" sz="2800" dirty="0"/>
+              <a:rPr lang="en-US" sz="2400" dirty="0"/>
+              <a:t>Other time tracking software &amp; reporting is available:</a:t>
+            </a:r>
+          </a:p>
+          <a:p>
+            <a:pPr lvl="1"/>
+            <a:r>
+              <a:rPr lang="en-US" sz="2000" dirty="0"/>
+              <a:t>Toggl (free and paid versions), </a:t>
+            </a:r>
+            <a:r>
+              <a:rPr lang="en-US" sz="2000" dirty="0" err="1"/>
+              <a:t>RescueTime</a:t>
+            </a:r>
+            <a:r>
+              <a:rPr lang="en-US" sz="2000" dirty="0"/>
+              <a:t>, </a:t>
+            </a:r>
+            <a:r>
+              <a:rPr lang="en-US" sz="2000" dirty="0" err="1"/>
+              <a:t>Everhour</a:t>
+            </a:r>
+            <a:endParaRPr lang="en-US" sz="2000" dirty="0"/>
+          </a:p>
+          <a:p>
+            <a:endParaRPr lang="en-US" sz="2400" dirty="0"/>
+          </a:p>
+        </p:txBody>
+      </p:sp>
+      <p:sp>
+        <p:nvSpPr>
+          <p:cNvPr id="4" name="TextBox 3">
+            <a:extLst>
+              <a:ext uri="{FF2B5EF4-FFF2-40B4-BE49-F238E27FC236}">
+                <a16:creationId xmlns:a16="http://schemas.microsoft.com/office/drawing/2014/main" id="{AECAE897-351D-421A-A038-3AC7EECFC29A}"/>
+              </a:ext>
+            </a:extLst>
+          </p:cNvPr>
+          <p:cNvSpPr txBox="1"/>
+          <p:nvPr/>
+        </p:nvSpPr>
+        <p:spPr>
+          <a:xfrm>
+            <a:off x="765629" y="2542617"/>
+            <a:ext cx="2466381" cy="923330"/>
+          </a:xfrm>
+          <a:prstGeom prst="rect">
+            <a:avLst/>
+          </a:prstGeom>
+          <a:noFill/>
+        </p:spPr>
+        <p:txBody>
+          <a:bodyPr wrap="none" rtlCol="0">
+            <a:spAutoFit/>
+          </a:bodyPr>
+          <a:lstStyle/>
+          <a:p>
+            <a:r>
+              <a:rPr lang="en-US" dirty="0"/>
+              <a:t>Pros to DIY Shiny App:</a:t>
+            </a:r>
+          </a:p>
+          <a:p>
+            <a:pPr marL="285750" indent="-285750">
+              <a:buFont typeface="Arial" panose="020B0604020202020204" pitchFamily="34" charset="0"/>
+              <a:buChar char="•"/>
+            </a:pPr>
+            <a:r>
+              <a:rPr lang="en-US" dirty="0"/>
+              <a:t>Entirely customizable</a:t>
+            </a:r>
+          </a:p>
+          <a:p>
+            <a:pPr marL="285750" indent="-285750">
+              <a:buFont typeface="Arial" panose="020B0604020202020204" pitchFamily="34" charset="0"/>
+              <a:buChar char="•"/>
+            </a:pPr>
+            <a:r>
+              <a:rPr lang="en-US" dirty="0"/>
+              <a:t>Free! </a:t>
+            </a:r>
+          </a:p>
+        </p:txBody>
+      </p:sp>
+      <p:sp>
+        <p:nvSpPr>
+          <p:cNvPr id="5" name="TextBox 4">
+            <a:extLst>
+              <a:ext uri="{FF2B5EF4-FFF2-40B4-BE49-F238E27FC236}">
+                <a16:creationId xmlns:a16="http://schemas.microsoft.com/office/drawing/2014/main" id="{89ABEAB4-D389-49FD-8DE1-C74061A5FF75}"/>
+              </a:ext>
+            </a:extLst>
+          </p:cNvPr>
+          <p:cNvSpPr txBox="1"/>
+          <p:nvPr/>
+        </p:nvSpPr>
+        <p:spPr>
+          <a:xfrm>
+            <a:off x="4455459" y="2542617"/>
+            <a:ext cx="4518212" cy="2031325"/>
+          </a:xfrm>
+          <a:prstGeom prst="rect">
+            <a:avLst/>
+          </a:prstGeom>
+          <a:noFill/>
+        </p:spPr>
+        <p:txBody>
+          <a:bodyPr wrap="square" rtlCol="0">
+            <a:spAutoFit/>
+          </a:bodyPr>
+          <a:lstStyle/>
+          <a:p>
+            <a:r>
+              <a:rPr lang="en-US" dirty="0"/>
+              <a:t>Pros to other software/trackers:</a:t>
+            </a:r>
+          </a:p>
+          <a:p>
+            <a:pPr marL="285750" indent="-285750">
+              <a:buFont typeface="Arial" panose="020B0604020202020204" pitchFamily="34" charset="0"/>
+              <a:buChar char="•"/>
+            </a:pPr>
+            <a:r>
+              <a:rPr lang="en-US" dirty="0"/>
+              <a:t>Less labor intensive/maintenance not required</a:t>
+            </a:r>
+          </a:p>
+          <a:p>
+            <a:pPr marL="285750" indent="-285750">
+              <a:buFont typeface="Arial" panose="020B0604020202020204" pitchFamily="34" charset="0"/>
+              <a:buChar char="•"/>
+            </a:pPr>
+            <a:r>
+              <a:rPr lang="en-US" dirty="0"/>
+              <a:t>Can monitor apps and URLs used and identify distracters (hello Slack!)</a:t>
+            </a:r>
+          </a:p>
+          <a:p>
+            <a:pPr marL="285750" indent="-285750">
+              <a:buFont typeface="Arial" panose="020B0604020202020204" pitchFamily="34" charset="0"/>
+              <a:buChar char="•"/>
+            </a:pPr>
+            <a:r>
+              <a:rPr lang="en-US" dirty="0"/>
+              <a:t>More precise: down to the minute (if this is desired)</a:t>
+            </a:r>
           </a:p>
         </p:txBody>
       </p:sp>
     </p:spTree>
     <p:extLst>
       <p:ext uri="{BB962C8B-B14F-4D97-AF65-F5344CB8AC3E}">
-        <p14:creationId xmlns:p14="http://schemas.microsoft.com/office/powerpoint/2010/main" val="1075239667"/>
+        <p14:creationId xmlns:p14="http://schemas.microsoft.com/office/powerpoint/2010/main" val="3083300731"/>
       </p:ext>
     </p:extLst>
   </p:cSld>
@@ -3864,6 +4256,112 @@
       </p:grpSpPr>
       <p:sp>
         <p:nvSpPr>
+          <p:cNvPr id="2" name="Title 1">
+            <a:extLst>
+              <a:ext uri="{FF2B5EF4-FFF2-40B4-BE49-F238E27FC236}">
+                <a16:creationId xmlns:a16="http://schemas.microsoft.com/office/drawing/2014/main" id="{8B4B5790-0EA7-4012-93A7-22425D41E1E3}"/>
+              </a:ext>
+            </a:extLst>
+          </p:cNvPr>
+          <p:cNvSpPr>
+            <a:spLocks noGrp="1"/>
+          </p:cNvSpPr>
+          <p:nvPr>
+            <p:ph type="title"/>
+          </p:nvPr>
+        </p:nvSpPr>
+        <p:spPr/>
+        <p:txBody>
+          <a:bodyPr/>
+          <a:lstStyle/>
+          <a:p>
+            <a:r>
+              <a:rPr lang="en-US" dirty="0"/>
+              <a:t>Future plans</a:t>
+            </a:r>
+          </a:p>
+        </p:txBody>
+      </p:sp>
+      <p:sp>
+        <p:nvSpPr>
+          <p:cNvPr id="3" name="Content Placeholder 2">
+            <a:extLst>
+              <a:ext uri="{FF2B5EF4-FFF2-40B4-BE49-F238E27FC236}">
+                <a16:creationId xmlns:a16="http://schemas.microsoft.com/office/drawing/2014/main" id="{4851F475-9DB2-4FC0-B370-DDE4324E134A}"/>
+              </a:ext>
+            </a:extLst>
+          </p:cNvPr>
+          <p:cNvSpPr>
+            <a:spLocks noGrp="1"/>
+          </p:cNvSpPr>
+          <p:nvPr>
+            <p:ph idx="1"/>
+          </p:nvPr>
+        </p:nvSpPr>
+        <p:spPr/>
+        <p:txBody>
+          <a:bodyPr/>
+          <a:lstStyle/>
+          <a:p>
+            <a:r>
+              <a:rPr lang="en-US" dirty="0"/>
+              <a:t>Incorporate with Toggl app to automate a portion of the tracking</a:t>
+            </a:r>
+          </a:p>
+          <a:p>
+            <a:pPr lvl="1"/>
+            <a:r>
+              <a:rPr lang="en-US" dirty="0"/>
+              <a:t>Automated time tracking + customizable reporting = best of both worlds?</a:t>
+            </a:r>
+          </a:p>
+          <a:p>
+            <a:r>
+              <a:rPr lang="en-US" dirty="0"/>
+              <a:t>Incorporate additional visualizations and/or summary measures</a:t>
+            </a:r>
+          </a:p>
+          <a:p>
+            <a:pPr lvl="1"/>
+            <a:r>
+              <a:rPr lang="en-US" dirty="0"/>
+              <a:t>Suggestions?</a:t>
+            </a:r>
+          </a:p>
+        </p:txBody>
+      </p:sp>
+    </p:spTree>
+    <p:extLst>
+      <p:ext uri="{BB962C8B-B14F-4D97-AF65-F5344CB8AC3E}">
+        <p14:creationId xmlns:p14="http://schemas.microsoft.com/office/powerpoint/2010/main" val="1128304148"/>
+      </p:ext>
+    </p:extLst>
+  </p:cSld>
+  <p:clrMapOvr>
+    <a:masterClrMapping/>
+  </p:clrMapOvr>
+</p:sld>
+</file>
+
+<file path=ppt/slides/slide16.xml><?xml version="1.0" encoding="utf-8"?>
+<p:sld xmlns:a="http://schemas.openxmlformats.org/drawingml/2006/main" xmlns:r="http://schemas.openxmlformats.org/officeDocument/2006/relationships" xmlns:p="http://schemas.openxmlformats.org/presentationml/2006/main">
+  <p:cSld>
+    <p:spTree>
+      <p:nvGrpSpPr>
+        <p:cNvPr id="1" name=""/>
+        <p:cNvGrpSpPr/>
+        <p:nvPr/>
+      </p:nvGrpSpPr>
+      <p:grpSpPr>
+        <a:xfrm>
+          <a:off x="0" y="0"/>
+          <a:ext cx="0" cy="0"/>
+          <a:chOff x="0" y="0"/>
+          <a:chExt cx="0" cy="0"/>
+        </a:xfrm>
+      </p:grpSpPr>
+      <p:sp>
+        <p:nvSpPr>
           <p:cNvPr id="17409" name="Title 1"/>
           <p:cNvSpPr txBox="1">
             <a:spLocks/>
@@ -3872,8 +4370,8 @@
         </p:nvSpPr>
         <p:spPr bwMode="auto">
           <a:xfrm>
-            <a:off x="765175" y="1182689"/>
-            <a:ext cx="7680325" cy="2890548"/>
+            <a:off x="774140" y="1182689"/>
+            <a:ext cx="7680325" cy="807519"/>
           </a:xfrm>
           <a:prstGeom prst="rect">
             <a:avLst/>
@@ -4043,7 +4541,7 @@
         </p:blipFill>
         <p:spPr bwMode="auto">
           <a:xfrm>
-            <a:off x="623818" y="4197708"/>
+            <a:off x="623818" y="4645943"/>
             <a:ext cx="472440" cy="365760"/>
           </a:xfrm>
           <a:prstGeom prst="rect">
@@ -4066,7 +4564,7 @@
         </p:nvSpPr>
         <p:spPr>
           <a:xfrm>
-            <a:off x="1273176" y="4197708"/>
+            <a:off x="1273176" y="4645943"/>
             <a:ext cx="1942519" cy="369332"/>
           </a:xfrm>
           <a:prstGeom prst="rect">
@@ -4211,7 +4709,7 @@
         </p:blipFill>
         <p:spPr bwMode="auto">
           <a:xfrm>
-            <a:off x="555098" y="4867792"/>
+            <a:off x="555098" y="5109839"/>
             <a:ext cx="609880" cy="609880"/>
           </a:xfrm>
           <a:prstGeom prst="rect">
@@ -4243,7 +4741,7 @@
         </p:nvSpPr>
         <p:spPr>
           <a:xfrm>
-            <a:off x="1273176" y="5008516"/>
+            <a:off x="1273176" y="5250563"/>
             <a:ext cx="1352871" cy="369332"/>
           </a:xfrm>
           <a:prstGeom prst="rect">
@@ -4269,6 +4767,90 @@
           </a:p>
         </p:txBody>
       </p:sp>
+      <p:sp>
+        <p:nvSpPr>
+          <p:cNvPr id="2" name="Rectangle 1">
+            <a:extLst>
+              <a:ext uri="{FF2B5EF4-FFF2-40B4-BE49-F238E27FC236}">
+                <a16:creationId xmlns:a16="http://schemas.microsoft.com/office/drawing/2014/main" id="{D546039F-AA6A-4F7A-9C3D-5CED5F5D9363}"/>
+              </a:ext>
+            </a:extLst>
+          </p:cNvPr>
+          <p:cNvSpPr/>
+          <p:nvPr/>
+        </p:nvSpPr>
+        <p:spPr>
+          <a:xfrm>
+            <a:off x="2476614" y="2237966"/>
+            <a:ext cx="4039119" cy="369332"/>
+          </a:xfrm>
+          <a:prstGeom prst="rect">
+            <a:avLst/>
+          </a:prstGeom>
+        </p:spPr>
+        <p:txBody>
+          <a:bodyPr wrap="none">
+            <a:spAutoFit/>
+          </a:bodyPr>
+          <a:lstStyle/>
+          <a:p>
+            <a:r>
+              <a:rPr lang="en-US" dirty="0">
+                <a:hlinkClick r:id="rId7"/>
+              </a:rPr>
+              <a:t>https://github.com/jalavery/proj_mgmnt</a:t>
+            </a:r>
+            <a:endParaRPr lang="en-US" dirty="0"/>
+          </a:p>
+        </p:txBody>
+      </p:sp>
+      <p:pic>
+        <p:nvPicPr>
+          <p:cNvPr id="7" name="Picture 4" descr="Image of github icon">
+            <a:extLst>
+              <a:ext uri="{FF2B5EF4-FFF2-40B4-BE49-F238E27FC236}">
+                <a16:creationId xmlns:a16="http://schemas.microsoft.com/office/drawing/2014/main" id="{97B2C1DE-4C6C-4692-B572-3A795E894300}"/>
+              </a:ext>
+            </a:extLst>
+          </p:cNvPr>
+          <p:cNvPicPr>
+            <a:picLocks noChangeAspect="1" noChangeArrowheads="1"/>
+          </p:cNvPicPr>
+          <p:nvPr/>
+        </p:nvPicPr>
+        <p:blipFill>
+          <a:blip r:embed="rId8">
+            <a:extLst>
+              <a:ext uri="{28A0092B-C50C-407E-A947-70E740481C1C}">
+                <a14:useLocalDpi xmlns:a14="http://schemas.microsoft.com/office/drawing/2010/main" val="0"/>
+              </a:ext>
+            </a:extLst>
+          </a:blip>
+          <a:srcRect/>
+          <a:stretch>
+            <a:fillRect/>
+          </a:stretch>
+        </p:blipFill>
+        <p:spPr bwMode="auto">
+          <a:xfrm>
+            <a:off x="1773051" y="2133930"/>
+            <a:ext cx="577405" cy="577405"/>
+          </a:xfrm>
+          <a:prstGeom prst="rect">
+            <a:avLst/>
+          </a:prstGeom>
+          <a:noFill/>
+          <a:extLst>
+            <a:ext uri="{909E8E84-426E-40DD-AFC4-6F175D3DCCD1}">
+              <a14:hiddenFill xmlns:a14="http://schemas.microsoft.com/office/drawing/2010/main">
+                <a:solidFill>
+                  <a:srgbClr val="FFFFFF"/>
+                </a:solidFill>
+              </a14:hiddenFill>
+            </a:ext>
+          </a:extLst>
+        </p:spPr>
+      </p:pic>
     </p:spTree>
     <p:extLst>
       <p:ext uri="{BB962C8B-B14F-4D97-AF65-F5344CB8AC3E}">
@@ -4304,6 +4886,120 @@
           <p:cNvPr id="2" name="Title 1">
             <a:extLst>
               <a:ext uri="{FF2B5EF4-FFF2-40B4-BE49-F238E27FC236}">
+                <a16:creationId xmlns:a16="http://schemas.microsoft.com/office/drawing/2014/main" id="{0B2AF3AD-6BDC-4122-A2AB-FD759AD90087}"/>
+              </a:ext>
+            </a:extLst>
+          </p:cNvPr>
+          <p:cNvSpPr>
+            <a:spLocks noGrp="1"/>
+          </p:cNvSpPr>
+          <p:nvPr>
+            <p:ph type="title"/>
+          </p:nvPr>
+        </p:nvSpPr>
+        <p:spPr/>
+        <p:txBody>
+          <a:bodyPr/>
+          <a:lstStyle/>
+          <a:p>
+            <a:r>
+              <a:rPr lang="en-US" dirty="0"/>
+              <a:t>Outline</a:t>
+            </a:r>
+          </a:p>
+        </p:txBody>
+      </p:sp>
+      <p:sp>
+        <p:nvSpPr>
+          <p:cNvPr id="3" name="Content Placeholder 2">
+            <a:extLst>
+              <a:ext uri="{FF2B5EF4-FFF2-40B4-BE49-F238E27FC236}">
+                <a16:creationId xmlns:a16="http://schemas.microsoft.com/office/drawing/2014/main" id="{F4F65107-AA68-4488-BBA1-87F5E7A61173}"/>
+              </a:ext>
+            </a:extLst>
+          </p:cNvPr>
+          <p:cNvSpPr>
+            <a:spLocks noGrp="1"/>
+          </p:cNvSpPr>
+          <p:nvPr>
+            <p:ph idx="1"/>
+          </p:nvPr>
+        </p:nvSpPr>
+        <p:spPr/>
+        <p:txBody>
+          <a:bodyPr/>
+          <a:lstStyle/>
+          <a:p>
+            <a:pPr marL="571500" indent="-571500">
+              <a:buAutoNum type="romanUcPeriod"/>
+            </a:pPr>
+            <a:r>
+              <a:rPr lang="en-US" dirty="0"/>
+              <a:t>Tracking time</a:t>
+            </a:r>
+          </a:p>
+          <a:p>
+            <a:pPr marL="571500" indent="-571500">
+              <a:buAutoNum type="romanUcPeriod"/>
+            </a:pPr>
+            <a:r>
+              <a:rPr lang="en-US" dirty="0"/>
+              <a:t>Time management metrics</a:t>
+            </a:r>
+          </a:p>
+          <a:p>
+            <a:pPr marL="571500" indent="-571500">
+              <a:buAutoNum type="romanUcPeriod"/>
+            </a:pPr>
+            <a:r>
+              <a:rPr lang="en-US" dirty="0" err="1"/>
+              <a:t>timetrackR</a:t>
+            </a:r>
+            <a:endParaRPr lang="en-US" dirty="0"/>
+          </a:p>
+          <a:p>
+            <a:pPr marL="571500" indent="-571500">
+              <a:buAutoNum type="romanUcPeriod"/>
+            </a:pPr>
+            <a:endParaRPr lang="en-US" dirty="0"/>
+          </a:p>
+        </p:txBody>
+      </p:sp>
+    </p:spTree>
+    <p:extLst>
+      <p:ext uri="{BB962C8B-B14F-4D97-AF65-F5344CB8AC3E}">
+        <p14:creationId xmlns:p14="http://schemas.microsoft.com/office/powerpoint/2010/main" val="619189073"/>
+      </p:ext>
+    </p:extLst>
+  </p:cSld>
+  <p:clrMapOvr>
+    <a:masterClrMapping/>
+  </p:clrMapOvr>
+</p:sld>
+</file>
+
+<file path=ppt/slides/slide3.xml><?xml version="1.0" encoding="utf-8"?>
+<p:sld xmlns:a="http://schemas.openxmlformats.org/drawingml/2006/main" xmlns:r="http://schemas.openxmlformats.org/officeDocument/2006/relationships" xmlns:p="http://schemas.openxmlformats.org/presentationml/2006/main">
+  <p:cSld>
+    <p:spTree>
+      <p:nvGrpSpPr>
+        <p:cNvPr id="1" name=""/>
+        <p:cNvGrpSpPr/>
+        <p:nvPr/>
+      </p:nvGrpSpPr>
+      <p:grpSpPr>
+        <a:xfrm>
+          <a:off x="0" y="0"/>
+          <a:ext cx="0" cy="0"/>
+          <a:chOff x="0" y="0"/>
+          <a:chExt cx="0" cy="0"/>
+        </a:xfrm>
+      </p:grpSpPr>
+      <p:sp>
+        <p:nvSpPr>
+          <p:cNvPr id="2" name="Title 1">
+            <a:extLst>
+              <a:ext uri="{FF2B5EF4-FFF2-40B4-BE49-F238E27FC236}">
                 <a16:creationId xmlns:a16="http://schemas.microsoft.com/office/drawing/2014/main" id="{8E20A4B1-CEFE-42F6-BE30-1CF39169F3F8}"/>
               </a:ext>
             </a:extLst>
@@ -4367,7 +5063,7 @@
           <a:p>
             <a:r>
               <a:rPr lang="en-US" sz="2800" dirty="0"/>
-              <a:t>Re-analyses take up time! There is no such thing as a “quick re-analysis”!</a:t>
+              <a:t>Recall is often inaccurate</a:t>
             </a:r>
           </a:p>
         </p:txBody>
@@ -4432,114 +5128,6 @@
 </p:sld>
 </file>
 
-<file path=ppt/slides/slide3.xml><?xml version="1.0" encoding="utf-8"?>
-<p:sld xmlns:a="http://schemas.openxmlformats.org/drawingml/2006/main" xmlns:r="http://schemas.openxmlformats.org/officeDocument/2006/relationships" xmlns:p="http://schemas.openxmlformats.org/presentationml/2006/main">
-  <p:cSld>
-    <p:spTree>
-      <p:nvGrpSpPr>
-        <p:cNvPr id="1" name=""/>
-        <p:cNvGrpSpPr/>
-        <p:nvPr/>
-      </p:nvGrpSpPr>
-      <p:grpSpPr>
-        <a:xfrm>
-          <a:off x="0" y="0"/>
-          <a:ext cx="0" cy="0"/>
-          <a:chOff x="0" y="0"/>
-          <a:chExt cx="0" cy="0"/>
-        </a:xfrm>
-      </p:grpSpPr>
-      <p:sp>
-        <p:nvSpPr>
-          <p:cNvPr id="2" name="Title 1">
-            <a:extLst>
-              <a:ext uri="{FF2B5EF4-FFF2-40B4-BE49-F238E27FC236}">
-                <a16:creationId xmlns:a16="http://schemas.microsoft.com/office/drawing/2014/main" id="{7CCFB932-F1A0-458A-830D-3BBD6D4ACBAC}"/>
-              </a:ext>
-            </a:extLst>
-          </p:cNvPr>
-          <p:cNvSpPr>
-            <a:spLocks noGrp="1"/>
-          </p:cNvSpPr>
-          <p:nvPr>
-            <p:ph type="title"/>
-          </p:nvPr>
-        </p:nvSpPr>
-        <p:spPr/>
-        <p:txBody>
-          <a:bodyPr/>
-          <a:lstStyle/>
-          <a:p>
-            <a:r>
-              <a:rPr lang="en-US" dirty="0"/>
-              <a:t>Why use a time tracker summary/project management app?</a:t>
-            </a:r>
-          </a:p>
-        </p:txBody>
-      </p:sp>
-      <p:sp>
-        <p:nvSpPr>
-          <p:cNvPr id="3" name="Content Placeholder 2">
-            <a:extLst>
-              <a:ext uri="{FF2B5EF4-FFF2-40B4-BE49-F238E27FC236}">
-                <a16:creationId xmlns:a16="http://schemas.microsoft.com/office/drawing/2014/main" id="{5640F286-9FC2-4C24-9810-0AD9959C4F7C}"/>
-              </a:ext>
-            </a:extLst>
-          </p:cNvPr>
-          <p:cNvSpPr>
-            <a:spLocks noGrp="1"/>
-          </p:cNvSpPr>
-          <p:nvPr>
-            <p:ph idx="1"/>
-          </p:nvPr>
-        </p:nvSpPr>
-        <p:spPr/>
-        <p:txBody>
-          <a:bodyPr/>
-          <a:lstStyle/>
-          <a:p>
-            <a:r>
-              <a:rPr lang="en-US" sz="2800" dirty="0"/>
-              <a:t>Tracking your time is only useful if you then go back and revisit it </a:t>
-            </a:r>
-            <a:r>
-              <a:rPr lang="en-US" sz="2800" dirty="0">
-                <a:solidFill>
-                  <a:schemeClr val="bg1">
-                    <a:lumMod val="50000"/>
-                  </a:schemeClr>
-                </a:solidFill>
-              </a:rPr>
-              <a:t>(except for the case of time tracking for billing purposes)</a:t>
-            </a:r>
-          </a:p>
-          <a:p>
-            <a:r>
-              <a:rPr lang="en-US" sz="2800" dirty="0"/>
-              <a:t>Useful for one on ones and project status updates</a:t>
-            </a:r>
-          </a:p>
-          <a:p>
-            <a:r>
-              <a:rPr lang="en-US" sz="2800" dirty="0"/>
-              <a:t>Sometimes useful for effort certification reports if your organization requires them</a:t>
-            </a:r>
-          </a:p>
-        </p:txBody>
-      </p:sp>
-    </p:spTree>
-    <p:extLst>
-      <p:ext uri="{BB962C8B-B14F-4D97-AF65-F5344CB8AC3E}">
-        <p14:creationId xmlns:p14="http://schemas.microsoft.com/office/powerpoint/2010/main" val="1628145875"/>
-      </p:ext>
-    </p:extLst>
-  </p:cSld>
-  <p:clrMapOvr>
-    <a:masterClrMapping/>
-  </p:clrMapOvr>
-</p:sld>
-</file>
-
 <file path=ppt/slides/slide4.xml><?xml version="1.0" encoding="utf-8"?>
 <p:sld xmlns:a="http://schemas.openxmlformats.org/drawingml/2006/main" xmlns:r="http://schemas.openxmlformats.org/officeDocument/2006/relationships" xmlns:p="http://schemas.openxmlformats.org/presentationml/2006/main">
   <p:cSld>
@@ -4562,7 +5150,7 @@
           <p:cNvPr id="2" name="Title 1">
             <a:extLst>
               <a:ext uri="{FF2B5EF4-FFF2-40B4-BE49-F238E27FC236}">
-                <a16:creationId xmlns:a16="http://schemas.microsoft.com/office/drawing/2014/main" id="{FD6491AE-52FD-4B48-884B-0D335ACDEACF}"/>
+                <a16:creationId xmlns:a16="http://schemas.microsoft.com/office/drawing/2014/main" id="{7CCFB932-F1A0-458A-830D-3BBD6D4ACBAC}"/>
               </a:ext>
             </a:extLst>
           </p:cNvPr>
@@ -4580,7 +5168,7 @@
           <a:p>
             <a:r>
               <a:rPr lang="en-US" dirty="0"/>
-              <a:t>Tracking time</a:t>
+              <a:t>Why use a time tracker summary app?</a:t>
             </a:r>
           </a:p>
         </p:txBody>
@@ -4590,7 +5178,7 @@
           <p:cNvPr id="3" name="Content Placeholder 2">
             <a:extLst>
               <a:ext uri="{FF2B5EF4-FFF2-40B4-BE49-F238E27FC236}">
-                <a16:creationId xmlns:a16="http://schemas.microsoft.com/office/drawing/2014/main" id="{1F882B4D-9B18-448E-A594-C83072C8D8AB}"/>
+                <a16:creationId xmlns:a16="http://schemas.microsoft.com/office/drawing/2014/main" id="{5640F286-9FC2-4C24-9810-0AD9959C4F7C}"/>
               </a:ext>
             </a:extLst>
           </p:cNvPr>
@@ -4608,21 +5196,44 @@
           <a:p>
             <a:r>
               <a:rPr lang="en-US" sz="2800" dirty="0"/>
-              <a:t>Doesn’t have to be down to the minute</a:t>
+              <a:t>It’s hard to manage your time if you don’t know how you’re spending your time</a:t>
+            </a:r>
+          </a:p>
+          <a:p>
+            <a:r>
+              <a:rPr lang="en-US" sz="2800" dirty="0"/>
+              <a:t>Tracking your time is only useful if you then go back and revisit it </a:t>
             </a:r>
           </a:p>
           <a:p>
             <a:pPr lvl="1"/>
             <a:r>
-              <a:rPr lang="en-US" sz="2400" dirty="0"/>
-              <a:t>At most granular, 15 minute increments</a:t>
-            </a:r>
-          </a:p>
-          <a:p>
-            <a:pPr lvl="1"/>
-            <a:r>
-              <a:rPr lang="en-US" sz="2400" dirty="0"/>
-              <a:t>At least granular, entire day</a:t>
+              <a:rPr lang="en-US" sz="2400" dirty="0">
+                <a:solidFill>
+                  <a:schemeClr val="bg1">
+                    <a:lumMod val="50000"/>
+                  </a:schemeClr>
+                </a:solidFill>
+              </a:rPr>
+              <a:t>Except for the case of time tracking for billing purposes</a:t>
+            </a:r>
+          </a:p>
+          <a:p>
+            <a:r>
+              <a:rPr lang="en-US" sz="2800" dirty="0"/>
+              <a:t>Useful for 1:1s and project status updates</a:t>
+            </a:r>
+          </a:p>
+          <a:p>
+            <a:r>
+              <a:rPr lang="en-US" sz="2800" dirty="0"/>
+              <a:t>Goal-setting and evaluating</a:t>
+            </a:r>
+          </a:p>
+          <a:p>
+            <a:r>
+              <a:rPr lang="en-US" sz="2800" dirty="0"/>
+              <a:t>Aid in resource allocation decisions</a:t>
             </a:r>
           </a:p>
         </p:txBody>
@@ -4630,7 +5241,7 @@
     </p:spTree>
     <p:extLst>
       <p:ext uri="{BB962C8B-B14F-4D97-AF65-F5344CB8AC3E}">
-        <p14:creationId xmlns:p14="http://schemas.microsoft.com/office/powerpoint/2010/main" val="2590693224"/>
+        <p14:creationId xmlns:p14="http://schemas.microsoft.com/office/powerpoint/2010/main" val="1628145875"/>
       </p:ext>
     </p:extLst>
   </p:cSld>
@@ -4662,7 +5273,7 @@
           <p:cNvPr id="2" name="Title 1">
             <a:extLst>
               <a:ext uri="{FF2B5EF4-FFF2-40B4-BE49-F238E27FC236}">
-                <a16:creationId xmlns:a16="http://schemas.microsoft.com/office/drawing/2014/main" id="{5E7732EB-DDF0-44B4-A87C-F05369D67F44}"/>
+                <a16:creationId xmlns:a16="http://schemas.microsoft.com/office/drawing/2014/main" id="{C41C5319-249F-4F8B-AD76-A1ED4DBBA85D}"/>
               </a:ext>
             </a:extLst>
           </p:cNvPr>
@@ -4680,7 +5291,47 @@
           <a:p>
             <a:r>
               <a:rPr lang="en-US" dirty="0"/>
-              <a:t>The app</a:t>
+              <a:t>Time tracking metrics</a:t>
+            </a:r>
+          </a:p>
+        </p:txBody>
+      </p:sp>
+      <p:sp>
+        <p:nvSpPr>
+          <p:cNvPr id="3" name="Content Placeholder 2">
+            <a:extLst>
+              <a:ext uri="{FF2B5EF4-FFF2-40B4-BE49-F238E27FC236}">
+                <a16:creationId xmlns:a16="http://schemas.microsoft.com/office/drawing/2014/main" id="{5FD2F8A0-9F57-454B-8B7D-6DA13D8466A6}"/>
+              </a:ext>
+            </a:extLst>
+          </p:cNvPr>
+          <p:cNvSpPr>
+            <a:spLocks noGrp="1"/>
+          </p:cNvSpPr>
+          <p:nvPr>
+            <p:ph idx="1"/>
+          </p:nvPr>
+        </p:nvSpPr>
+        <p:spPr/>
+        <p:txBody>
+          <a:bodyPr/>
+          <a:lstStyle/>
+          <a:p>
+            <a:r>
+              <a:rPr lang="en-US" sz="2800" dirty="0"/>
+              <a:t>Gives a breakdown of time spent per area of project by project and investigator</a:t>
+            </a:r>
+          </a:p>
+          <a:p>
+            <a:r>
+              <a:rPr lang="en-US" sz="2800" dirty="0"/>
+              <a:t>If an investigator or project is taking up &gt;50% of your time, you want to know that</a:t>
+            </a:r>
+          </a:p>
+          <a:p>
+            <a:r>
+              <a:rPr lang="en-US" sz="2800" dirty="0"/>
+              <a:t>If an abstract took as long as a full analysis for a manuscript, you want to know that too</a:t>
             </a:r>
           </a:p>
         </p:txBody>
@@ -4688,7 +5339,7 @@
     </p:spTree>
     <p:extLst>
       <p:ext uri="{BB962C8B-B14F-4D97-AF65-F5344CB8AC3E}">
-        <p14:creationId xmlns:p14="http://schemas.microsoft.com/office/powerpoint/2010/main" val="1192983765"/>
+        <p14:creationId xmlns:p14="http://schemas.microsoft.com/office/powerpoint/2010/main" val="3110883680"/>
       </p:ext>
     </p:extLst>
   </p:cSld>
@@ -4720,7 +5371,7 @@
           <p:cNvPr id="2" name="Title 1">
             <a:extLst>
               <a:ext uri="{FF2B5EF4-FFF2-40B4-BE49-F238E27FC236}">
-                <a16:creationId xmlns:a16="http://schemas.microsoft.com/office/drawing/2014/main" id="{C41C5319-249F-4F8B-AD76-A1ED4DBBA85D}"/>
+                <a16:creationId xmlns:a16="http://schemas.microsoft.com/office/drawing/2014/main" id="{5E7732EB-DDF0-44B4-A87C-F05369D67F44}"/>
               </a:ext>
             </a:extLst>
           </p:cNvPr>
@@ -4738,47 +5389,7 @@
           <a:p>
             <a:r>
               <a:rPr lang="en-US" dirty="0"/>
-              <a:t>Time management metrics</a:t>
-            </a:r>
-          </a:p>
-        </p:txBody>
-      </p:sp>
-      <p:sp>
-        <p:nvSpPr>
-          <p:cNvPr id="3" name="Content Placeholder 2">
-            <a:extLst>
-              <a:ext uri="{FF2B5EF4-FFF2-40B4-BE49-F238E27FC236}">
-                <a16:creationId xmlns:a16="http://schemas.microsoft.com/office/drawing/2014/main" id="{5FD2F8A0-9F57-454B-8B7D-6DA13D8466A6}"/>
-              </a:ext>
-            </a:extLst>
-          </p:cNvPr>
-          <p:cNvSpPr>
-            <a:spLocks noGrp="1"/>
-          </p:cNvSpPr>
-          <p:nvPr>
-            <p:ph idx="1"/>
-          </p:nvPr>
-        </p:nvSpPr>
-        <p:spPr/>
-        <p:txBody>
-          <a:bodyPr/>
-          <a:lstStyle/>
-          <a:p>
-            <a:r>
-              <a:rPr lang="en-US" dirty="0"/>
-              <a:t>Gives a breakdown of time spent per area of project by project and investigator</a:t>
-            </a:r>
-          </a:p>
-          <a:p>
-            <a:r>
-              <a:rPr lang="en-US" dirty="0"/>
-              <a:t>If an investigator or project is taking up &gt;50% of your time, you want to know that</a:t>
-            </a:r>
-          </a:p>
-          <a:p>
-            <a:r>
-              <a:rPr lang="en-US" dirty="0"/>
-              <a:t>If an abstract took as long as a full analysis for a manuscript, you want to know that too</a:t>
+              <a:t>The app</a:t>
             </a:r>
           </a:p>
         </p:txBody>
@@ -4786,7 +5397,7 @@
     </p:spTree>
     <p:extLst>
       <p:ext uri="{BB962C8B-B14F-4D97-AF65-F5344CB8AC3E}">
-        <p14:creationId xmlns:p14="http://schemas.microsoft.com/office/powerpoint/2010/main" val="3110883680"/>
+        <p14:creationId xmlns:p14="http://schemas.microsoft.com/office/powerpoint/2010/main" val="1192983765"/>
       </p:ext>
     </p:extLst>
   </p:cSld>
@@ -4797,7 +5408,7 @@
 </file>
 
 <file path=ppt/slides/slide7.xml><?xml version="1.0" encoding="utf-8"?>
-<p:sld xmlns:a="http://schemas.openxmlformats.org/drawingml/2006/main" xmlns:r="http://schemas.openxmlformats.org/officeDocument/2006/relationships" xmlns:p="http://schemas.openxmlformats.org/presentationml/2006/main">
+<p:sld xmlns:a="http://schemas.openxmlformats.org/drawingml/2006/main" xmlns:r="http://schemas.openxmlformats.org/officeDocument/2006/relationships" xmlns:p="http://schemas.openxmlformats.org/presentationml/2006/main" show="0">
   <p:cSld>
     <p:spTree>
       <p:nvGrpSpPr>
@@ -4818,7 +5429,7 @@
           <p:cNvPr id="2" name="Title 1">
             <a:extLst>
               <a:ext uri="{FF2B5EF4-FFF2-40B4-BE49-F238E27FC236}">
-                <a16:creationId xmlns:a16="http://schemas.microsoft.com/office/drawing/2014/main" id="{7C0AAF0C-A9BA-41A6-A856-1A1CB3117341}"/>
+                <a16:creationId xmlns:a16="http://schemas.microsoft.com/office/drawing/2014/main" id="{10C7E46A-DBEC-41C4-92DD-EA5D6845472B}"/>
               </a:ext>
             </a:extLst>
           </p:cNvPr>
@@ -4836,45 +5447,15 @@
           <a:p>
             <a:r>
               <a:rPr lang="en-US" dirty="0"/>
-              <a:t>Information gleaned from </a:t>
-            </a:r>
-            <a:r>
-              <a:rPr lang="en-US" i="1" dirty="0" err="1"/>
-              <a:t>timetrackR</a:t>
-            </a:r>
-            <a:endParaRPr lang="en-US" i="1" dirty="0"/>
-          </a:p>
-        </p:txBody>
-      </p:sp>
-      <p:sp>
-        <p:nvSpPr>
-          <p:cNvPr id="3" name="Content Placeholder 2">
-            <a:extLst>
-              <a:ext uri="{FF2B5EF4-FFF2-40B4-BE49-F238E27FC236}">
-                <a16:creationId xmlns:a16="http://schemas.microsoft.com/office/drawing/2014/main" id="{9DC865FE-2769-467A-9247-2E19D7FFD882}"/>
-              </a:ext>
-            </a:extLst>
-          </p:cNvPr>
-          <p:cNvSpPr>
-            <a:spLocks noGrp="1"/>
-          </p:cNvSpPr>
-          <p:nvPr>
-            <p:ph idx="1"/>
-          </p:nvPr>
-        </p:nvSpPr>
-        <p:spPr/>
-        <p:txBody>
-          <a:bodyPr/>
-          <a:lstStyle/>
-          <a:p>
-            <a:endParaRPr lang="en-US" dirty="0"/>
+              <a:t>Screenshots</a:t>
+            </a:r>
           </a:p>
         </p:txBody>
       </p:sp>
     </p:spTree>
     <p:extLst>
       <p:ext uri="{BB962C8B-B14F-4D97-AF65-F5344CB8AC3E}">
-        <p14:creationId xmlns:p14="http://schemas.microsoft.com/office/powerpoint/2010/main" val="2022793432"/>
+        <p14:creationId xmlns:p14="http://schemas.microsoft.com/office/powerpoint/2010/main" val="4218841136"/>
       </p:ext>
     </p:extLst>
   </p:cSld>
@@ -4906,7 +5487,7 @@
           <p:cNvPr id="2" name="Title 1">
             <a:extLst>
               <a:ext uri="{FF2B5EF4-FFF2-40B4-BE49-F238E27FC236}">
-                <a16:creationId xmlns:a16="http://schemas.microsoft.com/office/drawing/2014/main" id="{633F03C8-ABD3-4A00-AD80-087F21332873}"/>
+                <a16:creationId xmlns:a16="http://schemas.microsoft.com/office/drawing/2014/main" id="{7C0AAF0C-A9BA-41A6-A856-1A1CB3117341}"/>
               </a:ext>
             </a:extLst>
           </p:cNvPr>
@@ -4924,8 +5505,13 @@
           <a:p>
             <a:r>
               <a:rPr lang="en-US" dirty="0"/>
-              <a:t>Caveats</a:t>
-            </a:r>
+              <a:t>Information gleaned from </a:t>
+            </a:r>
+            <a:r>
+              <a:rPr lang="en-US" i="1" dirty="0" err="1"/>
+              <a:t>timetrackR</a:t>
+            </a:r>
+            <a:endParaRPr lang="en-US" i="1" dirty="0"/>
           </a:p>
         </p:txBody>
       </p:sp>
@@ -4934,7 +5520,7 @@
           <p:cNvPr id="3" name="Content Placeholder 2">
             <a:extLst>
               <a:ext uri="{FF2B5EF4-FFF2-40B4-BE49-F238E27FC236}">
-                <a16:creationId xmlns:a16="http://schemas.microsoft.com/office/drawing/2014/main" id="{D263E9DF-7C0F-4369-8FD3-EEA6C90D66F0}"/>
+                <a16:creationId xmlns:a16="http://schemas.microsoft.com/office/drawing/2014/main" id="{9DC865FE-2769-467A-9247-2E19D7FFD882}"/>
               </a:ext>
             </a:extLst>
           </p:cNvPr>
@@ -4950,29 +5536,14 @@
           <a:bodyPr/>
           <a:lstStyle/>
           <a:p>
-            <a:r>
-              <a:rPr lang="en-US" dirty="0"/>
-              <a:t>The obvious: this is only useful if you track your time</a:t>
-            </a:r>
-          </a:p>
-          <a:p>
-            <a:r>
-              <a:rPr lang="en-US" dirty="0"/>
-              <a:t>Entirely retrospective, it’s a summary of what you’ve done, doesn’t include projected time allocations</a:t>
-            </a:r>
-          </a:p>
-          <a:p>
-            <a:r>
-              <a:rPr lang="en-US" dirty="0"/>
-              <a:t>Most useful for projects with a start and end, but can be useful for ongoing work as well</a:t>
-            </a:r>
+            <a:endParaRPr lang="en-US" dirty="0"/>
           </a:p>
         </p:txBody>
       </p:sp>
     </p:spTree>
     <p:extLst>
       <p:ext uri="{BB962C8B-B14F-4D97-AF65-F5344CB8AC3E}">
-        <p14:creationId xmlns:p14="http://schemas.microsoft.com/office/powerpoint/2010/main" val="2875116697"/>
+        <p14:creationId xmlns:p14="http://schemas.microsoft.com/office/powerpoint/2010/main" val="2022793432"/>
       </p:ext>
     </p:extLst>
   </p:cSld>
@@ -5004,7 +5575,7 @@
           <p:cNvPr id="2" name="Title 1">
             <a:extLst>
               <a:ext uri="{FF2B5EF4-FFF2-40B4-BE49-F238E27FC236}">
-                <a16:creationId xmlns:a16="http://schemas.microsoft.com/office/drawing/2014/main" id="{61CD5D77-E3C4-4FBF-8330-3DEFB2FC3626}"/>
+                <a16:creationId xmlns:a16="http://schemas.microsoft.com/office/drawing/2014/main" id="{66C5FB7E-AA55-4632-9059-CCAD4F92CBDB}"/>
               </a:ext>
             </a:extLst>
           </p:cNvPr>
@@ -5022,7 +5593,7 @@
           <a:p>
             <a:r>
               <a:rPr lang="en-US" dirty="0"/>
-              <a:t>Adapting the app for your own use</a:t>
+              <a:t>Behind the Scenes</a:t>
             </a:r>
           </a:p>
         </p:txBody>
@@ -5032,7 +5603,7 @@
           <p:cNvPr id="3" name="Content Placeholder 2">
             <a:extLst>
               <a:ext uri="{FF2B5EF4-FFF2-40B4-BE49-F238E27FC236}">
-                <a16:creationId xmlns:a16="http://schemas.microsoft.com/office/drawing/2014/main" id="{BF5C20CB-2264-42BE-90A9-6CD9BBDD303F}"/>
+                <a16:creationId xmlns:a16="http://schemas.microsoft.com/office/drawing/2014/main" id="{4BB3C2CE-16FB-48DF-A561-01920B9984E5}"/>
               </a:ext>
             </a:extLst>
           </p:cNvPr>
@@ -5048,23 +5619,91 @@
           <a:bodyPr/>
           <a:lstStyle/>
           <a:p>
-            <a:r>
-              <a:rPr lang="en-US" sz="2800" dirty="0"/>
-              <a:t>Can track whichever components of your time you’re interested in</a:t>
-            </a:r>
-          </a:p>
-          <a:p>
-            <a:r>
-              <a:rPr lang="en-US" sz="2800" dirty="0"/>
-              <a:t>Can be used to summarize “current” time (active projects) or view long-term project trajectories</a:t>
-            </a:r>
-          </a:p>
-        </p:txBody>
-      </p:sp>
+            <a:endParaRPr lang="en-US" dirty="0"/>
+          </a:p>
+        </p:txBody>
+      </p:sp>
+      <p:pic>
+        <p:nvPicPr>
+          <p:cNvPr id="3074" name="Picture 2" descr="Image result for ms excel">
+            <a:extLst>
+              <a:ext uri="{FF2B5EF4-FFF2-40B4-BE49-F238E27FC236}">
+                <a16:creationId xmlns:a16="http://schemas.microsoft.com/office/drawing/2014/main" id="{4D13D626-68E4-45B8-9FC4-A81965D936BB}"/>
+              </a:ext>
+            </a:extLst>
+          </p:cNvPr>
+          <p:cNvPicPr>
+            <a:picLocks noChangeAspect="1" noChangeArrowheads="1"/>
+          </p:cNvPicPr>
+          <p:nvPr/>
+        </p:nvPicPr>
+        <p:blipFill>
+          <a:blip r:embed="rId2">
+            <a:extLst>
+              <a:ext uri="{28A0092B-C50C-407E-A947-70E740481C1C}">
+                <a14:useLocalDpi xmlns:a14="http://schemas.microsoft.com/office/drawing/2010/main" val="0"/>
+              </a:ext>
+            </a:extLst>
+          </a:blip>
+          <a:srcRect/>
+          <a:stretch>
+            <a:fillRect/>
+          </a:stretch>
+        </p:blipFill>
+        <p:spPr bwMode="auto">
+          <a:xfrm>
+            <a:off x="1104340" y="2345952"/>
+            <a:ext cx="1771650" cy="1771650"/>
+          </a:xfrm>
+          <a:prstGeom prst="rect">
+            <a:avLst/>
+          </a:prstGeom>
+          <a:noFill/>
+          <a:extLst>
+            <a:ext uri="{909E8E84-426E-40DD-AFC4-6F175D3DCCD1}">
+              <a14:hiddenFill xmlns:a14="http://schemas.microsoft.com/office/drawing/2010/main">
+                <a:solidFill>
+                  <a:srgbClr val="FFFFFF"/>
+                </a:solidFill>
+              </a14:hiddenFill>
+            </a:ext>
+          </a:extLst>
+        </p:spPr>
+      </p:pic>
+      <p:pic>
+        <p:nvPicPr>
+          <p:cNvPr id="5" name="Picture 4">
+            <a:extLst>
+              <a:ext uri="{FF2B5EF4-FFF2-40B4-BE49-F238E27FC236}">
+                <a16:creationId xmlns:a16="http://schemas.microsoft.com/office/drawing/2014/main" id="{2885F98E-6D86-4EAC-B4D4-D11E3A1090A6}"/>
+              </a:ext>
+            </a:extLst>
+          </p:cNvPr>
+          <p:cNvPicPr>
+            <a:picLocks noChangeAspect="1"/>
+          </p:cNvPicPr>
+          <p:nvPr/>
+        </p:nvPicPr>
+        <p:blipFill>
+          <a:blip r:embed="rId3"/>
+          <a:stretch>
+            <a:fillRect/>
+          </a:stretch>
+        </p:blipFill>
+        <p:spPr>
+          <a:xfrm>
+            <a:off x="4716137" y="2528045"/>
+            <a:ext cx="3359382" cy="1179681"/>
+          </a:xfrm>
+          <a:prstGeom prst="rect">
+            <a:avLst/>
+          </a:prstGeom>
+        </p:spPr>
+      </p:pic>
     </p:spTree>
     <p:extLst>
       <p:ext uri="{BB962C8B-B14F-4D97-AF65-F5344CB8AC3E}">
-        <p14:creationId xmlns:p14="http://schemas.microsoft.com/office/powerpoint/2010/main" val="2232906021"/>
+        <p14:creationId xmlns:p14="http://schemas.microsoft.com/office/powerpoint/2010/main" val="2504891058"/>
       </p:ext>
     </p:extLst>
   </p:cSld>
@@ -5399,6 +6038,301 @@
 </a:theme>
 </file>
 
+<file path=ppt/theme/theme2.xml><?xml version="1.0" encoding="utf-8"?>
+<a:theme xmlns:a="http://schemas.openxmlformats.org/drawingml/2006/main" name="Office Theme">
+  <a:themeElements>
+    <a:clrScheme name="Office">
+      <a:dk1>
+        <a:sysClr val="windowText" lastClr="000000"/>
+      </a:dk1>
+      <a:lt1>
+        <a:sysClr val="window" lastClr="FFFFFF"/>
+      </a:lt1>
+      <a:dk2>
+        <a:srgbClr val="44546A"/>
+      </a:dk2>
+      <a:lt2>
+        <a:srgbClr val="E7E6E6"/>
+      </a:lt2>
+      <a:accent1>
+        <a:srgbClr val="4472C4"/>
+      </a:accent1>
+      <a:accent2>
+        <a:srgbClr val="ED7D31"/>
+      </a:accent2>
+      <a:accent3>
+        <a:srgbClr val="A5A5A5"/>
+      </a:accent3>
+      <a:accent4>
+        <a:srgbClr val="FFC000"/>
+      </a:accent4>
+      <a:accent5>
+        <a:srgbClr val="5B9BD5"/>
+      </a:accent5>
+      <a:accent6>
+        <a:srgbClr val="70AD47"/>
+      </a:accent6>
+      <a:hlink>
+        <a:srgbClr val="0563C1"/>
+      </a:hlink>
+      <a:folHlink>
+        <a:srgbClr val="954F72"/>
+      </a:folHlink>
+    </a:clrScheme>
+    <a:fontScheme name="Office">
+      <a:majorFont>
+        <a:latin typeface="Calibri Light" panose="020F0302020204030204"/>
+        <a:ea typeface=""/>
+        <a:cs typeface=""/>
+        <a:font script="Jpan" typeface="游ゴシック Light"/>
+        <a:font script="Hang" typeface="맑은 고딕"/>
+        <a:font script="Hans" typeface="等线 Light"/>
+        <a:font script="Hant" typeface="新細明體"/>
+        <a:font script="Arab" typeface="Times New Roman"/>
+        <a:font script="Hebr" typeface="Times New Roman"/>
+        <a:font script="Thai" typeface="Angsana New"/>
+        <a:font script="Ethi" typeface="Nyala"/>
+        <a:font script="Beng" typeface="Vrinda"/>
+        <a:font script="Gujr" typeface="Shruti"/>
+        <a:font script="Khmr" typeface="MoolBoran"/>
+        <a:font script="Knda" typeface="Tunga"/>
+        <a:font script="Guru" typeface="Raavi"/>
+        <a:font script="Cans" typeface="Euphemia"/>
+        <a:font script="Cher" typeface="Plantagenet Cherokee"/>
+        <a:font script="Yiii" typeface="Microsoft Yi Baiti"/>
+        <a:font script="Tibt" typeface="Microsoft Himalaya"/>
+        <a:font script="Thaa" typeface="MV Boli"/>
+        <a:font script="Deva" typeface="Mangal"/>
+        <a:font script="Telu" typeface="Gautami"/>
+        <a:font script="Taml" typeface="Latha"/>
+        <a:font script="Syrc" typeface="Estrangelo Edessa"/>
+        <a:font script="Orya" typeface="Kalinga"/>
+        <a:font script="Mlym" typeface="Kartika"/>
+        <a:font script="Laoo" typeface="DokChampa"/>
+        <a:font script="Sinh" typeface="Iskoola Pota"/>
+        <a:font script="Mong" typeface="Mongolian Baiti"/>
+        <a:font script="Viet" typeface="Times New Roman"/>
+        <a:font script="Uigh" typeface="Microsoft Uighur"/>
+        <a:font script="Geor" typeface="Sylfaen"/>
+        <a:font script="Armn" typeface="Arial"/>
+        <a:font script="Bugi" typeface="Leelawadee UI"/>
+        <a:font script="Bopo" typeface="Microsoft JhengHei"/>
+        <a:font script="Java" typeface="Javanese Text"/>
+        <a:font script="Lisu" typeface="Segoe UI"/>
+        <a:font script="Mymr" typeface="Myanmar Text"/>
+        <a:font script="Nkoo" typeface="Ebrima"/>
+        <a:font script="Olck" typeface="Nirmala UI"/>
+        <a:font script="Osma" typeface="Ebrima"/>
+        <a:font script="Phag" typeface="Phagspa"/>
+        <a:font script="Syrn" typeface="Estrangelo Edessa"/>
+        <a:font script="Syrj" typeface="Estrangelo Edessa"/>
+        <a:font script="Syre" typeface="Estrangelo Edessa"/>
+        <a:font script="Sora" typeface="Nirmala UI"/>
+        <a:font script="Tale" typeface="Microsoft Tai Le"/>
+        <a:font script="Talu" typeface="Microsoft New Tai Lue"/>
+        <a:font script="Tfng" typeface="Ebrima"/>
+      </a:majorFont>
+      <a:minorFont>
+        <a:latin typeface="Calibri" panose="020F0502020204030204"/>
+        <a:ea typeface=""/>
+        <a:cs typeface=""/>
+        <a:font script="Jpan" typeface="游ゴシック"/>
+        <a:font script="Hang" typeface="맑은 고딕"/>
+        <a:font script="Hans" typeface="等线"/>
+        <a:font script="Hant" typeface="新細明體"/>
+        <a:font script="Arab" typeface="Arial"/>
+        <a:font script="Hebr" typeface="Arial"/>
+        <a:font script="Thai" typeface="Cordia New"/>
+        <a:font script="Ethi" typeface="Nyala"/>
+        <a:font script="Beng" typeface="Vrinda"/>
+        <a:font script="Gujr" typeface="Shruti"/>
+        <a:font script="Khmr" typeface="DaunPenh"/>
+        <a:font script="Knda" typeface="Tunga"/>
+        <a:font script="Guru" typeface="Raavi"/>
+        <a:font script="Cans" typeface="Euphemia"/>
+        <a:font script="Cher" typeface="Plantagenet Cherokee"/>
+        <a:font script="Yiii" typeface="Microsoft Yi Baiti"/>
+        <a:font script="Tibt" typeface="Microsoft Himalaya"/>
+        <a:font script="Thaa" typeface="MV Boli"/>
+        <a:font script="Deva" typeface="Mangal"/>
+        <a:font script="Telu" typeface="Gautami"/>
+        <a:font script="Taml" typeface="Latha"/>
+        <a:font script="Syrc" typeface="Estrangelo Edessa"/>
+        <a:font script="Orya" typeface="Kalinga"/>
+        <a:font script="Mlym" typeface="Kartika"/>
+        <a:font script="Laoo" typeface="DokChampa"/>
+        <a:font script="Sinh" typeface="Iskoola Pota"/>
+        <a:font script="Mong" typeface="Mongolian Baiti"/>
+        <a:font script="Viet" typeface="Arial"/>
+        <a:font script="Uigh" typeface="Microsoft Uighur"/>
+        <a:font script="Geor" typeface="Sylfaen"/>
+        <a:font script="Armn" typeface="Arial"/>
+        <a:font script="Bugi" typeface="Leelawadee UI"/>
+        <a:font script="Bopo" typeface="Microsoft JhengHei"/>
+        <a:font script="Java" typeface="Javanese Text"/>
+        <a:font script="Lisu" typeface="Segoe UI"/>
+        <a:font script="Mymr" typeface="Myanmar Text"/>
+        <a:font script="Nkoo" typeface="Ebrima"/>
+        <a:font script="Olck" typeface="Nirmala UI"/>
+        <a:font script="Osma" typeface="Ebrima"/>
+        <a:font script="Phag" typeface="Phagspa"/>
+        <a:font script="Syrn" typeface="Estrangelo Edessa"/>
+        <a:font script="Syrj" typeface="Estrangelo Edessa"/>
+        <a:font script="Syre" typeface="Estrangelo Edessa"/>
+        <a:font script="Sora" typeface="Nirmala UI"/>
+        <a:font script="Tale" typeface="Microsoft Tai Le"/>
+        <a:font script="Talu" typeface="Microsoft New Tai Lue"/>
+        <a:font script="Tfng" typeface="Ebrima"/>
+      </a:minorFont>
+    </a:fontScheme>
+    <a:fmtScheme name="Office">
+      <a:fillStyleLst>
+        <a:solidFill>
+          <a:schemeClr val="phClr"/>
+        </a:solidFill>
+        <a:gradFill rotWithShape="1">
+          <a:gsLst>
+            <a:gs pos="0">
+              <a:schemeClr val="phClr">
+                <a:lumMod val="110000"/>
+                <a:satMod val="105000"/>
+                <a:tint val="67000"/>
+              </a:schemeClr>
+            </a:gs>
+            <a:gs pos="50000">
+              <a:schemeClr val="phClr">
+                <a:lumMod val="105000"/>
+                <a:satMod val="103000"/>
+                <a:tint val="73000"/>
+              </a:schemeClr>
+            </a:gs>
+            <a:gs pos="100000">
+              <a:schemeClr val="phClr">
+                <a:lumMod val="105000"/>
+                <a:satMod val="109000"/>
+                <a:tint val="81000"/>
+              </a:schemeClr>
+            </a:gs>
+          </a:gsLst>
+          <a:lin ang="5400000" scaled="0"/>
+        </a:gradFill>
+        <a:gradFill rotWithShape="1">
+          <a:gsLst>
+            <a:gs pos="0">
+              <a:schemeClr val="phClr">
+                <a:satMod val="103000"/>
+                <a:lumMod val="102000"/>
+                <a:tint val="94000"/>
+              </a:schemeClr>
+            </a:gs>
+            <a:gs pos="50000">
+              <a:schemeClr val="phClr">
+                <a:satMod val="110000"/>
+                <a:lumMod val="100000"/>
+                <a:shade val="100000"/>
+              </a:schemeClr>
+            </a:gs>
+            <a:gs pos="100000">
+              <a:schemeClr val="phClr">
+                <a:lumMod val="99000"/>
+                <a:satMod val="120000"/>
+                <a:shade val="78000"/>
+              </a:schemeClr>
+            </a:gs>
+          </a:gsLst>
+          <a:lin ang="5400000" scaled="0"/>
+        </a:gradFill>
+      </a:fillStyleLst>
+      <a:lnStyleLst>
+        <a:ln w="6350" cap="flat" cmpd="sng" algn="ctr">
+          <a:solidFill>
+            <a:schemeClr val="phClr"/>
+          </a:solidFill>
+          <a:prstDash val="solid"/>
+          <a:miter lim="800000"/>
+        </a:ln>
+        <a:ln w="12700" cap="flat" cmpd="sng" algn="ctr">
+          <a:solidFill>
+            <a:schemeClr val="phClr"/>
+          </a:solidFill>
+          <a:prstDash val="solid"/>
+          <a:miter lim="800000"/>
+        </a:ln>
+        <a:ln w="19050" cap="flat" cmpd="sng" algn="ctr">
+          <a:solidFill>
+            <a:schemeClr val="phClr"/>
+          </a:solidFill>
+          <a:prstDash val="solid"/>
+          <a:miter lim="800000"/>
+        </a:ln>
+      </a:lnStyleLst>
+      <a:effectStyleLst>
+        <a:effectStyle>
+          <a:effectLst/>
+        </a:effectStyle>
+        <a:effectStyle>
+          <a:effectLst/>
+        </a:effectStyle>
+        <a:effectStyle>
+          <a:effectLst>
+            <a:outerShdw blurRad="57150" dist="19050" dir="5400000" algn="ctr" rotWithShape="0">
+              <a:srgbClr val="000000">
+                <a:alpha val="63000"/>
+              </a:srgbClr>
+            </a:outerShdw>
+          </a:effectLst>
+        </a:effectStyle>
+      </a:effectStyleLst>
+      <a:bgFillStyleLst>
+        <a:solidFill>
+          <a:schemeClr val="phClr"/>
+        </a:solidFill>
+        <a:solidFill>
+          <a:schemeClr val="phClr">
+            <a:tint val="95000"/>
+            <a:satMod val="170000"/>
+          </a:schemeClr>
+        </a:solidFill>
+        <a:gradFill rotWithShape="1">
+          <a:gsLst>
+            <a:gs pos="0">
+              <a:schemeClr val="phClr">
+                <a:tint val="93000"/>
+                <a:satMod val="150000"/>
+                <a:shade val="98000"/>
+                <a:lumMod val="102000"/>
+              </a:schemeClr>
+            </a:gs>
+            <a:gs pos="50000">
+              <a:schemeClr val="phClr">
+                <a:tint val="98000"/>
+                <a:satMod val="130000"/>
+                <a:shade val="90000"/>
+                <a:lumMod val="103000"/>
+              </a:schemeClr>
+            </a:gs>
+            <a:gs pos="100000">
+              <a:schemeClr val="phClr">
+                <a:shade val="63000"/>
+                <a:satMod val="120000"/>
+              </a:schemeClr>
+            </a:gs>
+          </a:gsLst>
+          <a:lin ang="5400000" scaled="0"/>
+        </a:gradFill>
+      </a:bgFillStyleLst>
+    </a:fmtScheme>
+  </a:themeElements>
+  <a:objectDefaults/>
+  <a:extraClrSchemeLst/>
+  <a:extLst>
+    <a:ext uri="{05A4C25C-085E-4340-85A3-A5531E510DB2}">
+      <thm15:themeFamily xmlns:thm15="http://schemas.microsoft.com/office/thememl/2012/main" name="Office Theme" id="{62F939B6-93AF-4DB8-9C6B-D6C7DFDC589F}" vid="{4A3C46E8-61CC-4603-A589-7422A47A8E4A}"/>
+    </a:ext>
+  </a:extLst>
+</a:theme>
+</file>
+
 <file path=customXml/item1.xml><?xml version="1.0" encoding="utf-8"?>
 <ct:contentTypeSchema xmlns:ct="http://schemas.microsoft.com/office/2006/metadata/contentType" xmlns:ma="http://schemas.microsoft.com/office/2006/metadata/properties/metaAttributes" ct:_="" ma:_="" ma:contentTypeName="Image" ma:contentTypeID="0x0101009148F5A04DDD49CBA7127AADA5FB792B00AADE34325A8B49CDA8BB4DB53328F214008DA1A4150FB2B848A3EB7B452BFA7AC5" ma:contentTypeVersion="1" ma:contentTypeDescription="Upload an image." ma:contentTypeScope="" ma:versionID="c5dd4a19140d82efd42bf2e2156fee3e">
   <xsd:schema xmlns:xsd="http://www.w3.org/2001/XMLSchema" xmlns:xs="http://www.w3.org/2001/XMLSchema" xmlns:p="http://schemas.microsoft.com/office/2006/metadata/properties" xmlns:ns1="http://schemas.microsoft.com/sharepoint/v3" xmlns:ns2="E64CF27C-2ECC-48E8-947E-CA63274FB2E8" xmlns:ns3="http://schemas.microsoft.com/sharepoint/v3/fields" targetNamespace="http://schemas.microsoft.com/office/2006/metadata/properties" ma:root="true" ma:fieldsID="8669bc30feb5185623fa09da941496e2" ns1:_="" ns2:_="" ns3:_="">

</xml_diff>